<commit_message>
Change after model changed
</commit_message>
<xml_diff>
--- a/P4/Presentation-projet_4.pptx
+++ b/P4/Presentation-projet_4.pptx
@@ -5,7 +5,7 @@
     <p:sldMasterId id="2147483648" r:id="rId1"/>
   </p:sldMasterIdLst>
   <p:notesMasterIdLst>
-    <p:notesMasterId r:id="rId22"/>
+    <p:notesMasterId r:id="rId25"/>
   </p:notesMasterIdLst>
   <p:sldIdLst>
     <p:sldId id="256" r:id="rId2"/>
@@ -27,7 +27,10 @@
     <p:sldId id="276" r:id="rId18"/>
     <p:sldId id="278" r:id="rId19"/>
     <p:sldId id="279" r:id="rId20"/>
-    <p:sldId id="280" r:id="rId21"/>
+    <p:sldId id="282" r:id="rId21"/>
+    <p:sldId id="283" r:id="rId22"/>
+    <p:sldId id="281" r:id="rId23"/>
+    <p:sldId id="280" r:id="rId24"/>
   </p:sldIdLst>
   <p:sldSz cx="9144000" cy="6858000" type="screen4x3"/>
   <p:notesSz cx="6858000" cy="9144000"/>
@@ -211,7 +214,7 @@
           <a:p>
             <a:fld id="{E66492E5-39EF-4EC5-9E99-7F0DBC26806B}" type="datetimeFigureOut">
               <a:rPr lang="fr-FR" smtClean="0"/>
-              <a:t>23/11/2017</a:t>
+              <a:t>27/11/2017</a:t>
             </a:fld>
             <a:endParaRPr lang="fr-FR"/>
           </a:p>
@@ -744,7 +747,7 @@
           <a:p>
             <a:fld id="{2A35F02A-33DF-42A4-9F54-2DFA5B84052E}" type="datetime1">
               <a:rPr lang="fr-FR" smtClean="0"/>
-              <a:t>23/11/2017</a:t>
+              <a:t>27/11/2017</a:t>
             </a:fld>
             <a:endParaRPr lang="fr-FR"/>
           </a:p>
@@ -918,7 +921,7 @@
           <a:p>
             <a:fld id="{AA7084F6-C923-4306-BC74-6AA1A26D5992}" type="datetime1">
               <a:rPr lang="fr-FR" smtClean="0"/>
-              <a:t>23/11/2017</a:t>
+              <a:t>27/11/2017</a:t>
             </a:fld>
             <a:endParaRPr lang="fr-FR"/>
           </a:p>
@@ -1102,7 +1105,7 @@
           <a:p>
             <a:fld id="{6B9DA1C8-56AA-40E0-92DC-CCF13B41CFF7}" type="datetime1">
               <a:rPr lang="fr-FR" smtClean="0"/>
-              <a:t>23/11/2017</a:t>
+              <a:t>27/11/2017</a:t>
             </a:fld>
             <a:endParaRPr lang="fr-FR"/>
           </a:p>
@@ -1276,7 +1279,7 @@
           <a:p>
             <a:fld id="{30547005-2CCE-4AAF-810C-C33FB4661996}" type="datetime1">
               <a:rPr lang="fr-FR" smtClean="0"/>
-              <a:t>23/11/2017</a:t>
+              <a:t>27/11/2017</a:t>
             </a:fld>
             <a:endParaRPr lang="fr-FR"/>
           </a:p>
@@ -1526,7 +1529,7 @@
           <a:p>
             <a:fld id="{3EBD0647-CE4F-4B82-BC14-997434234D2E}" type="datetime1">
               <a:rPr lang="fr-FR" smtClean="0"/>
-              <a:t>23/11/2017</a:t>
+              <a:t>27/11/2017</a:t>
             </a:fld>
             <a:endParaRPr lang="fr-FR"/>
           </a:p>
@@ -1818,7 +1821,7 @@
           <a:p>
             <a:fld id="{263CA1C6-1D15-44B1-8495-DE2EC5425D2F}" type="datetime1">
               <a:rPr lang="fr-FR" smtClean="0"/>
-              <a:t>23/11/2017</a:t>
+              <a:t>27/11/2017</a:t>
             </a:fld>
             <a:endParaRPr lang="fr-FR"/>
           </a:p>
@@ -2244,7 +2247,7 @@
           <a:p>
             <a:fld id="{5F86B07A-1301-4558-A6E0-D7A436826ECB}" type="datetime1">
               <a:rPr lang="fr-FR" smtClean="0"/>
-              <a:t>23/11/2017</a:t>
+              <a:t>27/11/2017</a:t>
             </a:fld>
             <a:endParaRPr lang="fr-FR"/>
           </a:p>
@@ -2366,7 +2369,7 @@
           <a:p>
             <a:fld id="{10CD6315-9A1E-41E9-BC28-33D394163B67}" type="datetime1">
               <a:rPr lang="fr-FR" smtClean="0"/>
-              <a:t>23/11/2017</a:t>
+              <a:t>27/11/2017</a:t>
             </a:fld>
             <a:endParaRPr lang="fr-FR"/>
           </a:p>
@@ -2465,7 +2468,7 @@
           <a:p>
             <a:fld id="{8EA7A85C-1960-4CA0-B72B-A39E81C20158}" type="datetime1">
               <a:rPr lang="fr-FR" smtClean="0"/>
-              <a:t>23/11/2017</a:t>
+              <a:t>27/11/2017</a:t>
             </a:fld>
             <a:endParaRPr lang="fr-FR"/>
           </a:p>
@@ -2746,7 +2749,7 @@
           <a:p>
             <a:fld id="{885A14C0-C539-4FC5-A6ED-ABABD975303B}" type="datetime1">
               <a:rPr lang="fr-FR" smtClean="0"/>
-              <a:t>23/11/2017</a:t>
+              <a:t>27/11/2017</a:t>
             </a:fld>
             <a:endParaRPr lang="fr-FR"/>
           </a:p>
@@ -3003,7 +3006,7 @@
           <a:p>
             <a:fld id="{D772F3C9-8121-4DF6-9420-FBC4A08EF57A}" type="datetime1">
               <a:rPr lang="fr-FR" smtClean="0"/>
-              <a:t>23/11/2017</a:t>
+              <a:t>27/11/2017</a:t>
             </a:fld>
             <a:endParaRPr lang="fr-FR"/>
           </a:p>
@@ -3241,7 +3244,7 @@
           <a:p>
             <a:fld id="{C13329EF-B01B-4D4B-83A1-AFBB7696C373}" type="datetime1">
               <a:rPr lang="fr-FR" smtClean="0"/>
-              <a:t>23/11/2017</a:t>
+              <a:t>27/11/2017</a:t>
             </a:fld>
             <a:endParaRPr lang="fr-FR"/>
           </a:p>
@@ -3732,7 +3735,7 @@
                   <a:srgbClr val="95023C"/>
                 </a:solidFill>
               </a:rPr>
-              <a:t>23/11/2017</a:t>
+              <a:t>27/11/2017</a:t>
             </a:fld>
             <a:endParaRPr lang="fr-FR" dirty="0">
               <a:solidFill>
@@ -4056,7 +4059,7 @@
           <a:p>
             <a:fld id="{30547005-2CCE-4AAF-810C-C33FB4661996}" type="datetime1">
               <a:rPr lang="fr-FR" smtClean="0"/>
-              <a:t>23/11/2017</a:t>
+              <a:t>27/11/2017</a:t>
             </a:fld>
             <a:endParaRPr lang="fr-FR"/>
           </a:p>
@@ -4239,7 +4242,15 @@
                   <a:srgbClr val="E8750C"/>
                 </a:solidFill>
               </a:rPr>
-              <a:t>Peu d’</a:t>
+              <a:t>Peu </a:t>
+            </a:r>
+            <a:r>
+              <a:rPr lang="fr-FR" sz="2000" dirty="0" smtClean="0">
+                <a:solidFill>
+                  <a:srgbClr val="E8750C"/>
+                </a:solidFill>
+              </a:rPr>
+              <a:t>d’</a:t>
             </a:r>
             <a:r>
               <a:rPr lang="fr-FR" sz="2000" dirty="0" err="1" smtClean="0">
@@ -4247,7 +4258,7 @@
                   <a:srgbClr val="E8750C"/>
                 </a:solidFill>
               </a:rPr>
-              <a:t>interet</a:t>
+              <a:t>interêt</a:t>
             </a:r>
             <a:endParaRPr lang="fr-FR" sz="2000" dirty="0" smtClean="0">
               <a:solidFill>
@@ -4296,7 +4307,7 @@
           <a:p>
             <a:fld id="{30547005-2CCE-4AAF-810C-C33FB4661996}" type="datetime1">
               <a:rPr lang="fr-FR" smtClean="0"/>
-              <a:t>23/11/2017</a:t>
+              <a:t>27/11/2017</a:t>
             </a:fld>
             <a:endParaRPr lang="fr-FR"/>
           </a:p>
@@ -4495,7 +4506,7 @@
           <a:p>
             <a:fld id="{30547005-2CCE-4AAF-810C-C33FB4661996}" type="datetime1">
               <a:rPr lang="fr-FR" smtClean="0"/>
-              <a:t>23/11/2017</a:t>
+              <a:t>27/11/2017</a:t>
             </a:fld>
             <a:endParaRPr lang="fr-FR"/>
           </a:p>
@@ -4778,7 +4789,7 @@
           <a:p>
             <a:fld id="{30547005-2CCE-4AAF-810C-C33FB4661996}" type="datetime1">
               <a:rPr lang="fr-FR" smtClean="0"/>
-              <a:t>23/11/2017</a:t>
+              <a:t>27/11/2017</a:t>
             </a:fld>
             <a:endParaRPr lang="fr-FR"/>
           </a:p>
@@ -5056,7 +5067,7 @@
           <a:p>
             <a:fld id="{30547005-2CCE-4AAF-810C-C33FB4661996}" type="datetime1">
               <a:rPr lang="fr-FR" smtClean="0"/>
-              <a:t>23/11/2017</a:t>
+              <a:t>27/11/2017</a:t>
             </a:fld>
             <a:endParaRPr lang="fr-FR"/>
           </a:p>
@@ -5493,7 +5504,7 @@
           <a:p>
             <a:fld id="{30547005-2CCE-4AAF-810C-C33FB4661996}" type="datetime1">
               <a:rPr lang="fr-FR" smtClean="0"/>
-              <a:t>23/11/2017</a:t>
+              <a:t>27/11/2017</a:t>
             </a:fld>
             <a:endParaRPr lang="fr-FR"/>
           </a:p>
@@ -5829,7 +5840,7 @@
           <a:p>
             <a:fld id="{30547005-2CCE-4AAF-810C-C33FB4661996}" type="datetime1">
               <a:rPr lang="fr-FR" smtClean="0"/>
-              <a:t>23/11/2017</a:t>
+              <a:t>27/11/2017</a:t>
             </a:fld>
             <a:endParaRPr lang="fr-FR"/>
           </a:p>
@@ -6184,7 +6195,7 @@
           <a:p>
             <a:fld id="{30547005-2CCE-4AAF-810C-C33FB4661996}" type="datetime1">
               <a:rPr lang="fr-FR" smtClean="0"/>
-              <a:t>23/11/2017</a:t>
+              <a:t>27/11/2017</a:t>
             </a:fld>
             <a:endParaRPr lang="fr-FR"/>
           </a:p>
@@ -6495,7 +6506,7 @@
         <p:spPr/>
         <p:txBody>
           <a:bodyPr>
-            <a:normAutofit fontScale="85000" lnSpcReduction="20000"/>
+            <a:normAutofit fontScale="92500" lnSpcReduction="20000"/>
           </a:bodyPr>
           <a:lstStyle/>
           <a:p>
@@ -6711,25 +6722,6 @@
             </a:endParaRPr>
           </a:p>
           <a:p>
-            <a:pPr lvl="2"/>
-            <a:r>
-              <a:rPr lang="fr-FR" sz="1600" dirty="0" err="1" smtClean="0">
-                <a:solidFill>
-                  <a:srgbClr val="E8750C"/>
-                </a:solidFill>
-              </a:rPr>
-              <a:t>Max_iter</a:t>
-            </a:r>
-            <a:r>
-              <a:rPr lang="fr-FR" sz="1600" dirty="0" smtClean="0">
-                <a:solidFill>
-                  <a:srgbClr val="E8750C"/>
-                </a:solidFill>
-              </a:rPr>
-              <a:t> : 10</a:t>
-            </a:r>
-          </a:p>
-          <a:p>
             <a:pPr lvl="1"/>
             <a:r>
               <a:rPr lang="fr-FR" sz="2000" dirty="0" smtClean="0">
@@ -6739,6 +6731,11 @@
               </a:rPr>
               <a:t>SGD</a:t>
             </a:r>
+            <a:endParaRPr lang="fr-FR" sz="2000" dirty="0" smtClean="0">
+              <a:solidFill>
+                <a:srgbClr val="E8750C"/>
+              </a:solidFill>
+            </a:endParaRPr>
           </a:p>
           <a:p>
             <a:pPr lvl="2"/>
@@ -6812,7 +6809,7 @@
           <a:p>
             <a:fld id="{30547005-2CCE-4AAF-810C-C33FB4661996}" type="datetime1">
               <a:rPr lang="fr-FR" smtClean="0"/>
-              <a:t>23/11/2017</a:t>
+              <a:t>27/11/2017</a:t>
             </a:fld>
             <a:endParaRPr lang="fr-FR"/>
           </a:p>
@@ -6985,10 +6982,15 @@
             <p:ph idx="1"/>
           </p:nvPr>
         </p:nvSpPr>
-        <p:spPr/>
+        <p:spPr>
+          <a:xfrm>
+            <a:off x="457200" y="1600200"/>
+            <a:ext cx="8229600" cy="4709120"/>
+          </a:xfrm>
+        </p:spPr>
         <p:txBody>
           <a:bodyPr>
-            <a:normAutofit/>
+            <a:normAutofit fontScale="92500" lnSpcReduction="20000"/>
           </a:bodyPr>
           <a:lstStyle/>
           <a:p>
@@ -6998,241 +7000,204 @@
                   <a:srgbClr val="E8750C"/>
                 </a:solidFill>
               </a:rPr>
-              <a:t>API</a:t>
-            </a:r>
-          </a:p>
-          <a:p>
-            <a:pPr lvl="1"/>
-            <a:r>
-              <a:rPr lang="fr-FR" sz="2400" dirty="0" smtClean="0">
-                <a:solidFill>
-                  <a:srgbClr val="E8750C"/>
-                </a:solidFill>
-              </a:rPr>
-              <a:t>Petit site </a:t>
-            </a:r>
-            <a:r>
-              <a:rPr lang="fr-FR" sz="2400" dirty="0" err="1" smtClean="0">
-                <a:solidFill>
-                  <a:srgbClr val="E8750C"/>
-                </a:solidFill>
-              </a:rPr>
-              <a:t>Flask</a:t>
-            </a:r>
-            <a:endParaRPr lang="fr-FR" sz="2400" dirty="0" smtClean="0">
+              <a:t>Ouverture à l’amélioration</a:t>
+            </a:r>
+            <a:endParaRPr lang="fr-FR" sz="2800" dirty="0" smtClean="0">
               <a:solidFill>
                 <a:srgbClr val="E8750C"/>
               </a:solidFill>
             </a:endParaRPr>
           </a:p>
           <a:p>
+            <a:pPr lvl="1"/>
+            <a:r>
+              <a:rPr lang="fr-FR" sz="2400" dirty="0" smtClean="0">
+                <a:solidFill>
+                  <a:srgbClr val="E8750C"/>
+                </a:solidFill>
+              </a:rPr>
+              <a:t>Objectif modèle linéaire</a:t>
+            </a:r>
+          </a:p>
+          <a:p>
+            <a:pPr lvl="1"/>
+            <a:r>
+              <a:rPr lang="fr-FR" sz="2400" dirty="0" smtClean="0">
+                <a:solidFill>
+                  <a:srgbClr val="E8750C"/>
+                </a:solidFill>
+              </a:rPr>
+              <a:t>Autres solutions</a:t>
+            </a:r>
+          </a:p>
+          <a:p>
             <a:pPr lvl="2"/>
             <a:r>
-              <a:rPr lang="fr-FR" sz="1800" dirty="0" smtClean="0">
-                <a:solidFill>
-                  <a:srgbClr val="E8750C"/>
-                </a:solidFill>
-              </a:rPr>
-              <a:t>Entrée</a:t>
+              <a:rPr lang="fr-FR" dirty="0" smtClean="0">
+                <a:solidFill>
+                  <a:srgbClr val="E8750C"/>
+                </a:solidFill>
+              </a:rPr>
+              <a:t>Matrice Départ/Arrivé/jour/heure</a:t>
             </a:r>
           </a:p>
           <a:p>
             <a:pPr lvl="3"/>
             <a:r>
-              <a:rPr lang="fr-FR" sz="1400" dirty="0" smtClean="0">
-                <a:solidFill>
-                  <a:srgbClr val="E8750C"/>
-                </a:solidFill>
-              </a:rPr>
-              <a:t>Date du vol</a:t>
+              <a:rPr lang="fr-FR" dirty="0" smtClean="0">
+                <a:solidFill>
+                  <a:srgbClr val="E8750C"/>
+                </a:solidFill>
+              </a:rPr>
+              <a:t>311*310*365*24 = 844m de données</a:t>
             </a:r>
           </a:p>
           <a:p>
             <a:pPr lvl="3"/>
             <a:r>
-              <a:rPr lang="fr-FR" sz="1400" dirty="0" smtClean="0">
-                <a:solidFill>
-                  <a:srgbClr val="E8750C"/>
-                </a:solidFill>
-              </a:rPr>
-              <a:t>Heure du vol</a:t>
+              <a:rPr lang="fr-FR" dirty="0" smtClean="0">
+                <a:solidFill>
+                  <a:srgbClr val="E8750C"/>
+                </a:solidFill>
+              </a:rPr>
+              <a:t>Possiblement des données manquantes</a:t>
+            </a:r>
+          </a:p>
+          <a:p>
+            <a:pPr lvl="2"/>
+            <a:r>
+              <a:rPr lang="fr-FR" dirty="0" smtClean="0">
+                <a:solidFill>
+                  <a:srgbClr val="E8750C"/>
+                </a:solidFill>
+              </a:rPr>
+              <a:t>Modèle temporel simple</a:t>
             </a:r>
           </a:p>
           <a:p>
             <a:pPr lvl="3"/>
             <a:r>
-              <a:rPr lang="fr-FR" sz="1400" dirty="0" smtClean="0">
-                <a:solidFill>
-                  <a:srgbClr val="E8750C"/>
-                </a:solidFill>
-              </a:rPr>
-              <a:t>Compagnie</a:t>
+              <a:rPr lang="fr-FR" dirty="0" err="1" smtClean="0">
+                <a:solidFill>
+                  <a:srgbClr val="E8750C"/>
+                </a:solidFill>
+              </a:rPr>
+              <a:t>fbProphet</a:t>
+            </a:r>
+            <a:r>
+              <a:rPr lang="fr-FR" dirty="0" smtClean="0">
+                <a:solidFill>
+                  <a:srgbClr val="E8750C"/>
+                </a:solidFill>
+              </a:rPr>
+              <a:t> / ARIMA</a:t>
             </a:r>
           </a:p>
           <a:p>
             <a:pPr lvl="3"/>
             <a:r>
-              <a:rPr lang="fr-FR" sz="1400" dirty="0" err="1" smtClean="0">
-                <a:solidFill>
-                  <a:srgbClr val="E8750C"/>
-                </a:solidFill>
-              </a:rPr>
-              <a:t>Aeroport</a:t>
-            </a:r>
-            <a:r>
-              <a:rPr lang="fr-FR" sz="1400" dirty="0" smtClean="0">
-                <a:solidFill>
-                  <a:srgbClr val="E8750C"/>
-                </a:solidFill>
-              </a:rPr>
-              <a:t> de départ</a:t>
+              <a:rPr lang="fr-FR" dirty="0" smtClean="0">
+                <a:solidFill>
+                  <a:srgbClr val="E8750C"/>
+                </a:solidFill>
+              </a:rPr>
+              <a:t>« </a:t>
+            </a:r>
+            <a:r>
+              <a:rPr lang="fr-FR" dirty="0" err="1" smtClean="0">
+                <a:solidFill>
+                  <a:srgbClr val="E8750C"/>
+                </a:solidFill>
+              </a:rPr>
+              <a:t>Boosting</a:t>
+            </a:r>
+            <a:r>
+              <a:rPr lang="fr-FR" dirty="0" smtClean="0">
+                <a:solidFill>
+                  <a:srgbClr val="E8750C"/>
+                </a:solidFill>
+              </a:rPr>
+              <a:t> » temporel</a:t>
             </a:r>
           </a:p>
           <a:p>
             <a:pPr lvl="3"/>
             <a:r>
-              <a:rPr lang="fr-FR" sz="1400" dirty="0" err="1" smtClean="0">
-                <a:solidFill>
-                  <a:srgbClr val="E8750C"/>
-                </a:solidFill>
-              </a:rPr>
-              <a:t>Aeroport</a:t>
-            </a:r>
-            <a:r>
-              <a:rPr lang="fr-FR" sz="1400" dirty="0" smtClean="0">
-                <a:solidFill>
-                  <a:srgbClr val="E8750C"/>
-                </a:solidFill>
-              </a:rPr>
-              <a:t> d’arrivé</a:t>
+              <a:rPr lang="fr-FR" dirty="0" smtClean="0">
+                <a:solidFill>
+                  <a:srgbClr val="E8750C"/>
+                </a:solidFill>
+              </a:rPr>
+              <a:t>Uniquement date/retard</a:t>
             </a:r>
           </a:p>
           <a:p>
             <a:pPr lvl="2"/>
             <a:r>
-              <a:rPr lang="fr-FR" sz="1800" dirty="0" err="1" smtClean="0">
-                <a:solidFill>
-                  <a:srgbClr val="E8750C"/>
-                </a:solidFill>
-              </a:rPr>
-              <a:t>Requete</a:t>
-            </a:r>
-            <a:r>
-              <a:rPr lang="fr-FR" sz="1800" dirty="0" smtClean="0">
-                <a:solidFill>
-                  <a:srgbClr val="E8750C"/>
-                </a:solidFill>
-              </a:rPr>
-              <a:t> POST</a:t>
+              <a:rPr lang="fr-FR" dirty="0" smtClean="0">
+                <a:solidFill>
+                  <a:srgbClr val="E8750C"/>
+                </a:solidFill>
+              </a:rPr>
+              <a:t>RNN</a:t>
             </a:r>
           </a:p>
           <a:p>
             <a:pPr lvl="3"/>
             <a:r>
-              <a:rPr lang="fr-FR" sz="1400" dirty="0" smtClean="0">
-                <a:solidFill>
-                  <a:srgbClr val="E8750C"/>
-                </a:solidFill>
-              </a:rPr>
-              <a:t>Pas de contrôle des inputs</a:t>
+              <a:rPr lang="fr-FR" dirty="0" smtClean="0">
+                <a:solidFill>
+                  <a:srgbClr val="E8750C"/>
+                </a:solidFill>
+              </a:rPr>
+              <a:t>LSTM/GRU</a:t>
             </a:r>
           </a:p>
           <a:p>
             <a:pPr lvl="3"/>
             <a:r>
-              <a:rPr lang="fr-FR" sz="1400" dirty="0" smtClean="0">
-                <a:solidFill>
-                  <a:srgbClr val="E8750C"/>
-                </a:solidFill>
-              </a:rPr>
-              <a:t>Encodage (OHE)</a:t>
+              <a:rPr lang="fr-FR" dirty="0" smtClean="0">
+                <a:solidFill>
+                  <a:srgbClr val="E8750C"/>
+                </a:solidFill>
+              </a:rPr>
+              <a:t>Aéroport de départ/arrivé</a:t>
             </a:r>
           </a:p>
           <a:p>
             <a:pPr lvl="3"/>
             <a:r>
-              <a:rPr lang="fr-FR" sz="1400" dirty="0" err="1" smtClean="0">
-                <a:solidFill>
-                  <a:srgbClr val="E8750C"/>
-                </a:solidFill>
-              </a:rPr>
-              <a:t>Scaler</a:t>
-            </a:r>
-            <a:r>
-              <a:rPr lang="fr-FR" sz="1400" dirty="0" smtClean="0">
-                <a:solidFill>
-                  <a:srgbClr val="E8750C"/>
-                </a:solidFill>
-              </a:rPr>
-              <a:t> </a:t>
-            </a:r>
-            <a:r>
-              <a:rPr lang="fr-FR" sz="1400" dirty="0" err="1" smtClean="0">
-                <a:solidFill>
-                  <a:srgbClr val="E8750C"/>
-                </a:solidFill>
-              </a:rPr>
-              <a:t>saved</a:t>
-            </a:r>
-            <a:endParaRPr lang="fr-FR" sz="1400" dirty="0" smtClean="0">
-              <a:solidFill>
-                <a:srgbClr val="E8750C"/>
-              </a:solidFill>
-            </a:endParaRPr>
+              <a:rPr lang="fr-FR" dirty="0" smtClean="0">
+                <a:solidFill>
+                  <a:srgbClr val="E8750C"/>
+                </a:solidFill>
+              </a:rPr>
+              <a:t>Nombre de vols au départ/heure</a:t>
+            </a:r>
           </a:p>
           <a:p>
             <a:pPr lvl="3"/>
             <a:r>
-              <a:rPr lang="fr-FR" sz="1400" dirty="0" smtClean="0">
-                <a:solidFill>
-                  <a:srgbClr val="E8750C"/>
-                </a:solidFill>
-              </a:rPr>
-              <a:t>Modèle </a:t>
-            </a:r>
-            <a:r>
-              <a:rPr lang="fr-FR" sz="1400" dirty="0" err="1" smtClean="0">
-                <a:solidFill>
-                  <a:srgbClr val="E8750C"/>
-                </a:solidFill>
-              </a:rPr>
-              <a:t>saved</a:t>
-            </a:r>
-            <a:endParaRPr lang="fr-FR" sz="1400" dirty="0" smtClean="0">
-              <a:solidFill>
-                <a:srgbClr val="E8750C"/>
-              </a:solidFill>
-            </a:endParaRPr>
-          </a:p>
-          <a:p>
-            <a:pPr lvl="2"/>
-            <a:r>
-              <a:rPr lang="fr-FR" sz="1800" dirty="0" smtClean="0">
-                <a:solidFill>
-                  <a:srgbClr val="E8750C"/>
-                </a:solidFill>
-              </a:rPr>
-              <a:t>Sortie</a:t>
-            </a:r>
-          </a:p>
-          <a:p>
-            <a:pPr lvl="3"/>
-            <a:r>
-              <a:rPr lang="fr-FR" sz="1400" dirty="0" smtClean="0">
-                <a:solidFill>
-                  <a:srgbClr val="E8750C"/>
-                </a:solidFill>
-              </a:rPr>
-              <a:t>Retourne Avance/Retard</a:t>
-            </a:r>
-          </a:p>
-          <a:p>
+              <a:rPr lang="fr-FR" dirty="0" smtClean="0">
+                <a:solidFill>
+                  <a:srgbClr val="E8750C"/>
+                </a:solidFill>
+              </a:rPr>
+              <a:t>Compagnie choisie</a:t>
+            </a:r>
             <a:endParaRPr lang="fr-FR" dirty="0" smtClean="0">
               <a:solidFill>
                 <a:srgbClr val="E8750C"/>
               </a:solidFill>
             </a:endParaRPr>
           </a:p>
+          <a:p>
+            <a:endParaRPr lang="fr-FR" dirty="0" smtClean="0">
+              <a:solidFill>
+                <a:srgbClr val="E8750C"/>
+              </a:solidFill>
+            </a:endParaRPr>
+          </a:p>
         </p:txBody>
       </p:sp>
       <p:sp>
@@ -7252,7 +7217,7 @@
           <a:p>
             <a:fld id="{30547005-2CCE-4AAF-810C-C33FB4661996}" type="datetime1">
               <a:rPr lang="fr-FR" smtClean="0"/>
-              <a:t>23/11/2017</a:t>
+              <a:t>27/11/2017</a:t>
             </a:fld>
             <a:endParaRPr lang="fr-FR"/>
           </a:p>
@@ -7281,6 +7246,104 @@
           </a:p>
         </p:txBody>
       </p:sp>
+      <p:pic>
+        <p:nvPicPr>
+          <p:cNvPr id="3074" name="Picture 2" descr="F:\Nicolas\Documents\OpenClassRoom\P4\img\retard_residuel.png"/>
+          <p:cNvPicPr>
+            <a:picLocks noChangeAspect="1" noChangeArrowheads="1"/>
+          </p:cNvPicPr>
+          <p:nvPr/>
+        </p:nvPicPr>
+        <p:blipFill rotWithShape="1">
+          <a:blip r:embed="rId2" cstate="print">
+            <a:clrChange>
+              <a:clrFrom>
+                <a:srgbClr val="FFFFFF"/>
+              </a:clrFrom>
+              <a:clrTo>
+                <a:srgbClr val="FFFFFF">
+                  <a:alpha val="0"/>
+                </a:srgbClr>
+              </a:clrTo>
+            </a:clrChange>
+            <a:extLst>
+              <a:ext uri="{28A0092B-C50C-407E-A947-70E740481C1C}">
+                <a14:useLocalDpi xmlns:a14="http://schemas.microsoft.com/office/drawing/2010/main" val="0"/>
+              </a:ext>
+            </a:extLst>
+          </a:blip>
+          <a:srcRect l="5919" t="9175" r="7784" b="7492"/>
+          <a:stretch/>
+        </p:blipFill>
+        <p:spPr bwMode="auto">
+          <a:xfrm>
+            <a:off x="6126096" y="3741595"/>
+            <a:ext cx="2982408" cy="2880008"/>
+          </a:xfrm>
+          <a:prstGeom prst="rect">
+            <a:avLst/>
+          </a:prstGeom>
+          <a:noFill/>
+          <a:extLst>
+            <a:ext uri="{909E8E84-426E-40DD-AFC4-6F175D3DCCD1}">
+              <a14:hiddenFill xmlns:a14="http://schemas.microsoft.com/office/drawing/2010/main">
+                <a:solidFill>
+                  <a:srgbClr val="FFFFFF"/>
+                </a:solidFill>
+              </a14:hiddenFill>
+            </a:ext>
+          </a:extLst>
+        </p:spPr>
+      </p:pic>
+      <p:pic>
+        <p:nvPicPr>
+          <p:cNvPr id="3075" name="Picture 3" descr="F:\Nicolas\Documents\OpenClassRoom\P4\img\distrib_retard.png"/>
+          <p:cNvPicPr>
+            <a:picLocks noChangeAspect="1" noChangeArrowheads="1"/>
+          </p:cNvPicPr>
+          <p:nvPr/>
+        </p:nvPicPr>
+        <p:blipFill rotWithShape="1">
+          <a:blip r:embed="rId3" cstate="print">
+            <a:clrChange>
+              <a:clrFrom>
+                <a:srgbClr val="FFFFFF"/>
+              </a:clrFrom>
+              <a:clrTo>
+                <a:srgbClr val="FFFFFF">
+                  <a:alpha val="0"/>
+                </a:srgbClr>
+              </a:clrTo>
+            </a:clrChange>
+            <a:extLst>
+              <a:ext uri="{28A0092B-C50C-407E-A947-70E740481C1C}">
+                <a14:useLocalDpi xmlns:a14="http://schemas.microsoft.com/office/drawing/2010/main" val="0"/>
+              </a:ext>
+            </a:extLst>
+          </a:blip>
+          <a:srcRect l="7041" t="9175" r="8051" b="8788"/>
+          <a:stretch/>
+        </p:blipFill>
+        <p:spPr bwMode="auto">
+          <a:xfrm>
+            <a:off x="6155894" y="476672"/>
+            <a:ext cx="2922812" cy="2824004"/>
+          </a:xfrm>
+          <a:prstGeom prst="rect">
+            <a:avLst/>
+          </a:prstGeom>
+          <a:noFill/>
+          <a:extLst>
+            <a:ext uri="{909E8E84-426E-40DD-AFC4-6F175D3DCCD1}">
+              <a14:hiddenFill xmlns:a14="http://schemas.microsoft.com/office/drawing/2010/main">
+                <a:solidFill>
+                  <a:srgbClr val="FFFFFF"/>
+                </a:solidFill>
+              </a14:hiddenFill>
+            </a:ext>
+          </a:extLst>
+        </p:spPr>
+      </p:pic>
     </p:spTree>
     <p:extLst>
       <p:ext uri="{BB962C8B-B14F-4D97-AF65-F5344CB8AC3E}">
@@ -7562,7 +7625,7 @@
           <a:p>
             <a:fld id="{30547005-2CCE-4AAF-810C-C33FB4661996}" type="datetime1">
               <a:rPr lang="fr-FR" smtClean="0"/>
-              <a:t>23/11/2017</a:t>
+              <a:t>27/11/2017</a:t>
             </a:fld>
             <a:endParaRPr lang="fr-FR"/>
           </a:p>
@@ -7686,6 +7749,978 @@
           <a:p>
             <a:r>
               <a:rPr lang="fr-FR" dirty="0" smtClean="0"/>
+              <a:t>Modélisation</a:t>
+            </a:r>
+            <a:endParaRPr lang="fr-FR" dirty="0"/>
+          </a:p>
+        </p:txBody>
+      </p:sp>
+      <p:sp>
+        <p:nvSpPr>
+          <p:cNvPr id="3" name="Espace réservé du contenu 2"/>
+          <p:cNvSpPr>
+            <a:spLocks noGrp="1"/>
+          </p:cNvSpPr>
+          <p:nvPr>
+            <p:ph idx="1"/>
+          </p:nvPr>
+        </p:nvSpPr>
+        <p:spPr>
+          <a:xfrm>
+            <a:off x="457200" y="1600200"/>
+            <a:ext cx="8229600" cy="4709120"/>
+          </a:xfrm>
+        </p:spPr>
+        <p:txBody>
+          <a:bodyPr>
+            <a:normAutofit/>
+          </a:bodyPr>
+          <a:lstStyle/>
+          <a:p>
+            <a:r>
+              <a:rPr lang="fr-FR" sz="2400" dirty="0" smtClean="0">
+                <a:solidFill>
+                  <a:srgbClr val="E8750C"/>
+                </a:solidFill>
+              </a:rPr>
+              <a:t>ARIMA</a:t>
+            </a:r>
+            <a:endParaRPr lang="fr-FR" sz="2400" dirty="0" smtClean="0">
+              <a:solidFill>
+                <a:srgbClr val="E8750C"/>
+              </a:solidFill>
+            </a:endParaRPr>
+          </a:p>
+          <a:p>
+            <a:pPr lvl="1"/>
+            <a:r>
+              <a:rPr lang="fr-FR" sz="2000" dirty="0" smtClean="0">
+                <a:solidFill>
+                  <a:srgbClr val="E8750C"/>
+                </a:solidFill>
+              </a:rPr>
+              <a:t>Création d’un </a:t>
+            </a:r>
+            <a:r>
+              <a:rPr lang="fr-FR" sz="2000" dirty="0" err="1" smtClean="0">
+                <a:solidFill>
+                  <a:srgbClr val="E8750C"/>
+                </a:solidFill>
+              </a:rPr>
+              <a:t>dataset</a:t>
+            </a:r>
+            <a:endParaRPr lang="fr-FR" sz="2000" dirty="0">
+              <a:solidFill>
+                <a:srgbClr val="E8750C"/>
+              </a:solidFill>
+            </a:endParaRPr>
+          </a:p>
+          <a:p>
+            <a:pPr lvl="2"/>
+            <a:r>
+              <a:rPr lang="fr-FR" sz="2000" dirty="0" smtClean="0">
+                <a:solidFill>
+                  <a:srgbClr val="E8750C"/>
+                </a:solidFill>
+              </a:rPr>
+              <a:t>Date / retard moyen (365 lignes)</a:t>
+            </a:r>
+            <a:endParaRPr lang="fr-FR" sz="2000" dirty="0" smtClean="0">
+              <a:solidFill>
+                <a:srgbClr val="E8750C"/>
+              </a:solidFill>
+            </a:endParaRPr>
+          </a:p>
+          <a:p>
+            <a:pPr lvl="1"/>
+            <a:r>
+              <a:rPr lang="fr-FR" sz="2000" dirty="0" smtClean="0">
+                <a:solidFill>
+                  <a:srgbClr val="E8750C"/>
+                </a:solidFill>
+              </a:rPr>
+              <a:t>Recherche de paramètre (p, q, r) par </a:t>
+            </a:r>
+            <a:r>
+              <a:rPr lang="fr-FR" sz="2000" dirty="0" err="1" smtClean="0">
+                <a:solidFill>
+                  <a:srgbClr val="E8750C"/>
+                </a:solidFill>
+              </a:rPr>
+              <a:t>grid</a:t>
+            </a:r>
+            <a:r>
+              <a:rPr lang="fr-FR" sz="2000" dirty="0" smtClean="0">
+                <a:solidFill>
+                  <a:srgbClr val="E8750C"/>
+                </a:solidFill>
+              </a:rPr>
+              <a:t> </a:t>
+            </a:r>
+            <a:r>
+              <a:rPr lang="fr-FR" sz="2000" dirty="0" err="1" smtClean="0">
+                <a:solidFill>
+                  <a:srgbClr val="E8750C"/>
+                </a:solidFill>
+              </a:rPr>
+              <a:t>search</a:t>
+            </a:r>
+            <a:r>
+              <a:rPr lang="fr-FR" sz="2000" dirty="0" smtClean="0">
+                <a:solidFill>
+                  <a:srgbClr val="E8750C"/>
+                </a:solidFill>
+              </a:rPr>
+              <a:t> (MAE/MSE)</a:t>
+            </a:r>
+          </a:p>
+          <a:p>
+            <a:pPr lvl="2"/>
+            <a:endParaRPr lang="fr-FR" dirty="0" smtClean="0">
+              <a:solidFill>
+                <a:srgbClr val="E8750C"/>
+              </a:solidFill>
+            </a:endParaRPr>
+          </a:p>
+        </p:txBody>
+      </p:sp>
+      <p:sp>
+        <p:nvSpPr>
+          <p:cNvPr id="4" name="Espace réservé de la date 3"/>
+          <p:cNvSpPr>
+            <a:spLocks noGrp="1"/>
+          </p:cNvSpPr>
+          <p:nvPr>
+            <p:ph type="dt" sz="half" idx="10"/>
+          </p:nvPr>
+        </p:nvSpPr>
+        <p:spPr/>
+        <p:txBody>
+          <a:bodyPr/>
+          <a:lstStyle/>
+          <a:p>
+            <a:fld id="{30547005-2CCE-4AAF-810C-C33FB4661996}" type="datetime1">
+              <a:rPr lang="fr-FR" smtClean="0"/>
+              <a:t>27/11/2017</a:t>
+            </a:fld>
+            <a:endParaRPr lang="fr-FR"/>
+          </a:p>
+        </p:txBody>
+      </p:sp>
+      <p:sp>
+        <p:nvSpPr>
+          <p:cNvPr id="5" name="Espace réservé du pied de page 4"/>
+          <p:cNvSpPr>
+            <a:spLocks noGrp="1"/>
+          </p:cNvSpPr>
+          <p:nvPr>
+            <p:ph type="ftr" sz="quarter" idx="11"/>
+          </p:nvPr>
+        </p:nvSpPr>
+        <p:spPr/>
+        <p:txBody>
+          <a:bodyPr/>
+          <a:lstStyle/>
+          <a:p>
+            <a:r>
+              <a:rPr lang="fr-FR" dirty="0" smtClean="0"/>
+              <a:t>MINE Nicolas</a:t>
+            </a:r>
+            <a:endParaRPr lang="fr-FR" dirty="0"/>
+          </a:p>
+        </p:txBody>
+      </p:sp>
+      <p:pic>
+        <p:nvPicPr>
+          <p:cNvPr id="1026" name="Picture 2" descr="F:\Nicolas\Documents\OpenClassRoom\P4\img\arima_predicted.png"/>
+          <p:cNvPicPr>
+            <a:picLocks noChangeAspect="1" noChangeArrowheads="1"/>
+          </p:cNvPicPr>
+          <p:nvPr/>
+        </p:nvPicPr>
+        <p:blipFill rotWithShape="1">
+          <a:blip r:embed="rId2">
+            <a:clrChange>
+              <a:clrFrom>
+                <a:srgbClr val="FFFFFF"/>
+              </a:clrFrom>
+              <a:clrTo>
+                <a:srgbClr val="FFFFFF">
+                  <a:alpha val="0"/>
+                </a:srgbClr>
+              </a:clrTo>
+            </a:clrChange>
+            <a:extLst>
+              <a:ext uri="{28A0092B-C50C-407E-A947-70E740481C1C}">
+                <a14:useLocalDpi xmlns:a14="http://schemas.microsoft.com/office/drawing/2010/main" val="0"/>
+              </a:ext>
+            </a:extLst>
+          </a:blip>
+          <a:srcRect l="9877" t="10262" r="9259" b="6559"/>
+          <a:stretch/>
+        </p:blipFill>
+        <p:spPr bwMode="auto">
+          <a:xfrm>
+            <a:off x="467544" y="3140968"/>
+            <a:ext cx="8136904" cy="3347932"/>
+          </a:xfrm>
+          <a:prstGeom prst="rect">
+            <a:avLst/>
+          </a:prstGeom>
+          <a:noFill/>
+          <a:extLst>
+            <a:ext uri="{909E8E84-426E-40DD-AFC4-6F175D3DCCD1}">
+              <a14:hiddenFill xmlns:a14="http://schemas.microsoft.com/office/drawing/2010/main">
+                <a:solidFill>
+                  <a:srgbClr val="FFFFFF"/>
+                </a:solidFill>
+              </a14:hiddenFill>
+            </a:ext>
+          </a:extLst>
+        </p:spPr>
+      </p:pic>
+      <p:sp>
+        <p:nvSpPr>
+          <p:cNvPr id="7" name="ZoneTexte 6"/>
+          <p:cNvSpPr txBox="1"/>
+          <p:nvPr/>
+        </p:nvSpPr>
+        <p:spPr>
+          <a:xfrm>
+            <a:off x="6228184" y="1988840"/>
+            <a:ext cx="2088232" cy="646331"/>
+          </a:xfrm>
+          <a:prstGeom prst="rect">
+            <a:avLst/>
+          </a:prstGeom>
+          <a:noFill/>
+        </p:spPr>
+        <p:txBody>
+          <a:bodyPr wrap="square" rtlCol="0">
+            <a:spAutoFit/>
+          </a:bodyPr>
+          <a:lstStyle/>
+          <a:p>
+            <a:r>
+              <a:rPr lang="fr-FR" dirty="0"/>
+              <a:t>MAE : </a:t>
+            </a:r>
+            <a:r>
+              <a:rPr lang="fr-FR" dirty="0" smtClean="0"/>
+              <a:t>5.66</a:t>
+            </a:r>
+          </a:p>
+          <a:p>
+            <a:r>
+              <a:rPr lang="fr-FR" dirty="0"/>
+              <a:t>MSE : </a:t>
+            </a:r>
+            <a:r>
+              <a:rPr lang="fr-FR" dirty="0" smtClean="0"/>
+              <a:t>65.99</a:t>
+            </a:r>
+            <a:endParaRPr lang="fr-FR" dirty="0"/>
+          </a:p>
+        </p:txBody>
+      </p:sp>
+    </p:spTree>
+    <p:extLst>
+      <p:ext uri="{BB962C8B-B14F-4D97-AF65-F5344CB8AC3E}">
+        <p14:creationId xmlns:p14="http://schemas.microsoft.com/office/powerpoint/2010/main" val="287024618"/>
+      </p:ext>
+    </p:extLst>
+  </p:cSld>
+  <p:clrMapOvr>
+    <a:masterClrMapping/>
+  </p:clrMapOvr>
+  <p:timing>
+    <p:tnLst>
+      <p:par>
+        <p:cTn id="1" dur="indefinite" restart="never" nodeType="tmRoot"/>
+      </p:par>
+    </p:tnLst>
+  </p:timing>
+</p:sld>
+</file>
+
+<file path=ppt/slides/slide21.xml><?xml version="1.0" encoding="utf-8"?>
+<p:sld xmlns:a="http://schemas.openxmlformats.org/drawingml/2006/main" xmlns:r="http://schemas.openxmlformats.org/officeDocument/2006/relationships" xmlns:p="http://schemas.openxmlformats.org/presentationml/2006/main">
+  <p:cSld>
+    <p:spTree>
+      <p:nvGrpSpPr>
+        <p:cNvPr id="1" name=""/>
+        <p:cNvGrpSpPr/>
+        <p:nvPr/>
+      </p:nvGrpSpPr>
+      <p:grpSpPr>
+        <a:xfrm>
+          <a:off x="0" y="0"/>
+          <a:ext cx="0" cy="0"/>
+          <a:chOff x="0" y="0"/>
+          <a:chExt cx="0" cy="0"/>
+        </a:xfrm>
+      </p:grpSpPr>
+      <p:sp>
+        <p:nvSpPr>
+          <p:cNvPr id="2" name="Titre 1"/>
+          <p:cNvSpPr>
+            <a:spLocks noGrp="1"/>
+          </p:cNvSpPr>
+          <p:nvPr>
+            <p:ph type="title"/>
+          </p:nvPr>
+        </p:nvSpPr>
+        <p:spPr/>
+        <p:txBody>
+          <a:bodyPr/>
+          <a:lstStyle/>
+          <a:p>
+            <a:r>
+              <a:rPr lang="fr-FR" dirty="0" smtClean="0"/>
+              <a:t>Modélisation</a:t>
+            </a:r>
+            <a:endParaRPr lang="fr-FR" dirty="0"/>
+          </a:p>
+        </p:txBody>
+      </p:sp>
+      <p:sp>
+        <p:nvSpPr>
+          <p:cNvPr id="3" name="Espace réservé du contenu 2"/>
+          <p:cNvSpPr>
+            <a:spLocks noGrp="1"/>
+          </p:cNvSpPr>
+          <p:nvPr>
+            <p:ph idx="1"/>
+          </p:nvPr>
+        </p:nvSpPr>
+        <p:spPr>
+          <a:xfrm>
+            <a:off x="457200" y="1600200"/>
+            <a:ext cx="8229600" cy="4709120"/>
+          </a:xfrm>
+        </p:spPr>
+        <p:txBody>
+          <a:bodyPr>
+            <a:normAutofit/>
+          </a:bodyPr>
+          <a:lstStyle/>
+          <a:p>
+            <a:r>
+              <a:rPr lang="fr-FR" sz="2400" dirty="0" smtClean="0">
+                <a:solidFill>
+                  <a:srgbClr val="E8750C"/>
+                </a:solidFill>
+              </a:rPr>
+              <a:t>ARIMA</a:t>
+            </a:r>
+            <a:endParaRPr lang="fr-FR" sz="2400" dirty="0" smtClean="0">
+              <a:solidFill>
+                <a:srgbClr val="E8750C"/>
+              </a:solidFill>
+            </a:endParaRPr>
+          </a:p>
+          <a:p>
+            <a:pPr lvl="1"/>
+            <a:r>
+              <a:rPr lang="fr-FR" sz="2000" dirty="0" smtClean="0">
+                <a:solidFill>
+                  <a:srgbClr val="E8750C"/>
+                </a:solidFill>
+              </a:rPr>
+              <a:t>Validation sur 6 mois 2017</a:t>
+            </a:r>
+            <a:endParaRPr lang="fr-FR" dirty="0">
+              <a:solidFill>
+                <a:srgbClr val="E8750C"/>
+              </a:solidFill>
+            </a:endParaRPr>
+          </a:p>
+          <a:p>
+            <a:pPr lvl="1"/>
+            <a:r>
+              <a:rPr lang="fr-FR" sz="2000" dirty="0" smtClean="0">
+                <a:solidFill>
+                  <a:srgbClr val="E8750C"/>
+                </a:solidFill>
+              </a:rPr>
+              <a:t>Prédiction max sur 7j</a:t>
+            </a:r>
+          </a:p>
+          <a:p>
+            <a:pPr lvl="2"/>
+            <a:r>
+              <a:rPr lang="fr-FR" sz="1600" dirty="0" smtClean="0">
+                <a:solidFill>
+                  <a:srgbClr val="E8750C"/>
+                </a:solidFill>
+              </a:rPr>
+              <a:t>Réutilisation des données 2016</a:t>
+            </a:r>
+          </a:p>
+          <a:p>
+            <a:pPr lvl="2"/>
+            <a:endParaRPr lang="fr-FR" sz="1600" dirty="0">
+              <a:solidFill>
+                <a:srgbClr val="E8750C"/>
+              </a:solidFill>
+            </a:endParaRPr>
+          </a:p>
+        </p:txBody>
+      </p:sp>
+      <p:sp>
+        <p:nvSpPr>
+          <p:cNvPr id="4" name="Espace réservé de la date 3"/>
+          <p:cNvSpPr>
+            <a:spLocks noGrp="1"/>
+          </p:cNvSpPr>
+          <p:nvPr>
+            <p:ph type="dt" sz="half" idx="10"/>
+          </p:nvPr>
+        </p:nvSpPr>
+        <p:spPr/>
+        <p:txBody>
+          <a:bodyPr/>
+          <a:lstStyle/>
+          <a:p>
+            <a:fld id="{30547005-2CCE-4AAF-810C-C33FB4661996}" type="datetime1">
+              <a:rPr lang="fr-FR" smtClean="0"/>
+              <a:t>27/11/2017</a:t>
+            </a:fld>
+            <a:endParaRPr lang="fr-FR"/>
+          </a:p>
+        </p:txBody>
+      </p:sp>
+      <p:sp>
+        <p:nvSpPr>
+          <p:cNvPr id="5" name="Espace réservé du pied de page 4"/>
+          <p:cNvSpPr>
+            <a:spLocks noGrp="1"/>
+          </p:cNvSpPr>
+          <p:nvPr>
+            <p:ph type="ftr" sz="quarter" idx="11"/>
+          </p:nvPr>
+        </p:nvSpPr>
+        <p:spPr/>
+        <p:txBody>
+          <a:bodyPr/>
+          <a:lstStyle/>
+          <a:p>
+            <a:r>
+              <a:rPr lang="fr-FR" dirty="0" smtClean="0"/>
+              <a:t>MINE Nicolas</a:t>
+            </a:r>
+            <a:endParaRPr lang="fr-FR" dirty="0"/>
+          </a:p>
+        </p:txBody>
+      </p:sp>
+      <p:pic>
+        <p:nvPicPr>
+          <p:cNvPr id="2050" name="Picture 2" descr="F:\Nicolas\Documents\OpenClassRoom\P4\img\arima_2017.png"/>
+          <p:cNvPicPr>
+            <a:picLocks noChangeAspect="1" noChangeArrowheads="1"/>
+          </p:cNvPicPr>
+          <p:nvPr/>
+        </p:nvPicPr>
+        <p:blipFill rotWithShape="1">
+          <a:blip r:embed="rId2">
+            <a:clrChange>
+              <a:clrFrom>
+                <a:srgbClr val="FFFFFF"/>
+              </a:clrFrom>
+              <a:clrTo>
+                <a:srgbClr val="FFFFFF">
+                  <a:alpha val="0"/>
+                </a:srgbClr>
+              </a:clrTo>
+            </a:clrChange>
+            <a:extLst>
+              <a:ext uri="{28A0092B-C50C-407E-A947-70E740481C1C}">
+                <a14:useLocalDpi xmlns:a14="http://schemas.microsoft.com/office/drawing/2010/main" val="0"/>
+              </a:ext>
+            </a:extLst>
+          </a:blip>
+          <a:srcRect l="10324" t="10764" r="9584" b="7986"/>
+          <a:stretch/>
+        </p:blipFill>
+        <p:spPr bwMode="auto">
+          <a:xfrm>
+            <a:off x="395536" y="3068960"/>
+            <a:ext cx="8276853" cy="3358585"/>
+          </a:xfrm>
+          <a:prstGeom prst="rect">
+            <a:avLst/>
+          </a:prstGeom>
+          <a:noFill/>
+          <a:extLst>
+            <a:ext uri="{909E8E84-426E-40DD-AFC4-6F175D3DCCD1}">
+              <a14:hiddenFill xmlns:a14="http://schemas.microsoft.com/office/drawing/2010/main">
+                <a:solidFill>
+                  <a:srgbClr val="FFFFFF"/>
+                </a:solidFill>
+              </a14:hiddenFill>
+            </a:ext>
+          </a:extLst>
+        </p:spPr>
+      </p:pic>
+      <p:sp>
+        <p:nvSpPr>
+          <p:cNvPr id="6" name="ZoneTexte 5"/>
+          <p:cNvSpPr txBox="1"/>
+          <p:nvPr/>
+        </p:nvSpPr>
+        <p:spPr>
+          <a:xfrm>
+            <a:off x="6228184" y="1988840"/>
+            <a:ext cx="2088232" cy="646331"/>
+          </a:xfrm>
+          <a:prstGeom prst="rect">
+            <a:avLst/>
+          </a:prstGeom>
+          <a:noFill/>
+        </p:spPr>
+        <p:txBody>
+          <a:bodyPr wrap="square" rtlCol="0">
+            <a:spAutoFit/>
+          </a:bodyPr>
+          <a:lstStyle/>
+          <a:p>
+            <a:r>
+              <a:rPr lang="fr-FR" dirty="0"/>
+              <a:t>MAE : </a:t>
+            </a:r>
+            <a:r>
+              <a:rPr lang="fr-FR" dirty="0" smtClean="0"/>
+              <a:t>4.96</a:t>
+            </a:r>
+          </a:p>
+          <a:p>
+            <a:r>
+              <a:rPr lang="fr-FR" dirty="0"/>
+              <a:t>MSE : 52.62</a:t>
+            </a:r>
+          </a:p>
+        </p:txBody>
+      </p:sp>
+    </p:spTree>
+    <p:extLst>
+      <p:ext uri="{BB962C8B-B14F-4D97-AF65-F5344CB8AC3E}">
+        <p14:creationId xmlns:p14="http://schemas.microsoft.com/office/powerpoint/2010/main" val="430418501"/>
+      </p:ext>
+    </p:extLst>
+  </p:cSld>
+  <p:clrMapOvr>
+    <a:masterClrMapping/>
+  </p:clrMapOvr>
+  <p:timing>
+    <p:tnLst>
+      <p:par>
+        <p:cTn id="1" dur="indefinite" restart="never" nodeType="tmRoot"/>
+      </p:par>
+    </p:tnLst>
+  </p:timing>
+</p:sld>
+</file>
+
+<file path=ppt/slides/slide22.xml><?xml version="1.0" encoding="utf-8"?>
+<p:sld xmlns:a="http://schemas.openxmlformats.org/drawingml/2006/main" xmlns:r="http://schemas.openxmlformats.org/officeDocument/2006/relationships" xmlns:p="http://schemas.openxmlformats.org/presentationml/2006/main">
+  <p:cSld>
+    <p:spTree>
+      <p:nvGrpSpPr>
+        <p:cNvPr id="1" name=""/>
+        <p:cNvGrpSpPr/>
+        <p:nvPr/>
+      </p:nvGrpSpPr>
+      <p:grpSpPr>
+        <a:xfrm>
+          <a:off x="0" y="0"/>
+          <a:ext cx="0" cy="0"/>
+          <a:chOff x="0" y="0"/>
+          <a:chExt cx="0" cy="0"/>
+        </a:xfrm>
+      </p:grpSpPr>
+      <p:sp>
+        <p:nvSpPr>
+          <p:cNvPr id="2" name="Titre 1"/>
+          <p:cNvSpPr>
+            <a:spLocks noGrp="1"/>
+          </p:cNvSpPr>
+          <p:nvPr>
+            <p:ph type="title"/>
+          </p:nvPr>
+        </p:nvSpPr>
+        <p:spPr/>
+        <p:txBody>
+          <a:bodyPr/>
+          <a:lstStyle/>
+          <a:p>
+            <a:r>
+              <a:rPr lang="fr-FR" dirty="0" smtClean="0"/>
+              <a:t>Modélisation</a:t>
+            </a:r>
+            <a:endParaRPr lang="fr-FR" dirty="0"/>
+          </a:p>
+        </p:txBody>
+      </p:sp>
+      <p:sp>
+        <p:nvSpPr>
+          <p:cNvPr id="3" name="Espace réservé du contenu 2"/>
+          <p:cNvSpPr>
+            <a:spLocks noGrp="1"/>
+          </p:cNvSpPr>
+          <p:nvPr>
+            <p:ph idx="1"/>
+          </p:nvPr>
+        </p:nvSpPr>
+        <p:spPr/>
+        <p:txBody>
+          <a:bodyPr>
+            <a:normAutofit/>
+          </a:bodyPr>
+          <a:lstStyle/>
+          <a:p>
+            <a:r>
+              <a:rPr lang="fr-FR" sz="2800" dirty="0" smtClean="0">
+                <a:solidFill>
+                  <a:srgbClr val="E8750C"/>
+                </a:solidFill>
+              </a:rPr>
+              <a:t>API</a:t>
+            </a:r>
+          </a:p>
+          <a:p>
+            <a:pPr lvl="1"/>
+            <a:r>
+              <a:rPr lang="fr-FR" sz="2400" dirty="0" smtClean="0">
+                <a:solidFill>
+                  <a:srgbClr val="E8750C"/>
+                </a:solidFill>
+              </a:rPr>
+              <a:t>Petit site </a:t>
+            </a:r>
+            <a:r>
+              <a:rPr lang="fr-FR" sz="2400" dirty="0" err="1" smtClean="0">
+                <a:solidFill>
+                  <a:srgbClr val="E8750C"/>
+                </a:solidFill>
+              </a:rPr>
+              <a:t>Flask</a:t>
+            </a:r>
+            <a:endParaRPr lang="fr-FR" sz="2400" dirty="0" smtClean="0">
+              <a:solidFill>
+                <a:srgbClr val="E8750C"/>
+              </a:solidFill>
+            </a:endParaRPr>
+          </a:p>
+          <a:p>
+            <a:pPr lvl="2"/>
+            <a:r>
+              <a:rPr lang="fr-FR" sz="1800" dirty="0" smtClean="0">
+                <a:solidFill>
+                  <a:srgbClr val="E8750C"/>
+                </a:solidFill>
+              </a:rPr>
+              <a:t>Entrée</a:t>
+            </a:r>
+          </a:p>
+          <a:p>
+            <a:pPr lvl="3"/>
+            <a:r>
+              <a:rPr lang="fr-FR" sz="1400" dirty="0" smtClean="0">
+                <a:solidFill>
+                  <a:srgbClr val="E8750C"/>
+                </a:solidFill>
+              </a:rPr>
+              <a:t>Date du vol</a:t>
+            </a:r>
+          </a:p>
+          <a:p>
+            <a:pPr lvl="3"/>
+            <a:r>
+              <a:rPr lang="fr-FR" sz="1400" dirty="0" smtClean="0">
+                <a:solidFill>
+                  <a:srgbClr val="E8750C"/>
+                </a:solidFill>
+              </a:rPr>
+              <a:t>Heure du vol</a:t>
+            </a:r>
+          </a:p>
+          <a:p>
+            <a:pPr lvl="3"/>
+            <a:r>
+              <a:rPr lang="fr-FR" sz="1400" dirty="0" smtClean="0">
+                <a:solidFill>
+                  <a:srgbClr val="E8750C"/>
+                </a:solidFill>
+              </a:rPr>
+              <a:t>Compagnie</a:t>
+            </a:r>
+          </a:p>
+          <a:p>
+            <a:pPr lvl="3"/>
+            <a:r>
+              <a:rPr lang="fr-FR" sz="1400" dirty="0" smtClean="0">
+                <a:solidFill>
+                  <a:srgbClr val="E8750C"/>
+                </a:solidFill>
+              </a:rPr>
+              <a:t>Aéroport </a:t>
+            </a:r>
+            <a:r>
+              <a:rPr lang="fr-FR" sz="1400" dirty="0" smtClean="0">
+                <a:solidFill>
+                  <a:srgbClr val="E8750C"/>
+                </a:solidFill>
+              </a:rPr>
+              <a:t>de départ</a:t>
+            </a:r>
+          </a:p>
+          <a:p>
+            <a:pPr lvl="3"/>
+            <a:r>
+              <a:rPr lang="fr-FR" sz="1400" dirty="0" smtClean="0">
+                <a:solidFill>
+                  <a:srgbClr val="E8750C"/>
+                </a:solidFill>
+              </a:rPr>
+              <a:t>Aéroport </a:t>
+            </a:r>
+            <a:r>
+              <a:rPr lang="fr-FR" sz="1400" dirty="0" smtClean="0">
+                <a:solidFill>
+                  <a:srgbClr val="E8750C"/>
+                </a:solidFill>
+              </a:rPr>
+              <a:t>d’arrivé</a:t>
+            </a:r>
+          </a:p>
+          <a:p>
+            <a:pPr lvl="2"/>
+            <a:r>
+              <a:rPr lang="fr-FR" sz="1800" dirty="0" err="1" smtClean="0">
+                <a:solidFill>
+                  <a:srgbClr val="E8750C"/>
+                </a:solidFill>
+              </a:rPr>
+              <a:t>Requete</a:t>
+            </a:r>
+            <a:r>
+              <a:rPr lang="fr-FR" sz="1800" dirty="0" smtClean="0">
+                <a:solidFill>
+                  <a:srgbClr val="E8750C"/>
+                </a:solidFill>
+              </a:rPr>
+              <a:t> POST</a:t>
+            </a:r>
+          </a:p>
+          <a:p>
+            <a:pPr lvl="3"/>
+            <a:r>
+              <a:rPr lang="fr-FR" sz="1400" dirty="0" smtClean="0">
+                <a:solidFill>
+                  <a:srgbClr val="E8750C"/>
+                </a:solidFill>
+              </a:rPr>
+              <a:t>Pas de contrôle des inputs</a:t>
+            </a:r>
+          </a:p>
+          <a:p>
+            <a:pPr lvl="3"/>
+            <a:r>
+              <a:rPr lang="fr-FR" sz="1400" dirty="0" smtClean="0">
+                <a:solidFill>
+                  <a:srgbClr val="E8750C"/>
+                </a:solidFill>
+              </a:rPr>
+              <a:t>Encodage (OHE)</a:t>
+            </a:r>
+          </a:p>
+          <a:p>
+            <a:pPr lvl="3"/>
+            <a:r>
+              <a:rPr lang="fr-FR" sz="1400" dirty="0" err="1" smtClean="0">
+                <a:solidFill>
+                  <a:srgbClr val="E8750C"/>
+                </a:solidFill>
+              </a:rPr>
+              <a:t>Scaler</a:t>
+            </a:r>
+            <a:r>
+              <a:rPr lang="fr-FR" sz="1400" dirty="0" smtClean="0">
+                <a:solidFill>
+                  <a:srgbClr val="E8750C"/>
+                </a:solidFill>
+              </a:rPr>
+              <a:t> </a:t>
+            </a:r>
+            <a:r>
+              <a:rPr lang="fr-FR" sz="1400" dirty="0" err="1" smtClean="0">
+                <a:solidFill>
+                  <a:srgbClr val="E8750C"/>
+                </a:solidFill>
+              </a:rPr>
+              <a:t>saved</a:t>
+            </a:r>
+            <a:endParaRPr lang="fr-FR" sz="1400" dirty="0" smtClean="0">
+              <a:solidFill>
+                <a:srgbClr val="E8750C"/>
+              </a:solidFill>
+            </a:endParaRPr>
+          </a:p>
+          <a:p>
+            <a:pPr lvl="3"/>
+            <a:r>
+              <a:rPr lang="fr-FR" sz="1400" dirty="0" smtClean="0">
+                <a:solidFill>
+                  <a:srgbClr val="E8750C"/>
+                </a:solidFill>
+              </a:rPr>
+              <a:t>Modèle </a:t>
+            </a:r>
+            <a:r>
+              <a:rPr lang="fr-FR" sz="1400" dirty="0" err="1" smtClean="0">
+                <a:solidFill>
+                  <a:srgbClr val="E8750C"/>
+                </a:solidFill>
+              </a:rPr>
+              <a:t>saved</a:t>
+            </a:r>
+            <a:endParaRPr lang="fr-FR" sz="1400" dirty="0" smtClean="0">
+              <a:solidFill>
+                <a:srgbClr val="E8750C"/>
+              </a:solidFill>
+            </a:endParaRPr>
+          </a:p>
+          <a:p>
+            <a:pPr lvl="2"/>
+            <a:r>
+              <a:rPr lang="fr-FR" sz="1800" dirty="0" smtClean="0">
+                <a:solidFill>
+                  <a:srgbClr val="E8750C"/>
+                </a:solidFill>
+              </a:rPr>
+              <a:t>Sortie</a:t>
+            </a:r>
+          </a:p>
+          <a:p>
+            <a:pPr lvl="3"/>
+            <a:r>
+              <a:rPr lang="fr-FR" sz="1400" dirty="0" smtClean="0">
+                <a:solidFill>
+                  <a:srgbClr val="E8750C"/>
+                </a:solidFill>
+              </a:rPr>
+              <a:t>Retourne Avance/Retard</a:t>
+            </a:r>
+          </a:p>
+          <a:p>
+            <a:endParaRPr lang="fr-FR" dirty="0" smtClean="0">
+              <a:solidFill>
+                <a:srgbClr val="E8750C"/>
+              </a:solidFill>
+            </a:endParaRPr>
+          </a:p>
+        </p:txBody>
+      </p:sp>
+      <p:sp>
+        <p:nvSpPr>
+          <p:cNvPr id="4" name="Espace réservé de la date 3"/>
+          <p:cNvSpPr>
+            <a:spLocks noGrp="1"/>
+          </p:cNvSpPr>
+          <p:nvPr>
+            <p:ph type="dt" sz="half" idx="10"/>
+          </p:nvPr>
+        </p:nvSpPr>
+        <p:spPr/>
+        <p:txBody>
+          <a:bodyPr/>
+          <a:lstStyle/>
+          <a:p>
+            <a:fld id="{30547005-2CCE-4AAF-810C-C33FB4661996}" type="datetime1">
+              <a:rPr lang="fr-FR" smtClean="0"/>
+              <a:t>27/11/2017</a:t>
+            </a:fld>
+            <a:endParaRPr lang="fr-FR"/>
+          </a:p>
+        </p:txBody>
+      </p:sp>
+      <p:sp>
+        <p:nvSpPr>
+          <p:cNvPr id="5" name="Espace réservé du pied de page 4"/>
+          <p:cNvSpPr>
+            <a:spLocks noGrp="1"/>
+          </p:cNvSpPr>
+          <p:nvPr>
+            <p:ph type="ftr" sz="quarter" idx="11"/>
+          </p:nvPr>
+        </p:nvSpPr>
+        <p:spPr/>
+        <p:txBody>
+          <a:bodyPr/>
+          <a:lstStyle/>
+          <a:p>
+            <a:r>
+              <a:rPr lang="fr-FR" dirty="0" smtClean="0"/>
+              <a:t>MINE Nicolas</a:t>
+            </a:r>
+            <a:endParaRPr lang="fr-FR" dirty="0"/>
+          </a:p>
+        </p:txBody>
+      </p:sp>
+    </p:spTree>
+    <p:extLst>
+      <p:ext uri="{BB962C8B-B14F-4D97-AF65-F5344CB8AC3E}">
+        <p14:creationId xmlns:p14="http://schemas.microsoft.com/office/powerpoint/2010/main" val="912334235"/>
+      </p:ext>
+    </p:extLst>
+  </p:cSld>
+  <p:clrMapOvr>
+    <a:masterClrMapping/>
+  </p:clrMapOvr>
+  <p:timing>
+    <p:tnLst>
+      <p:par>
+        <p:cTn id="1" dur="indefinite" restart="never" nodeType="tmRoot"/>
+      </p:par>
+    </p:tnLst>
+  </p:timing>
+</p:sld>
+</file>
+
+<file path=ppt/slides/slide23.xml><?xml version="1.0" encoding="utf-8"?>
+<p:sld xmlns:a="http://schemas.openxmlformats.org/drawingml/2006/main" xmlns:r="http://schemas.openxmlformats.org/officeDocument/2006/relationships" xmlns:p="http://schemas.openxmlformats.org/presentationml/2006/main">
+  <p:cSld>
+    <p:spTree>
+      <p:nvGrpSpPr>
+        <p:cNvPr id="1" name=""/>
+        <p:cNvGrpSpPr/>
+        <p:nvPr/>
+      </p:nvGrpSpPr>
+      <p:grpSpPr>
+        <a:xfrm>
+          <a:off x="0" y="0"/>
+          <a:ext cx="0" cy="0"/>
+          <a:chOff x="0" y="0"/>
+          <a:chExt cx="0" cy="0"/>
+        </a:xfrm>
+      </p:grpSpPr>
+      <p:sp>
+        <p:nvSpPr>
+          <p:cNvPr id="2" name="Titre 1"/>
+          <p:cNvSpPr>
+            <a:spLocks noGrp="1"/>
+          </p:cNvSpPr>
+          <p:nvPr>
+            <p:ph type="title"/>
+          </p:nvPr>
+        </p:nvSpPr>
+        <p:spPr/>
+        <p:txBody>
+          <a:bodyPr/>
+          <a:lstStyle/>
+          <a:p>
+            <a:r>
+              <a:rPr lang="fr-FR" dirty="0" smtClean="0"/>
               <a:t>Conclusion</a:t>
             </a:r>
             <a:endParaRPr lang="fr-FR" dirty="0"/>
@@ -7843,7 +8878,7 @@
           <a:p>
             <a:fld id="{30547005-2CCE-4AAF-810C-C33FB4661996}" type="datetime1">
               <a:rPr lang="fr-FR" smtClean="0"/>
-              <a:t>23/11/2017</a:t>
+              <a:t>27/11/2017</a:t>
             </a:fld>
             <a:endParaRPr lang="fr-FR"/>
           </a:p>
@@ -8107,7 +9142,7 @@
           <a:p>
             <a:fld id="{30547005-2CCE-4AAF-810C-C33FB4661996}" type="datetime1">
               <a:rPr lang="fr-FR" smtClean="0"/>
-              <a:t>23/11/2017</a:t>
+              <a:t>27/11/2017</a:t>
             </a:fld>
             <a:endParaRPr lang="fr-FR"/>
           </a:p>
@@ -8547,7 +9582,7 @@
           <a:p>
             <a:fld id="{30547005-2CCE-4AAF-810C-C33FB4661996}" type="datetime1">
               <a:rPr lang="fr-FR" smtClean="0"/>
-              <a:t>23/11/2017</a:t>
+              <a:t>27/11/2017</a:t>
             </a:fld>
             <a:endParaRPr lang="fr-FR"/>
           </a:p>
@@ -8832,7 +9867,7 @@
           <a:p>
             <a:fld id="{30547005-2CCE-4AAF-810C-C33FB4661996}" type="datetime1">
               <a:rPr lang="fr-FR" smtClean="0"/>
-              <a:t>23/11/2017</a:t>
+              <a:t>27/11/2017</a:t>
             </a:fld>
             <a:endParaRPr lang="fr-FR"/>
           </a:p>
@@ -9141,7 +10176,7 @@
           <a:p>
             <a:fld id="{30547005-2CCE-4AAF-810C-C33FB4661996}" type="datetime1">
               <a:rPr lang="fr-FR" smtClean="0"/>
-              <a:t>23/11/2017</a:t>
+              <a:t>27/11/2017</a:t>
             </a:fld>
             <a:endParaRPr lang="fr-FR"/>
           </a:p>
@@ -9476,7 +10511,7 @@
           <a:p>
             <a:fld id="{30547005-2CCE-4AAF-810C-C33FB4661996}" type="datetime1">
               <a:rPr lang="fr-FR" smtClean="0"/>
-              <a:t>23/11/2017</a:t>
+              <a:t>27/11/2017</a:t>
             </a:fld>
             <a:endParaRPr lang="fr-FR"/>
           </a:p>
@@ -9952,7 +10987,7 @@
           <a:p>
             <a:fld id="{30547005-2CCE-4AAF-810C-C33FB4661996}" type="datetime1">
               <a:rPr lang="fr-FR" smtClean="0"/>
-              <a:t>23/11/2017</a:t>
+              <a:t>27/11/2017</a:t>
             </a:fld>
             <a:endParaRPr lang="fr-FR"/>
           </a:p>
@@ -10219,7 +11254,7 @@
           <a:p>
             <a:fld id="{30547005-2CCE-4AAF-810C-C33FB4661996}" type="datetime1">
               <a:rPr lang="fr-FR" smtClean="0"/>
-              <a:t>23/11/2017</a:t>
+              <a:t>27/11/2017</a:t>
             </a:fld>
             <a:endParaRPr lang="fr-FR"/>
           </a:p>

</xml_diff>

<commit_message>
Relecture du rapport + présentation
</commit_message>
<xml_diff>
--- a/P4/Presentation-projet_4.pptx
+++ b/P4/Presentation-projet_4.pptx
@@ -5,7 +5,7 @@
     <p:sldMasterId id="2147483648" r:id="rId1"/>
   </p:sldMasterIdLst>
   <p:notesMasterIdLst>
-    <p:notesMasterId r:id="rId39"/>
+    <p:notesMasterId r:id="rId41"/>
   </p:notesMasterIdLst>
   <p:sldIdLst>
     <p:sldId id="256" r:id="rId2"/>
@@ -33,18 +33,20 @@
     <p:sldId id="290" r:id="rId24"/>
     <p:sldId id="291" r:id="rId25"/>
     <p:sldId id="292" r:id="rId26"/>
-    <p:sldId id="279" r:id="rId27"/>
-    <p:sldId id="294" r:id="rId28"/>
-    <p:sldId id="295" r:id="rId29"/>
-    <p:sldId id="297" r:id="rId30"/>
-    <p:sldId id="296" r:id="rId31"/>
-    <p:sldId id="298" r:id="rId32"/>
-    <p:sldId id="293" r:id="rId33"/>
-    <p:sldId id="282" r:id="rId34"/>
-    <p:sldId id="283" r:id="rId35"/>
-    <p:sldId id="299" r:id="rId36"/>
-    <p:sldId id="280" r:id="rId37"/>
-    <p:sldId id="300" r:id="rId38"/>
+    <p:sldId id="294" r:id="rId27"/>
+    <p:sldId id="295" r:id="rId28"/>
+    <p:sldId id="301" r:id="rId29"/>
+    <p:sldId id="302" r:id="rId30"/>
+    <p:sldId id="297" r:id="rId31"/>
+    <p:sldId id="303" r:id="rId32"/>
+    <p:sldId id="296" r:id="rId33"/>
+    <p:sldId id="298" r:id="rId34"/>
+    <p:sldId id="293" r:id="rId35"/>
+    <p:sldId id="282" r:id="rId36"/>
+    <p:sldId id="283" r:id="rId37"/>
+    <p:sldId id="299" r:id="rId38"/>
+    <p:sldId id="280" r:id="rId39"/>
+    <p:sldId id="300" r:id="rId40"/>
   </p:sldIdLst>
   <p:sldSz cx="9144000" cy="6858000" type="screen4x3"/>
   <p:notesSz cx="6858000" cy="9144000"/>
@@ -228,7 +230,7 @@
           <a:p>
             <a:fld id="{E66492E5-39EF-4EC5-9E99-7F0DBC26806B}" type="datetimeFigureOut">
               <a:rPr lang="fr-FR" smtClean="0"/>
-              <a:t>02/12/2017</a:t>
+              <a:t>03/12/2017</a:t>
             </a:fld>
             <a:endParaRPr lang="fr-FR"/>
           </a:p>
@@ -761,7 +763,7 @@
           <a:p>
             <a:fld id="{2A35F02A-33DF-42A4-9F54-2DFA5B84052E}" type="datetime1">
               <a:rPr lang="fr-FR" smtClean="0"/>
-              <a:t>02/12/2017</a:t>
+              <a:t>03/12/2017</a:t>
             </a:fld>
             <a:endParaRPr lang="fr-FR"/>
           </a:p>
@@ -935,7 +937,7 @@
           <a:p>
             <a:fld id="{AA7084F6-C923-4306-BC74-6AA1A26D5992}" type="datetime1">
               <a:rPr lang="fr-FR" smtClean="0"/>
-              <a:t>02/12/2017</a:t>
+              <a:t>03/12/2017</a:t>
             </a:fld>
             <a:endParaRPr lang="fr-FR"/>
           </a:p>
@@ -1119,7 +1121,7 @@
           <a:p>
             <a:fld id="{6B9DA1C8-56AA-40E0-92DC-CCF13B41CFF7}" type="datetime1">
               <a:rPr lang="fr-FR" smtClean="0"/>
-              <a:t>02/12/2017</a:t>
+              <a:t>03/12/2017</a:t>
             </a:fld>
             <a:endParaRPr lang="fr-FR"/>
           </a:p>
@@ -1293,7 +1295,7 @@
           <a:p>
             <a:fld id="{30547005-2CCE-4AAF-810C-C33FB4661996}" type="datetime1">
               <a:rPr lang="fr-FR" smtClean="0"/>
-              <a:t>02/12/2017</a:t>
+              <a:t>03/12/2017</a:t>
             </a:fld>
             <a:endParaRPr lang="fr-FR"/>
           </a:p>
@@ -1543,7 +1545,7 @@
           <a:p>
             <a:fld id="{3EBD0647-CE4F-4B82-BC14-997434234D2E}" type="datetime1">
               <a:rPr lang="fr-FR" smtClean="0"/>
-              <a:t>02/12/2017</a:t>
+              <a:t>03/12/2017</a:t>
             </a:fld>
             <a:endParaRPr lang="fr-FR"/>
           </a:p>
@@ -1835,7 +1837,7 @@
           <a:p>
             <a:fld id="{263CA1C6-1D15-44B1-8495-DE2EC5425D2F}" type="datetime1">
               <a:rPr lang="fr-FR" smtClean="0"/>
-              <a:t>02/12/2017</a:t>
+              <a:t>03/12/2017</a:t>
             </a:fld>
             <a:endParaRPr lang="fr-FR"/>
           </a:p>
@@ -2261,7 +2263,7 @@
           <a:p>
             <a:fld id="{5F86B07A-1301-4558-A6E0-D7A436826ECB}" type="datetime1">
               <a:rPr lang="fr-FR" smtClean="0"/>
-              <a:t>02/12/2017</a:t>
+              <a:t>03/12/2017</a:t>
             </a:fld>
             <a:endParaRPr lang="fr-FR"/>
           </a:p>
@@ -2383,7 +2385,7 @@
           <a:p>
             <a:fld id="{10CD6315-9A1E-41E9-BC28-33D394163B67}" type="datetime1">
               <a:rPr lang="fr-FR" smtClean="0"/>
-              <a:t>02/12/2017</a:t>
+              <a:t>03/12/2017</a:t>
             </a:fld>
             <a:endParaRPr lang="fr-FR"/>
           </a:p>
@@ -2482,7 +2484,7 @@
           <a:p>
             <a:fld id="{8EA7A85C-1960-4CA0-B72B-A39E81C20158}" type="datetime1">
               <a:rPr lang="fr-FR" smtClean="0"/>
-              <a:t>02/12/2017</a:t>
+              <a:t>03/12/2017</a:t>
             </a:fld>
             <a:endParaRPr lang="fr-FR"/>
           </a:p>
@@ -2763,7 +2765,7 @@
           <a:p>
             <a:fld id="{885A14C0-C539-4FC5-A6ED-ABABD975303B}" type="datetime1">
               <a:rPr lang="fr-FR" smtClean="0"/>
-              <a:t>02/12/2017</a:t>
+              <a:t>03/12/2017</a:t>
             </a:fld>
             <a:endParaRPr lang="fr-FR"/>
           </a:p>
@@ -3020,7 +3022,7 @@
           <a:p>
             <a:fld id="{D772F3C9-8121-4DF6-9420-FBC4A08EF57A}" type="datetime1">
               <a:rPr lang="fr-FR" smtClean="0"/>
-              <a:t>02/12/2017</a:t>
+              <a:t>03/12/2017</a:t>
             </a:fld>
             <a:endParaRPr lang="fr-FR"/>
           </a:p>
@@ -3258,7 +3260,7 @@
           <a:p>
             <a:fld id="{C13329EF-B01B-4D4B-83A1-AFBB7696C373}" type="datetime1">
               <a:rPr lang="fr-FR" smtClean="0"/>
-              <a:t>02/12/2017</a:t>
+              <a:t>03/12/2017</a:t>
             </a:fld>
             <a:endParaRPr lang="fr-FR"/>
           </a:p>
@@ -3697,8 +3699,8 @@
         </p:nvSpPr>
         <p:spPr>
           <a:xfrm>
-            <a:off x="1259632" y="2664495"/>
-            <a:ext cx="6624736" cy="1752600"/>
+            <a:off x="899592" y="2664495"/>
+            <a:ext cx="7272808" cy="1752600"/>
           </a:xfrm>
         </p:spPr>
         <p:txBody>
@@ -3717,13 +3719,22 @@
           </a:p>
           <a:p>
             <a:r>
+              <a:rPr lang="fr-FR" dirty="0" smtClean="0">
+                <a:solidFill>
+                  <a:srgbClr val="E8750C"/>
+                </a:solidFill>
+                <a:latin typeface="Lato" pitchFamily="34" charset="0"/>
+              </a:rPr>
+              <a:t>Anticipation du </a:t>
+            </a:r>
+            <a:r>
               <a:rPr lang="fr-FR" dirty="0">
                 <a:solidFill>
                   <a:srgbClr val="E8750C"/>
                 </a:solidFill>
                 <a:latin typeface="Lato" pitchFamily="34" charset="0"/>
               </a:rPr>
-              <a:t>Anticipez le retard de vol des avions</a:t>
+              <a:t>retard de vol des avions</a:t>
             </a:r>
           </a:p>
         </p:txBody>
@@ -3749,7 +3760,7 @@
                   <a:srgbClr val="95023C"/>
                 </a:solidFill>
               </a:rPr>
-              <a:t>02/12/2017</a:t>
+              <a:t>03/12/2017</a:t>
             </a:fld>
             <a:endParaRPr lang="fr-FR" dirty="0">
               <a:solidFill>
@@ -4086,7 +4097,7 @@
           <a:p>
             <a:fld id="{30547005-2CCE-4AAF-810C-C33FB4661996}" type="datetime1">
               <a:rPr lang="fr-FR" smtClean="0"/>
-              <a:t>02/12/2017</a:t>
+              <a:t>03/12/2017</a:t>
             </a:fld>
             <a:endParaRPr lang="fr-FR"/>
           </a:p>
@@ -4318,7 +4329,7 @@
           <a:p>
             <a:fld id="{30547005-2CCE-4AAF-810C-C33FB4661996}" type="datetime1">
               <a:rPr lang="fr-FR" smtClean="0"/>
-              <a:t>02/12/2017</a:t>
+              <a:t>03/12/2017</a:t>
             </a:fld>
             <a:endParaRPr lang="fr-FR"/>
           </a:p>
@@ -4599,7 +4610,7 @@
           <a:p>
             <a:fld id="{30547005-2CCE-4AAF-810C-C33FB4661996}" type="datetime1">
               <a:rPr lang="fr-FR" smtClean="0"/>
-              <a:t>02/12/2017</a:t>
+              <a:t>03/12/2017</a:t>
             </a:fld>
             <a:endParaRPr lang="fr-FR"/>
           </a:p>
@@ -4882,7 +4893,7 @@
           <a:p>
             <a:fld id="{30547005-2CCE-4AAF-810C-C33FB4661996}" type="datetime1">
               <a:rPr lang="fr-FR" smtClean="0"/>
-              <a:t>02/12/2017</a:t>
+              <a:t>03/12/2017</a:t>
             </a:fld>
             <a:endParaRPr lang="fr-FR"/>
           </a:p>
@@ -5163,7 +5174,7 @@
           <a:p>
             <a:fld id="{30547005-2CCE-4AAF-810C-C33FB4661996}" type="datetime1">
               <a:rPr lang="fr-FR" smtClean="0"/>
-              <a:t>02/12/2017</a:t>
+              <a:t>03/12/2017</a:t>
             </a:fld>
             <a:endParaRPr lang="fr-FR"/>
           </a:p>
@@ -5678,7 +5689,7 @@
           <a:p>
             <a:fld id="{30547005-2CCE-4AAF-810C-C33FB4661996}" type="datetime1">
               <a:rPr lang="fr-FR" smtClean="0"/>
-              <a:t>02/12/2017</a:t>
+              <a:t>03/12/2017</a:t>
             </a:fld>
             <a:endParaRPr lang="fr-FR"/>
           </a:p>
@@ -6004,7 +6015,7 @@
           <a:p>
             <a:fld id="{30547005-2CCE-4AAF-810C-C33FB4661996}" type="datetime1">
               <a:rPr lang="fr-FR" smtClean="0"/>
-              <a:t>02/12/2017</a:t>
+              <a:t>03/12/2017</a:t>
             </a:fld>
             <a:endParaRPr lang="fr-FR"/>
           </a:p>
@@ -6378,7 +6389,7 @@
           <a:p>
             <a:fld id="{30547005-2CCE-4AAF-810C-C33FB4661996}" type="datetime1">
               <a:rPr lang="fr-FR" smtClean="0"/>
-              <a:t>02/12/2017</a:t>
+              <a:t>03/12/2017</a:t>
             </a:fld>
             <a:endParaRPr lang="fr-FR"/>
           </a:p>
@@ -6736,7 +6747,7 @@
           <a:p>
             <a:fld id="{30547005-2CCE-4AAF-810C-C33FB4661996}" type="datetime1">
               <a:rPr lang="fr-FR" smtClean="0"/>
-              <a:t>02/12/2017</a:t>
+              <a:t>03/12/2017</a:t>
             </a:fld>
             <a:endParaRPr lang="fr-FR"/>
           </a:p>
@@ -7297,7 +7308,7 @@
           <a:p>
             <a:fld id="{30547005-2CCE-4AAF-810C-C33FB4661996}" type="datetime1">
               <a:rPr lang="fr-FR" smtClean="0"/>
-              <a:t>02/12/2017</a:t>
+              <a:t>03/12/2017</a:t>
             </a:fld>
             <a:endParaRPr lang="fr-FR"/>
           </a:p>
@@ -7840,7 +7851,7 @@
           <a:p>
             <a:fld id="{30547005-2CCE-4AAF-810C-C33FB4661996}" type="datetime1">
               <a:rPr lang="fr-FR" smtClean="0"/>
-              <a:t>02/12/2017</a:t>
+              <a:t>03/12/2017</a:t>
             </a:fld>
             <a:endParaRPr lang="fr-FR"/>
           </a:p>
@@ -8030,20 +8041,12 @@
           <a:p>
             <a:pPr lvl="1"/>
             <a:r>
-              <a:rPr lang="fr-FR" sz="1800" dirty="0" err="1" smtClean="0">
-                <a:solidFill>
-                  <a:srgbClr val="E8750C"/>
-                </a:solidFill>
-              </a:rPr>
-              <a:t>Trim</a:t>
-            </a:r>
-            <a:r>
               <a:rPr lang="fr-FR" sz="1800" dirty="0" smtClean="0">
                 <a:solidFill>
                   <a:srgbClr val="E8750C"/>
                 </a:solidFill>
               </a:rPr>
-              <a:t> avance à 0</a:t>
+              <a:t>Retard = max(retard, 0)</a:t>
             </a:r>
             <a:endParaRPr lang="fr-FR" sz="1800" dirty="0">
               <a:solidFill>
@@ -8112,7 +8115,7 @@
           <a:p>
             <a:fld id="{30547005-2CCE-4AAF-810C-C33FB4661996}" type="datetime1">
               <a:rPr lang="fr-FR" smtClean="0"/>
-              <a:t>02/12/2017</a:t>
+              <a:t>03/12/2017</a:t>
             </a:fld>
             <a:endParaRPr lang="fr-FR"/>
           </a:p>
@@ -8474,7 +8477,7 @@
           <a:p>
             <a:fld id="{30547005-2CCE-4AAF-810C-C33FB4661996}" type="datetime1">
               <a:rPr lang="fr-FR" smtClean="0"/>
-              <a:t>02/12/2017</a:t>
+              <a:t>03/12/2017</a:t>
             </a:fld>
             <a:endParaRPr lang="fr-FR"/>
           </a:p>
@@ -8619,18 +8622,13 @@
           <a:lstStyle/>
           <a:p>
             <a:r>
-              <a:rPr lang="fr-FR" sz="2400" dirty="0" err="1" smtClean="0">
-                <a:solidFill>
-                  <a:srgbClr val="E8750C"/>
-                </a:solidFill>
-              </a:rPr>
-              <a:t>Aggrégation</a:t>
-            </a:r>
-            <a:endParaRPr lang="fr-FR" sz="2400" dirty="0" smtClean="0">
-              <a:solidFill>
-                <a:srgbClr val="E8750C"/>
-              </a:solidFill>
-            </a:endParaRPr>
+              <a:rPr lang="fr-FR" sz="2400" dirty="0" smtClean="0">
+                <a:solidFill>
+                  <a:srgbClr val="E8750C"/>
+                </a:solidFill>
+              </a:rPr>
+              <a:t>Agrégation</a:t>
+            </a:r>
           </a:p>
           <a:p>
             <a:pPr lvl="1"/>
@@ -8796,7 +8794,7 @@
           <a:p>
             <a:fld id="{30547005-2CCE-4AAF-810C-C33FB4661996}" type="datetime1">
               <a:rPr lang="fr-FR" smtClean="0"/>
-              <a:t>02/12/2017</a:t>
+              <a:t>03/12/2017</a:t>
             </a:fld>
             <a:endParaRPr lang="fr-FR"/>
           </a:p>
@@ -8833,7 +8831,7 @@
         </p:nvSpPr>
         <p:spPr>
           <a:xfrm>
-            <a:off x="5004048" y="2564904"/>
+            <a:off x="5292080" y="2564904"/>
             <a:ext cx="3960440" cy="2308324"/>
           </a:xfrm>
           <a:prstGeom prst="rect">
@@ -8996,7 +8994,7 @@
           <a:p>
             <a:fld id="{30547005-2CCE-4AAF-810C-C33FB4661996}" type="datetime1">
               <a:rPr lang="fr-FR" smtClean="0"/>
-              <a:t>02/12/2017</a:t>
+              <a:t>03/12/2017</a:t>
             </a:fld>
             <a:endParaRPr lang="fr-FR" dirty="0"/>
           </a:p>
@@ -9166,7 +9164,7 @@
           <a:p>
             <a:fld id="{30547005-2CCE-4AAF-810C-C33FB4661996}" type="datetime1">
               <a:rPr lang="fr-FR" smtClean="0"/>
-              <a:t>02/12/2017</a:t>
+              <a:t>03/12/2017</a:t>
             </a:fld>
             <a:endParaRPr lang="fr-FR" dirty="0"/>
           </a:p>
@@ -9336,7 +9334,7 @@
           <a:p>
             <a:fld id="{30547005-2CCE-4AAF-810C-C33FB4661996}" type="datetime1">
               <a:rPr lang="fr-FR" smtClean="0"/>
-              <a:t>02/12/2017</a:t>
+              <a:t>03/12/2017</a:t>
             </a:fld>
             <a:endParaRPr lang="fr-FR" dirty="0"/>
           </a:p>
@@ -9537,7 +9535,7 @@
           <a:p>
             <a:fld id="{30547005-2CCE-4AAF-810C-C33FB4661996}" type="datetime1">
               <a:rPr lang="fr-FR" smtClean="0"/>
-              <a:t>02/12/2017</a:t>
+              <a:t>03/12/2017</a:t>
             </a:fld>
             <a:endParaRPr lang="fr-FR"/>
           </a:p>
@@ -9568,7 +9566,7 @@
       </p:sp>
       <p:pic>
         <p:nvPicPr>
-          <p:cNvPr id="8194" name="Picture 2" descr="weight_week"/>
+          <p:cNvPr id="1026" name="Picture 2" descr="F:\Nicolas\Documents\OpenClassRoom\P4\img\weight_week.png"/>
           <p:cNvPicPr>
             <a:picLocks noChangeAspect="1" noChangeArrowheads="1"/>
           </p:cNvPicPr>
@@ -9592,23 +9590,20 @@
               </a:ext>
             </a:extLst>
           </a:blip>
-          <a:srcRect l="8792" t="8275" r="8913" b="8459"/>
+          <a:srcRect/>
           <a:stretch>
             <a:fillRect/>
           </a:stretch>
         </p:blipFill>
         <p:spPr bwMode="auto">
           <a:xfrm>
-            <a:off x="1202422" y="2250740"/>
-            <a:ext cx="6768752" cy="4111310"/>
+            <a:off x="107504" y="1599996"/>
+            <a:ext cx="8856984" cy="5314191"/>
           </a:xfrm>
           <a:prstGeom prst="rect">
             <a:avLst/>
           </a:prstGeom>
           <a:noFill/>
-          <a:ln>
-            <a:noFill/>
-          </a:ln>
           <a:extLst>
             <a:ext uri="{909E8E84-426E-40DD-AFC4-6F175D3DCCD1}">
               <a14:hiddenFill xmlns:a14="http://schemas.microsoft.com/office/drawing/2010/main">
@@ -9616,16 +9611,6 @@
                   <a:srgbClr val="FFFFFF"/>
                 </a:solidFill>
               </a14:hiddenFill>
-            </a:ext>
-            <a:ext uri="{91240B29-F687-4F45-9708-019B960494DF}">
-              <a14:hiddenLine xmlns:a14="http://schemas.microsoft.com/office/drawing/2010/main" w="9525">
-                <a:solidFill>
-                  <a:srgbClr val="000000"/>
-                </a:solidFill>
-                <a:miter lim="800000"/>
-                <a:headEnd/>
-                <a:tailEnd/>
-              </a14:hiddenLine>
             </a:ext>
           </a:extLst>
         </p:spPr>
@@ -9633,7 +9618,7 @@
     </p:spTree>
     <p:extLst>
       <p:ext uri="{BB962C8B-B14F-4D97-AF65-F5344CB8AC3E}">
-        <p14:creationId xmlns:p14="http://schemas.microsoft.com/office/powerpoint/2010/main" val="3890809824"/>
+        <p14:creationId xmlns:p14="http://schemas.microsoft.com/office/powerpoint/2010/main" val="1331139642"/>
       </p:ext>
     </p:extLst>
   </p:cSld>
@@ -9738,7 +9723,7 @@
           <a:p>
             <a:fld id="{30547005-2CCE-4AAF-810C-C33FB4661996}" type="datetime1">
               <a:rPr lang="fr-FR" smtClean="0"/>
-              <a:t>02/12/2017</a:t>
+              <a:t>03/12/2017</a:t>
             </a:fld>
             <a:endParaRPr lang="fr-FR"/>
           </a:p>
@@ -9769,7 +9754,7 @@
       </p:sp>
       <p:pic>
         <p:nvPicPr>
-          <p:cNvPr id="9218" name="Picture 2" descr="weight_compagnie"/>
+          <p:cNvPr id="2050" name="Picture 2" descr="F:\Nicolas\Documents\OpenClassRoom\P4\img\weight_day.png"/>
           <p:cNvPicPr>
             <a:picLocks noChangeAspect="1" noChangeArrowheads="1"/>
           </p:cNvPicPr>
@@ -9793,23 +9778,20 @@
               </a:ext>
             </a:extLst>
           </a:blip>
-          <a:srcRect l="8925" t="9123" r="8791" b="8920"/>
+          <a:srcRect/>
           <a:stretch>
             <a:fillRect/>
           </a:stretch>
         </p:blipFill>
         <p:spPr bwMode="auto">
           <a:xfrm>
-            <a:off x="1043608" y="2148888"/>
-            <a:ext cx="6984776" cy="4180994"/>
+            <a:off x="154807" y="1671584"/>
+            <a:ext cx="8809681" cy="5285808"/>
           </a:xfrm>
           <a:prstGeom prst="rect">
             <a:avLst/>
           </a:prstGeom>
           <a:noFill/>
-          <a:ln>
-            <a:noFill/>
-          </a:ln>
           <a:extLst>
             <a:ext uri="{909E8E84-426E-40DD-AFC4-6F175D3DCCD1}">
               <a14:hiddenFill xmlns:a14="http://schemas.microsoft.com/office/drawing/2010/main">
@@ -9817,16 +9799,6 @@
                   <a:srgbClr val="FFFFFF"/>
                 </a:solidFill>
               </a14:hiddenFill>
-            </a:ext>
-            <a:ext uri="{91240B29-F687-4F45-9708-019B960494DF}">
-              <a14:hiddenLine xmlns:a14="http://schemas.microsoft.com/office/drawing/2010/main" w="9525">
-                <a:solidFill>
-                  <a:srgbClr val="000000"/>
-                </a:solidFill>
-                <a:miter lim="800000"/>
-                <a:headEnd/>
-                <a:tailEnd/>
-              </a14:hiddenLine>
             </a:ext>
           </a:extLst>
         </p:spPr>
@@ -9939,7 +9911,7 @@
           <a:p>
             <a:fld id="{30547005-2CCE-4AAF-810C-C33FB4661996}" type="datetime1">
               <a:rPr lang="fr-FR" smtClean="0"/>
-              <a:t>02/12/2017</a:t>
+              <a:t>03/12/2017</a:t>
             </a:fld>
             <a:endParaRPr lang="fr-FR"/>
           </a:p>
@@ -9970,7 +9942,7 @@
       </p:sp>
       <p:pic>
         <p:nvPicPr>
-          <p:cNvPr id="10242" name="Picture 2" descr="weight_day"/>
+          <p:cNvPr id="2050" name="Picture 2"/>
           <p:cNvPicPr>
             <a:picLocks noChangeAspect="1" noChangeArrowheads="1"/>
           </p:cNvPicPr>
@@ -9994,23 +9966,19 @@
               </a:ext>
             </a:extLst>
           </a:blip>
-          <a:srcRect l="7397" t="8478" r="8791" b="8498"/>
           <a:stretch>
             <a:fillRect/>
           </a:stretch>
         </p:blipFill>
         <p:spPr bwMode="auto">
           <a:xfrm>
-            <a:off x="1115616" y="2204864"/>
-            <a:ext cx="6912768" cy="4117566"/>
+            <a:off x="154807" y="1671584"/>
+            <a:ext cx="8809680" cy="5285808"/>
           </a:xfrm>
           <a:prstGeom prst="rect">
             <a:avLst/>
           </a:prstGeom>
           <a:noFill/>
-          <a:ln>
-            <a:noFill/>
-          </a:ln>
           <a:extLst>
             <a:ext uri="{909E8E84-426E-40DD-AFC4-6F175D3DCCD1}">
               <a14:hiddenFill xmlns:a14="http://schemas.microsoft.com/office/drawing/2010/main">
@@ -10018,16 +9986,6 @@
                   <a:srgbClr val="FFFFFF"/>
                 </a:solidFill>
               </a14:hiddenFill>
-            </a:ext>
-            <a:ext uri="{91240B29-F687-4F45-9708-019B960494DF}">
-              <a14:hiddenLine xmlns:a14="http://schemas.microsoft.com/office/drawing/2010/main" w="9525">
-                <a:solidFill>
-                  <a:srgbClr val="000000"/>
-                </a:solidFill>
-                <a:miter lim="800000"/>
-                <a:headEnd/>
-                <a:tailEnd/>
-              </a14:hiddenLine>
             </a:ext>
           </a:extLst>
         </p:spPr>
@@ -10035,7 +9993,7 @@
     </p:spTree>
     <p:extLst>
       <p:ext uri="{BB962C8B-B14F-4D97-AF65-F5344CB8AC3E}">
-        <p14:creationId xmlns:p14="http://schemas.microsoft.com/office/powerpoint/2010/main" val="1331139642"/>
+        <p14:creationId xmlns:p14="http://schemas.microsoft.com/office/powerpoint/2010/main" val="2013571877"/>
       </p:ext>
     </p:extLst>
   </p:cSld>
@@ -10108,12 +10066,12 @@
           <a:lstStyle/>
           <a:p>
             <a:r>
-              <a:rPr lang="fr-FR" dirty="0" err="1" smtClean="0">
-                <a:solidFill>
-                  <a:srgbClr val="E8750C"/>
-                </a:solidFill>
-              </a:rPr>
-              <a:t>Boosting</a:t>
+              <a:rPr lang="fr-FR" dirty="0" smtClean="0">
+                <a:solidFill>
+                  <a:srgbClr val="E8750C"/>
+                </a:solidFill>
+              </a:rPr>
+              <a:t>SGDR – OHE vs non OHE</a:t>
             </a:r>
             <a:endParaRPr lang="fr-FR" dirty="0">
               <a:solidFill>
@@ -10140,7 +10098,458 @@
           <a:p>
             <a:fld id="{30547005-2CCE-4AAF-810C-C33FB4661996}" type="datetime1">
               <a:rPr lang="fr-FR" smtClean="0"/>
-              <a:t>02/12/2017</a:t>
+              <a:t>03/12/2017</a:t>
+            </a:fld>
+            <a:endParaRPr lang="fr-FR"/>
+          </a:p>
+        </p:txBody>
+      </p:sp>
+      <p:sp>
+        <p:nvSpPr>
+          <p:cNvPr id="5" name="Espace réservé du pied de page 4"/>
+          <p:cNvSpPr>
+            <a:spLocks noGrp="1"/>
+          </p:cNvSpPr>
+          <p:nvPr>
+            <p:ph type="ftr" sz="quarter" idx="11"/>
+          </p:nvPr>
+        </p:nvSpPr>
+        <p:spPr/>
+        <p:txBody>
+          <a:bodyPr/>
+          <a:lstStyle/>
+          <a:p>
+            <a:r>
+              <a:rPr lang="fr-FR" dirty="0" smtClean="0"/>
+              <a:t>MINE Nicolas</a:t>
+            </a:r>
+            <a:endParaRPr lang="fr-FR" dirty="0"/>
+          </a:p>
+        </p:txBody>
+      </p:sp>
+      <p:pic>
+        <p:nvPicPr>
+          <p:cNvPr id="2050" name="Picture 2"/>
+          <p:cNvPicPr>
+            <a:picLocks noChangeAspect="1" noChangeArrowheads="1"/>
+          </p:cNvPicPr>
+          <p:nvPr/>
+        </p:nvPicPr>
+        <p:blipFill>
+          <a:blip r:embed="rId2">
+            <a:clrChange>
+              <a:clrFrom>
+                <a:srgbClr val="FFFFFF"/>
+              </a:clrFrom>
+              <a:clrTo>
+                <a:srgbClr val="FFFFFF">
+                  <a:alpha val="0"/>
+                </a:srgbClr>
+              </a:clrTo>
+            </a:clrChange>
+            <a:extLst>
+              <a:ext uri="{28A0092B-C50C-407E-A947-70E740481C1C}">
+                <a14:useLocalDpi xmlns:a14="http://schemas.microsoft.com/office/drawing/2010/main" val="0"/>
+              </a:ext>
+            </a:extLst>
+          </a:blip>
+          <a:stretch>
+            <a:fillRect/>
+          </a:stretch>
+        </p:blipFill>
+        <p:spPr bwMode="auto">
+          <a:xfrm>
+            <a:off x="154807" y="1671584"/>
+            <a:ext cx="8809680" cy="5285807"/>
+          </a:xfrm>
+          <a:prstGeom prst="rect">
+            <a:avLst/>
+          </a:prstGeom>
+          <a:noFill/>
+          <a:extLst>
+            <a:ext uri="{909E8E84-426E-40DD-AFC4-6F175D3DCCD1}">
+              <a14:hiddenFill xmlns:a14="http://schemas.microsoft.com/office/drawing/2010/main">
+                <a:solidFill>
+                  <a:srgbClr val="FFFFFF"/>
+                </a:solidFill>
+              </a14:hiddenFill>
+            </a:ext>
+          </a:extLst>
+        </p:spPr>
+      </p:pic>
+    </p:spTree>
+    <p:extLst>
+      <p:ext uri="{BB962C8B-B14F-4D97-AF65-F5344CB8AC3E}">
+        <p14:creationId xmlns:p14="http://schemas.microsoft.com/office/powerpoint/2010/main" val="809496895"/>
+      </p:ext>
+    </p:extLst>
+  </p:cSld>
+  <p:clrMapOvr>
+    <a:masterClrMapping/>
+  </p:clrMapOvr>
+  <p:timing>
+    <p:tnLst>
+      <p:par>
+        <p:cTn id="1" dur="indefinite" restart="never" nodeType="tmRoot"/>
+      </p:par>
+    </p:tnLst>
+  </p:timing>
+</p:sld>
+</file>
+
+<file path=ppt/slides/slide3.xml><?xml version="1.0" encoding="utf-8"?>
+<p:sld xmlns:a="http://schemas.openxmlformats.org/drawingml/2006/main" xmlns:r="http://schemas.openxmlformats.org/officeDocument/2006/relationships" xmlns:p="http://schemas.openxmlformats.org/presentationml/2006/main">
+  <p:cSld>
+    <p:spTree>
+      <p:nvGrpSpPr>
+        <p:cNvPr id="1" name=""/>
+        <p:cNvGrpSpPr/>
+        <p:nvPr/>
+      </p:nvGrpSpPr>
+      <p:grpSpPr>
+        <a:xfrm>
+          <a:off x="0" y="0"/>
+          <a:ext cx="0" cy="0"/>
+          <a:chOff x="0" y="0"/>
+          <a:chExt cx="0" cy="0"/>
+        </a:xfrm>
+      </p:grpSpPr>
+      <p:sp>
+        <p:nvSpPr>
+          <p:cNvPr id="2" name="Titre 1"/>
+          <p:cNvSpPr>
+            <a:spLocks noGrp="1"/>
+          </p:cNvSpPr>
+          <p:nvPr>
+            <p:ph type="title"/>
+          </p:nvPr>
+        </p:nvSpPr>
+        <p:spPr/>
+        <p:txBody>
+          <a:bodyPr/>
+          <a:lstStyle/>
+          <a:p>
+            <a:r>
+              <a:rPr lang="fr-FR" dirty="0" smtClean="0"/>
+              <a:t>Présentation</a:t>
+            </a:r>
+            <a:endParaRPr lang="fr-FR" dirty="0"/>
+          </a:p>
+        </p:txBody>
+      </p:sp>
+      <p:sp>
+        <p:nvSpPr>
+          <p:cNvPr id="3" name="Espace réservé du contenu 2"/>
+          <p:cNvSpPr>
+            <a:spLocks noGrp="1"/>
+          </p:cNvSpPr>
+          <p:nvPr>
+            <p:ph idx="1"/>
+          </p:nvPr>
+        </p:nvSpPr>
+        <p:spPr/>
+        <p:txBody>
+          <a:bodyPr>
+            <a:normAutofit fontScale="77500" lnSpcReduction="20000"/>
+          </a:bodyPr>
+          <a:lstStyle/>
+          <a:p>
+            <a:r>
+              <a:rPr lang="fr-FR" dirty="0" smtClean="0">
+                <a:solidFill>
+                  <a:srgbClr val="E8750C"/>
+                </a:solidFill>
+              </a:rPr>
+              <a:t>Entrée</a:t>
+            </a:r>
+          </a:p>
+          <a:p>
+            <a:pPr lvl="1"/>
+            <a:r>
+              <a:rPr lang="fr-FR" dirty="0" smtClean="0">
+                <a:solidFill>
+                  <a:srgbClr val="E8750C"/>
+                </a:solidFill>
+              </a:rPr>
+              <a:t>Données concernant les vols (USA)</a:t>
+            </a:r>
+          </a:p>
+          <a:p>
+            <a:pPr lvl="1"/>
+            <a:r>
+              <a:rPr lang="fr-FR" dirty="0" smtClean="0">
+                <a:solidFill>
+                  <a:srgbClr val="E8750C"/>
+                </a:solidFill>
+              </a:rPr>
+              <a:t>1 an</a:t>
+            </a:r>
+          </a:p>
+          <a:p>
+            <a:pPr lvl="1"/>
+            <a:r>
+              <a:rPr lang="fr-FR" dirty="0" smtClean="0">
+                <a:solidFill>
+                  <a:srgbClr val="E8750C"/>
+                </a:solidFill>
+              </a:rPr>
+              <a:t>5,6 millions de vols</a:t>
+            </a:r>
+          </a:p>
+          <a:p>
+            <a:pPr lvl="1"/>
+            <a:r>
+              <a:rPr lang="fr-FR" dirty="0" smtClean="0">
+                <a:solidFill>
+                  <a:srgbClr val="E8750C"/>
+                </a:solidFill>
+              </a:rPr>
+              <a:t>65 </a:t>
+            </a:r>
+            <a:r>
+              <a:rPr lang="fr-FR" dirty="0" err="1" smtClean="0">
+                <a:solidFill>
+                  <a:srgbClr val="E8750C"/>
+                </a:solidFill>
+              </a:rPr>
+              <a:t>features</a:t>
+            </a:r>
+            <a:endParaRPr lang="fr-FR" dirty="0" smtClean="0">
+              <a:solidFill>
+                <a:srgbClr val="E8750C"/>
+              </a:solidFill>
+            </a:endParaRPr>
+          </a:p>
+          <a:p>
+            <a:pPr lvl="1"/>
+            <a:r>
+              <a:rPr lang="fr-FR" dirty="0" smtClean="0">
+                <a:solidFill>
+                  <a:srgbClr val="E8750C"/>
+                </a:solidFill>
+              </a:rPr>
+              <a:t>Aucune donnée manquante</a:t>
+            </a:r>
+          </a:p>
+          <a:p>
+            <a:endParaRPr lang="fr-FR" dirty="0">
+              <a:solidFill>
+                <a:srgbClr val="E8750C"/>
+              </a:solidFill>
+            </a:endParaRPr>
+          </a:p>
+          <a:p>
+            <a:r>
+              <a:rPr lang="fr-FR" dirty="0" smtClean="0">
+                <a:solidFill>
+                  <a:srgbClr val="E8750C"/>
+                </a:solidFill>
+              </a:rPr>
+              <a:t>Objectifs</a:t>
+            </a:r>
+          </a:p>
+          <a:p>
+            <a:pPr lvl="1"/>
+            <a:r>
+              <a:rPr lang="fr-FR" dirty="0" smtClean="0">
+                <a:solidFill>
+                  <a:srgbClr val="E8750C"/>
+                </a:solidFill>
+              </a:rPr>
+              <a:t>Faire un modèle prédictif des retards</a:t>
+            </a:r>
+            <a:endParaRPr lang="fr-FR" dirty="0">
+              <a:solidFill>
+                <a:srgbClr val="E8750C"/>
+              </a:solidFill>
+            </a:endParaRPr>
+          </a:p>
+          <a:p>
+            <a:pPr lvl="1"/>
+            <a:endParaRPr lang="fr-FR" dirty="0">
+              <a:solidFill>
+                <a:srgbClr val="E8750C"/>
+              </a:solidFill>
+            </a:endParaRPr>
+          </a:p>
+          <a:p>
+            <a:r>
+              <a:rPr lang="fr-FR" dirty="0" smtClean="0">
+                <a:solidFill>
+                  <a:srgbClr val="E8750C"/>
+                </a:solidFill>
+              </a:rPr>
+              <a:t>Contrainte</a:t>
+            </a:r>
+          </a:p>
+          <a:p>
+            <a:pPr lvl="1"/>
+            <a:r>
+              <a:rPr lang="fr-FR" dirty="0" smtClean="0">
+                <a:solidFill>
+                  <a:srgbClr val="E8750C"/>
+                </a:solidFill>
+              </a:rPr>
+              <a:t>« Accessible » à l’utilisateur</a:t>
+            </a:r>
+          </a:p>
+        </p:txBody>
+      </p:sp>
+      <p:sp>
+        <p:nvSpPr>
+          <p:cNvPr id="4" name="Espace réservé de la date 3"/>
+          <p:cNvSpPr>
+            <a:spLocks noGrp="1"/>
+          </p:cNvSpPr>
+          <p:nvPr>
+            <p:ph type="dt" sz="half" idx="10"/>
+          </p:nvPr>
+        </p:nvSpPr>
+        <p:spPr/>
+        <p:txBody>
+          <a:bodyPr/>
+          <a:lstStyle/>
+          <a:p>
+            <a:fld id="{30547005-2CCE-4AAF-810C-C33FB4661996}" type="datetime1">
+              <a:rPr lang="fr-FR" smtClean="0"/>
+              <a:t>03/12/2017</a:t>
+            </a:fld>
+            <a:endParaRPr lang="fr-FR"/>
+          </a:p>
+        </p:txBody>
+      </p:sp>
+      <p:sp>
+        <p:nvSpPr>
+          <p:cNvPr id="5" name="Espace réservé du pied de page 4"/>
+          <p:cNvSpPr>
+            <a:spLocks noGrp="1"/>
+          </p:cNvSpPr>
+          <p:nvPr>
+            <p:ph type="ftr" sz="quarter" idx="11"/>
+          </p:nvPr>
+        </p:nvSpPr>
+        <p:spPr/>
+        <p:txBody>
+          <a:bodyPr/>
+          <a:lstStyle/>
+          <a:p>
+            <a:r>
+              <a:rPr lang="fr-FR" dirty="0" smtClean="0"/>
+              <a:t>MINE Nicolas</a:t>
+            </a:r>
+            <a:endParaRPr lang="fr-FR" dirty="0"/>
+          </a:p>
+        </p:txBody>
+      </p:sp>
+    </p:spTree>
+    <p:extLst>
+      <p:ext uri="{BB962C8B-B14F-4D97-AF65-F5344CB8AC3E}">
+        <p14:creationId xmlns:p14="http://schemas.microsoft.com/office/powerpoint/2010/main" val="4282097051"/>
+      </p:ext>
+    </p:extLst>
+  </p:cSld>
+  <p:clrMapOvr>
+    <a:masterClrMapping/>
+  </p:clrMapOvr>
+  <p:timing>
+    <p:tnLst>
+      <p:par>
+        <p:cTn id="1" dur="indefinite" restart="never" nodeType="tmRoot"/>
+      </p:par>
+    </p:tnLst>
+  </p:timing>
+</p:sld>
+</file>
+
+<file path=ppt/slides/slide30.xml><?xml version="1.0" encoding="utf-8"?>
+<p:sld xmlns:a="http://schemas.openxmlformats.org/drawingml/2006/main" xmlns:r="http://schemas.openxmlformats.org/officeDocument/2006/relationships" xmlns:p="http://schemas.openxmlformats.org/presentationml/2006/main">
+  <p:cSld>
+    <p:spTree>
+      <p:nvGrpSpPr>
+        <p:cNvPr id="1" name=""/>
+        <p:cNvGrpSpPr/>
+        <p:nvPr/>
+      </p:nvGrpSpPr>
+      <p:grpSpPr>
+        <a:xfrm>
+          <a:off x="0" y="0"/>
+          <a:ext cx="0" cy="0"/>
+          <a:chOff x="0" y="0"/>
+          <a:chExt cx="0" cy="0"/>
+        </a:xfrm>
+      </p:grpSpPr>
+      <p:sp>
+        <p:nvSpPr>
+          <p:cNvPr id="2" name="Titre 1"/>
+          <p:cNvSpPr>
+            <a:spLocks noGrp="1"/>
+          </p:cNvSpPr>
+          <p:nvPr>
+            <p:ph type="title"/>
+          </p:nvPr>
+        </p:nvSpPr>
+        <p:spPr/>
+        <p:txBody>
+          <a:bodyPr/>
+          <a:lstStyle/>
+          <a:p>
+            <a:r>
+              <a:rPr lang="fr-FR" dirty="0" smtClean="0"/>
+              <a:t>Interprétation</a:t>
+            </a:r>
+            <a:endParaRPr lang="fr-FR" dirty="0"/>
+          </a:p>
+        </p:txBody>
+      </p:sp>
+      <p:sp>
+        <p:nvSpPr>
+          <p:cNvPr id="7" name="Espace réservé du contenu 6"/>
+          <p:cNvSpPr>
+            <a:spLocks noGrp="1"/>
+          </p:cNvSpPr>
+          <p:nvPr>
+            <p:ph idx="1"/>
+          </p:nvPr>
+        </p:nvSpPr>
+        <p:spPr/>
+        <p:txBody>
+          <a:bodyPr/>
+          <a:lstStyle/>
+          <a:p>
+            <a:r>
+              <a:rPr lang="fr-FR" dirty="0" err="1" smtClean="0">
+                <a:solidFill>
+                  <a:srgbClr val="E8750C"/>
+                </a:solidFill>
+              </a:rPr>
+              <a:t>Boosting</a:t>
+            </a:r>
+            <a:endParaRPr lang="fr-FR" dirty="0">
+              <a:solidFill>
+                <a:srgbClr val="E8750C"/>
+              </a:solidFill>
+            </a:endParaRPr>
+          </a:p>
+        </p:txBody>
+      </p:sp>
+      <p:sp>
+        <p:nvSpPr>
+          <p:cNvPr id="4" name="Espace réservé de la date 3"/>
+          <p:cNvSpPr>
+            <a:spLocks noGrp="1"/>
+          </p:cNvSpPr>
+          <p:nvPr>
+            <p:ph type="dt" sz="half" idx="10"/>
+          </p:nvPr>
+        </p:nvSpPr>
+        <p:spPr/>
+        <p:txBody>
+          <a:bodyPr/>
+          <a:lstStyle/>
+          <a:p>
+            <a:fld id="{30547005-2CCE-4AAF-810C-C33FB4661996}" type="datetime1">
+              <a:rPr lang="fr-FR" smtClean="0"/>
+              <a:t>03/12/2017</a:t>
             </a:fld>
             <a:endParaRPr lang="fr-FR"/>
           </a:p>
@@ -10253,7 +10662,7 @@
 </p:sld>
 </file>
 
-<file path=ppt/slides/slide3.xml><?xml version="1.0" encoding="utf-8"?>
+<file path=ppt/slides/slide31.xml><?xml version="1.0" encoding="utf-8"?>
 <p:sld xmlns:a="http://schemas.openxmlformats.org/drawingml/2006/main" xmlns:r="http://schemas.openxmlformats.org/officeDocument/2006/relationships" xmlns:p="http://schemas.openxmlformats.org/presentationml/2006/main">
   <p:cSld>
     <p:spTree>
@@ -10287,7 +10696,7 @@
           <a:p>
             <a:r>
               <a:rPr lang="fr-FR" dirty="0" smtClean="0"/>
-              <a:t>Présentation</a:t>
+              <a:t>Interprétation</a:t>
             </a:r>
             <a:endParaRPr lang="fr-FR" dirty="0"/>
           </a:p>
@@ -10295,7 +10704,7 @@
       </p:sp>
       <p:sp>
         <p:nvSpPr>
-          <p:cNvPr id="3" name="Espace réservé du contenu 2"/>
+          <p:cNvPr id="7" name="Espace réservé du contenu 6"/>
           <p:cNvSpPr>
             <a:spLocks noGrp="1"/>
           </p:cNvSpPr>
@@ -10305,150 +10714,23 @@
         </p:nvSpPr>
         <p:spPr/>
         <p:txBody>
-          <a:bodyPr>
-            <a:normAutofit fontScale="77500" lnSpcReduction="20000"/>
-          </a:bodyPr>
-          <a:lstStyle/>
-          <a:p>
-            <a:r>
-              <a:rPr lang="fr-FR" dirty="0" smtClean="0">
-                <a:solidFill>
-                  <a:srgbClr val="E8750C"/>
-                </a:solidFill>
-              </a:rPr>
-              <a:t>Entrée</a:t>
-            </a:r>
-          </a:p>
-          <a:p>
-            <a:pPr lvl="1"/>
-            <a:r>
-              <a:rPr lang="fr-FR" dirty="0" smtClean="0">
-                <a:solidFill>
-                  <a:srgbClr val="E8750C"/>
-                </a:solidFill>
-              </a:rPr>
-              <a:t>Données concernant les vols (USA)</a:t>
-            </a:r>
-          </a:p>
-          <a:p>
-            <a:pPr lvl="1"/>
-            <a:r>
-              <a:rPr lang="fr-FR" dirty="0" smtClean="0">
-                <a:solidFill>
-                  <a:srgbClr val="E8750C"/>
-                </a:solidFill>
-              </a:rPr>
-              <a:t>1 an</a:t>
-            </a:r>
-          </a:p>
-          <a:p>
-            <a:pPr lvl="1"/>
-            <a:r>
-              <a:rPr lang="fr-FR" dirty="0" smtClean="0">
-                <a:solidFill>
-                  <a:srgbClr val="E8750C"/>
-                </a:solidFill>
-              </a:rPr>
-              <a:t>5,6 millions de vols</a:t>
-            </a:r>
-          </a:p>
-          <a:p>
-            <a:pPr lvl="1"/>
-            <a:r>
-              <a:rPr lang="fr-FR" dirty="0" smtClean="0">
-                <a:solidFill>
-                  <a:srgbClr val="E8750C"/>
-                </a:solidFill>
-              </a:rPr>
-              <a:t>65 </a:t>
-            </a:r>
+          <a:bodyPr/>
+          <a:lstStyle/>
+          <a:p>
             <a:r>
               <a:rPr lang="fr-FR" dirty="0" err="1" smtClean="0">
                 <a:solidFill>
                   <a:srgbClr val="E8750C"/>
                 </a:solidFill>
               </a:rPr>
-              <a:t>features</a:t>
-            </a:r>
-            <a:endParaRPr lang="fr-FR" dirty="0" smtClean="0">
-              <a:solidFill>
-                <a:srgbClr val="E8750C"/>
-              </a:solidFill>
-            </a:endParaRPr>
-          </a:p>
-          <a:p>
-            <a:pPr lvl="1"/>
-            <a:r>
-              <a:rPr lang="fr-FR" dirty="0" smtClean="0">
-                <a:solidFill>
-                  <a:srgbClr val="E8750C"/>
-                </a:solidFill>
-              </a:rPr>
-              <a:t>Aucunes données manquantes</a:t>
-            </a:r>
-          </a:p>
-          <a:p>
+              <a:t>Boosting</a:t>
+            </a:r>
             <a:endParaRPr lang="fr-FR" dirty="0">
               <a:solidFill>
                 <a:srgbClr val="E8750C"/>
               </a:solidFill>
             </a:endParaRPr>
           </a:p>
-          <a:p>
-            <a:r>
-              <a:rPr lang="fr-FR" dirty="0" smtClean="0">
-                <a:solidFill>
-                  <a:srgbClr val="E8750C"/>
-                </a:solidFill>
-              </a:rPr>
-              <a:t>Objectifs</a:t>
-            </a:r>
-          </a:p>
-          <a:p>
-            <a:pPr lvl="1"/>
-            <a:r>
-              <a:rPr lang="fr-FR" dirty="0" smtClean="0">
-                <a:solidFill>
-                  <a:srgbClr val="E8750C"/>
-                </a:solidFill>
-              </a:rPr>
-              <a:t>Faire un modèle prédictif des retards</a:t>
-            </a:r>
-            <a:endParaRPr lang="fr-FR" dirty="0">
-              <a:solidFill>
-                <a:srgbClr val="E8750C"/>
-              </a:solidFill>
-            </a:endParaRPr>
-          </a:p>
-          <a:p>
-            <a:pPr lvl="1"/>
-            <a:endParaRPr lang="fr-FR" dirty="0">
-              <a:solidFill>
-                <a:srgbClr val="E8750C"/>
-              </a:solidFill>
-            </a:endParaRPr>
-          </a:p>
-          <a:p>
-            <a:r>
-              <a:rPr lang="fr-FR" dirty="0" smtClean="0">
-                <a:solidFill>
-                  <a:srgbClr val="E8750C"/>
-                </a:solidFill>
-              </a:rPr>
-              <a:t>Contrainte</a:t>
-            </a:r>
-          </a:p>
-          <a:p>
-            <a:pPr lvl="1"/>
-            <a:r>
-              <a:rPr lang="fr-FR" dirty="0" smtClean="0">
-                <a:solidFill>
-                  <a:srgbClr val="E8750C"/>
-                </a:solidFill>
-              </a:rPr>
-              <a:t>« Accessible » à l’utilisateur</a:t>
-            </a:r>
-          </a:p>
         </p:txBody>
       </p:sp>
       <p:sp>
@@ -10468,7 +10750,7 @@
           <a:p>
             <a:fld id="{30547005-2CCE-4AAF-810C-C33FB4661996}" type="datetime1">
               <a:rPr lang="fr-FR" smtClean="0"/>
-              <a:t>02/12/2017</a:t>
+              <a:t>03/12/2017</a:t>
             </a:fld>
             <a:endParaRPr lang="fr-FR"/>
           </a:p>
@@ -10497,190 +10779,9 @@
           </a:p>
         </p:txBody>
       </p:sp>
-    </p:spTree>
-    <p:extLst>
-      <p:ext uri="{BB962C8B-B14F-4D97-AF65-F5344CB8AC3E}">
-        <p14:creationId xmlns:p14="http://schemas.microsoft.com/office/powerpoint/2010/main" val="4282097051"/>
-      </p:ext>
-    </p:extLst>
-  </p:cSld>
-  <p:clrMapOvr>
-    <a:masterClrMapping/>
-  </p:clrMapOvr>
-  <p:timing>
-    <p:tnLst>
-      <p:par>
-        <p:cTn id="1" dur="indefinite" restart="never" nodeType="tmRoot"/>
-      </p:par>
-    </p:tnLst>
-  </p:timing>
-</p:sld>
-</file>
-
-<file path=ppt/slides/slide30.xml><?xml version="1.0" encoding="utf-8"?>
-<p:sld xmlns:a="http://schemas.openxmlformats.org/drawingml/2006/main" xmlns:r="http://schemas.openxmlformats.org/officeDocument/2006/relationships" xmlns:p="http://schemas.openxmlformats.org/presentationml/2006/main">
-  <p:cSld>
-    <p:spTree>
-      <p:nvGrpSpPr>
-        <p:cNvPr id="1" name=""/>
-        <p:cNvGrpSpPr/>
-        <p:nvPr/>
-      </p:nvGrpSpPr>
-      <p:grpSpPr>
-        <a:xfrm>
-          <a:off x="0" y="0"/>
-          <a:ext cx="0" cy="0"/>
-          <a:chOff x="0" y="0"/>
-          <a:chExt cx="0" cy="0"/>
-        </a:xfrm>
-      </p:grpSpPr>
-      <p:sp>
-        <p:nvSpPr>
-          <p:cNvPr id="2" name="Titre 1"/>
-          <p:cNvSpPr>
-            <a:spLocks noGrp="1"/>
-          </p:cNvSpPr>
-          <p:nvPr>
-            <p:ph type="title"/>
-          </p:nvPr>
-        </p:nvSpPr>
-        <p:spPr/>
-        <p:txBody>
-          <a:bodyPr/>
-          <a:lstStyle/>
-          <a:p>
-            <a:r>
-              <a:rPr lang="fr-FR" dirty="0"/>
-              <a:t>Interprétation</a:t>
-            </a:r>
-          </a:p>
-        </p:txBody>
-      </p:sp>
-      <p:sp>
-        <p:nvSpPr>
-          <p:cNvPr id="3" name="Espace réservé du contenu 2"/>
-          <p:cNvSpPr>
-            <a:spLocks noGrp="1"/>
-          </p:cNvSpPr>
-          <p:nvPr>
-            <p:ph idx="1"/>
-          </p:nvPr>
-        </p:nvSpPr>
-        <p:spPr/>
-        <p:txBody>
-          <a:bodyPr/>
-          <a:lstStyle/>
-          <a:p>
-            <a:r>
-              <a:rPr lang="fr-FR" dirty="0" smtClean="0">
-                <a:solidFill>
-                  <a:srgbClr val="E8750C"/>
-                </a:solidFill>
-              </a:rPr>
-              <a:t>Prédictions similaires</a:t>
-            </a:r>
-          </a:p>
-          <a:p>
-            <a:r>
-              <a:rPr lang="fr-FR" dirty="0" smtClean="0">
-                <a:solidFill>
-                  <a:srgbClr val="E8750C"/>
-                </a:solidFill>
-              </a:rPr>
-              <a:t>Coefficients différents</a:t>
-            </a:r>
-          </a:p>
-          <a:p>
-            <a:endParaRPr lang="fr-FR" dirty="0">
-              <a:solidFill>
-                <a:srgbClr val="E8750C"/>
-              </a:solidFill>
-            </a:endParaRPr>
-          </a:p>
-          <a:p>
-            <a:pPr>
-              <a:buFont typeface="Wingdings" pitchFamily="2" charset="2"/>
-              <a:buChar char="Ø"/>
-            </a:pPr>
-            <a:r>
-              <a:rPr lang="fr-FR" dirty="0" smtClean="0">
-                <a:solidFill>
-                  <a:srgbClr val="E8750C"/>
-                </a:solidFill>
-              </a:rPr>
-              <a:t>2 minimums locaux</a:t>
-            </a:r>
-          </a:p>
-          <a:p>
-            <a:pPr>
-              <a:buFont typeface="Wingdings" pitchFamily="2" charset="2"/>
-              <a:buChar char="Ø"/>
-            </a:pPr>
-            <a:r>
-              <a:rPr lang="fr-FR" dirty="0" smtClean="0">
-                <a:solidFill>
-                  <a:srgbClr val="E8750C"/>
-                </a:solidFill>
-              </a:rPr>
-              <a:t>1 global ?</a:t>
-            </a:r>
-            <a:endParaRPr lang="fr-FR" dirty="0">
-              <a:solidFill>
-                <a:srgbClr val="E8750C"/>
-              </a:solidFill>
-            </a:endParaRPr>
-          </a:p>
-        </p:txBody>
-      </p:sp>
-      <p:sp>
-        <p:nvSpPr>
-          <p:cNvPr id="4" name="Espace réservé de la date 3"/>
-          <p:cNvSpPr>
-            <a:spLocks noGrp="1"/>
-          </p:cNvSpPr>
-          <p:nvPr>
-            <p:ph type="dt" sz="half" idx="10"/>
-          </p:nvPr>
-        </p:nvSpPr>
-        <p:spPr/>
-        <p:txBody>
-          <a:bodyPr/>
-          <a:lstStyle/>
-          <a:p>
-            <a:fld id="{30547005-2CCE-4AAF-810C-C33FB4661996}" type="datetime1">
-              <a:rPr lang="fr-FR" smtClean="0"/>
-              <a:t>02/12/2017</a:t>
-            </a:fld>
-            <a:endParaRPr lang="fr-FR"/>
-          </a:p>
-        </p:txBody>
-      </p:sp>
-      <p:sp>
-        <p:nvSpPr>
-          <p:cNvPr id="5" name="Espace réservé du pied de page 4"/>
-          <p:cNvSpPr>
-            <a:spLocks noGrp="1"/>
-          </p:cNvSpPr>
-          <p:nvPr>
-            <p:ph type="ftr" sz="quarter" idx="11"/>
-          </p:nvPr>
-        </p:nvSpPr>
-        <p:spPr/>
-        <p:txBody>
-          <a:bodyPr/>
-          <a:lstStyle/>
-          <a:p>
-            <a:r>
-              <a:rPr lang="fr-FR" smtClean="0"/>
-              <a:t>MINE Nicolas</a:t>
-            </a:r>
-            <a:endParaRPr lang="fr-FR"/>
-          </a:p>
-        </p:txBody>
-      </p:sp>
       <p:pic>
         <p:nvPicPr>
-          <p:cNvPr id="11266" name="Picture 2" descr="[im2%255B3%255D.png]"/>
+          <p:cNvPr id="3074" name="Picture 2" descr="F:\Nicolas\Documents\OpenClassRoom\P4\img\booster_day.png"/>
           <p:cNvPicPr>
             <a:picLocks noChangeAspect="1" noChangeArrowheads="1"/>
           </p:cNvPicPr>
@@ -10711,8 +10812,8 @@
         </p:blipFill>
         <p:spPr bwMode="auto">
           <a:xfrm>
-            <a:off x="4427984" y="3140968"/>
-            <a:ext cx="4412753" cy="2899354"/>
+            <a:off x="107503" y="1498961"/>
+            <a:ext cx="8977371" cy="5386423"/>
           </a:xfrm>
           <a:prstGeom prst="rect">
             <a:avLst/>
@@ -10732,302 +10833,7 @@
     </p:spTree>
     <p:extLst>
       <p:ext uri="{BB962C8B-B14F-4D97-AF65-F5344CB8AC3E}">
-        <p14:creationId xmlns:p14="http://schemas.microsoft.com/office/powerpoint/2010/main" val="4048825063"/>
-      </p:ext>
-    </p:extLst>
-  </p:cSld>
-  <p:clrMapOvr>
-    <a:masterClrMapping/>
-  </p:clrMapOvr>
-  <p:timing>
-    <p:tnLst>
-      <p:par>
-        <p:cTn id="1" dur="indefinite" restart="never" nodeType="tmRoot"/>
-      </p:par>
-    </p:tnLst>
-  </p:timing>
-</p:sld>
-</file>
-
-<file path=ppt/slides/slide31.xml><?xml version="1.0" encoding="utf-8"?>
-<p:sld xmlns:a="http://schemas.openxmlformats.org/drawingml/2006/main" xmlns:r="http://schemas.openxmlformats.org/officeDocument/2006/relationships" xmlns:p="http://schemas.openxmlformats.org/presentationml/2006/main">
-  <p:cSld>
-    <p:spTree>
-      <p:nvGrpSpPr>
-        <p:cNvPr id="1" name=""/>
-        <p:cNvGrpSpPr/>
-        <p:nvPr/>
-      </p:nvGrpSpPr>
-      <p:grpSpPr>
-        <a:xfrm>
-          <a:off x="0" y="0"/>
-          <a:ext cx="0" cy="0"/>
-          <a:chOff x="0" y="0"/>
-          <a:chExt cx="0" cy="0"/>
-        </a:xfrm>
-      </p:grpSpPr>
-      <p:sp>
-        <p:nvSpPr>
-          <p:cNvPr id="2" name="Titre 1"/>
-          <p:cNvSpPr>
-            <a:spLocks noGrp="1"/>
-          </p:cNvSpPr>
-          <p:nvPr>
-            <p:ph type="title"/>
-          </p:nvPr>
-        </p:nvSpPr>
-        <p:spPr/>
-        <p:txBody>
-          <a:bodyPr/>
-          <a:lstStyle/>
-          <a:p>
-            <a:r>
-              <a:rPr lang="fr-FR" dirty="0" smtClean="0"/>
-              <a:t>API</a:t>
-            </a:r>
-            <a:endParaRPr lang="fr-FR" dirty="0"/>
-          </a:p>
-        </p:txBody>
-      </p:sp>
-      <p:sp>
-        <p:nvSpPr>
-          <p:cNvPr id="3" name="Espace réservé du contenu 2"/>
-          <p:cNvSpPr>
-            <a:spLocks noGrp="1"/>
-          </p:cNvSpPr>
-          <p:nvPr>
-            <p:ph idx="1"/>
-          </p:nvPr>
-        </p:nvSpPr>
-        <p:spPr/>
-        <p:txBody>
-          <a:bodyPr>
-            <a:normAutofit lnSpcReduction="10000"/>
-          </a:bodyPr>
-          <a:lstStyle/>
-          <a:p>
-            <a:r>
-              <a:rPr lang="fr-FR" dirty="0" smtClean="0">
-                <a:solidFill>
-                  <a:srgbClr val="E8750C"/>
-                </a:solidFill>
-              </a:rPr>
-              <a:t>Site </a:t>
-            </a:r>
-            <a:r>
-              <a:rPr lang="fr-FR" dirty="0" err="1" smtClean="0">
-                <a:solidFill>
-                  <a:srgbClr val="E8750C"/>
-                </a:solidFill>
-              </a:rPr>
-              <a:t>Flask</a:t>
-            </a:r>
-            <a:endParaRPr lang="fr-FR" dirty="0" smtClean="0">
-              <a:solidFill>
-                <a:srgbClr val="E8750C"/>
-              </a:solidFill>
-            </a:endParaRPr>
-          </a:p>
-          <a:p>
-            <a:r>
-              <a:rPr lang="fr-FR" dirty="0" smtClean="0">
-                <a:solidFill>
-                  <a:srgbClr val="E8750C"/>
-                </a:solidFill>
-              </a:rPr>
-              <a:t>UI </a:t>
-            </a:r>
-          </a:p>
-          <a:p>
-            <a:pPr lvl="1"/>
-            <a:r>
-              <a:rPr lang="fr-FR" dirty="0" smtClean="0">
-                <a:solidFill>
-                  <a:srgbClr val="E8750C"/>
-                </a:solidFill>
-              </a:rPr>
-              <a:t>Aéroport de départ</a:t>
-            </a:r>
-          </a:p>
-          <a:p>
-            <a:pPr lvl="1"/>
-            <a:r>
-              <a:rPr lang="fr-FR" dirty="0" smtClean="0">
-                <a:solidFill>
-                  <a:srgbClr val="E8750C"/>
-                </a:solidFill>
-              </a:rPr>
-              <a:t>Date et Heure</a:t>
-            </a:r>
-          </a:p>
-          <a:p>
-            <a:pPr lvl="1"/>
-            <a:r>
-              <a:rPr lang="fr-FR" dirty="0" smtClean="0">
-                <a:solidFill>
-                  <a:srgbClr val="E8750C"/>
-                </a:solidFill>
-              </a:rPr>
-              <a:t>Compagnie</a:t>
-            </a:r>
-          </a:p>
-          <a:p>
-            <a:r>
-              <a:rPr lang="fr-FR" dirty="0" smtClean="0">
-                <a:solidFill>
-                  <a:srgbClr val="E8750C"/>
-                </a:solidFill>
-              </a:rPr>
-              <a:t>Server</a:t>
-            </a:r>
-          </a:p>
-          <a:p>
-            <a:pPr lvl="1"/>
-            <a:r>
-              <a:rPr lang="fr-FR" dirty="0" smtClean="0">
-                <a:solidFill>
-                  <a:srgbClr val="E8750C"/>
-                </a:solidFill>
-              </a:rPr>
-              <a:t>Encode/</a:t>
-            </a:r>
-            <a:r>
-              <a:rPr lang="fr-FR" dirty="0" err="1" smtClean="0">
-                <a:solidFill>
-                  <a:srgbClr val="E8750C"/>
-                </a:solidFill>
-              </a:rPr>
-              <a:t>Scale</a:t>
-            </a:r>
-            <a:endParaRPr lang="fr-FR" dirty="0" smtClean="0">
-              <a:solidFill>
-                <a:srgbClr val="E8750C"/>
-              </a:solidFill>
-            </a:endParaRPr>
-          </a:p>
-          <a:p>
-            <a:pPr lvl="1"/>
-            <a:r>
-              <a:rPr lang="fr-FR" dirty="0" err="1" smtClean="0">
-                <a:solidFill>
-                  <a:srgbClr val="E8750C"/>
-                </a:solidFill>
-              </a:rPr>
-              <a:t>Predit</a:t>
-            </a:r>
-            <a:endParaRPr lang="fr-FR" dirty="0" smtClean="0">
-              <a:solidFill>
-                <a:srgbClr val="E8750C"/>
-              </a:solidFill>
-            </a:endParaRPr>
-          </a:p>
-          <a:p>
-            <a:pPr lvl="1"/>
-            <a:r>
-              <a:rPr lang="fr-FR" dirty="0" smtClean="0">
-                <a:solidFill>
-                  <a:srgbClr val="E8750C"/>
-                </a:solidFill>
-              </a:rPr>
-              <a:t>Retourne l’info (POST)</a:t>
-            </a:r>
-            <a:endParaRPr lang="fr-FR" dirty="0">
-              <a:solidFill>
-                <a:srgbClr val="E8750C"/>
-              </a:solidFill>
-            </a:endParaRPr>
-          </a:p>
-        </p:txBody>
-      </p:sp>
-      <p:sp>
-        <p:nvSpPr>
-          <p:cNvPr id="4" name="Espace réservé de la date 3"/>
-          <p:cNvSpPr>
-            <a:spLocks noGrp="1"/>
-          </p:cNvSpPr>
-          <p:nvPr>
-            <p:ph type="dt" sz="half" idx="10"/>
-          </p:nvPr>
-        </p:nvSpPr>
-        <p:spPr/>
-        <p:txBody>
-          <a:bodyPr/>
-          <a:lstStyle/>
-          <a:p>
-            <a:fld id="{30547005-2CCE-4AAF-810C-C33FB4661996}" type="datetime1">
-              <a:rPr lang="fr-FR" smtClean="0"/>
-              <a:t>02/12/2017</a:t>
-            </a:fld>
-            <a:endParaRPr lang="fr-FR"/>
-          </a:p>
-        </p:txBody>
-      </p:sp>
-      <p:sp>
-        <p:nvSpPr>
-          <p:cNvPr id="5" name="Espace réservé du pied de page 4"/>
-          <p:cNvSpPr>
-            <a:spLocks noGrp="1"/>
-          </p:cNvSpPr>
-          <p:nvPr>
-            <p:ph type="ftr" sz="quarter" idx="11"/>
-          </p:nvPr>
-        </p:nvSpPr>
-        <p:spPr/>
-        <p:txBody>
-          <a:bodyPr/>
-          <a:lstStyle/>
-          <a:p>
-            <a:r>
-              <a:rPr lang="fr-FR" smtClean="0"/>
-              <a:t>MINE Nicolas</a:t>
-            </a:r>
-            <a:endParaRPr lang="fr-FR"/>
-          </a:p>
-        </p:txBody>
-      </p:sp>
-      <p:pic>
-        <p:nvPicPr>
-          <p:cNvPr id="1026" name="Picture 2" descr="F:\Nicolas\Documents\OpenClassRoom\P4\img\Acceuil.png"/>
-          <p:cNvPicPr>
-            <a:picLocks noChangeAspect="1" noChangeArrowheads="1"/>
-          </p:cNvPicPr>
-          <p:nvPr/>
-        </p:nvPicPr>
-        <p:blipFill rotWithShape="1">
-          <a:blip r:embed="rId2">
-            <a:extLst>
-              <a:ext uri="{28A0092B-C50C-407E-A947-70E740481C1C}">
-                <a14:useLocalDpi xmlns:a14="http://schemas.microsoft.com/office/drawing/2010/main" val="0"/>
-              </a:ext>
-            </a:extLst>
-          </a:blip>
-          <a:srcRect r="21406"/>
-          <a:stretch/>
-        </p:blipFill>
-        <p:spPr bwMode="auto">
-          <a:xfrm>
-            <a:off x="4499992" y="1700808"/>
-            <a:ext cx="4107954" cy="3745950"/>
-          </a:xfrm>
-          <a:prstGeom prst="rect">
-            <a:avLst/>
-          </a:prstGeom>
-          <a:noFill/>
-          <a:extLst>
-            <a:ext uri="{909E8E84-426E-40DD-AFC4-6F175D3DCCD1}">
-              <a14:hiddenFill xmlns:a14="http://schemas.microsoft.com/office/drawing/2010/main">
-                <a:solidFill>
-                  <a:srgbClr val="FFFFFF"/>
-                </a:solidFill>
-              </a14:hiddenFill>
-            </a:ext>
-          </a:extLst>
-        </p:spPr>
-      </p:pic>
-    </p:spTree>
-    <p:extLst>
-      <p:ext uri="{BB962C8B-B14F-4D97-AF65-F5344CB8AC3E}">
-        <p14:creationId xmlns:p14="http://schemas.microsoft.com/office/powerpoint/2010/main" val="443609323"/>
+        <p14:creationId xmlns:p14="http://schemas.microsoft.com/office/powerpoint/2010/main" val="1688469190"/>
       </p:ext>
     </p:extLst>
   </p:cSld>
@@ -11077,6 +10883,539 @@
           <a:lstStyle/>
           <a:p>
             <a:r>
+              <a:rPr lang="fr-FR" dirty="0"/>
+              <a:t>Interprétation</a:t>
+            </a:r>
+          </a:p>
+        </p:txBody>
+      </p:sp>
+      <p:sp>
+        <p:nvSpPr>
+          <p:cNvPr id="3" name="Espace réservé du contenu 2"/>
+          <p:cNvSpPr>
+            <a:spLocks noGrp="1"/>
+          </p:cNvSpPr>
+          <p:nvPr>
+            <p:ph idx="1"/>
+          </p:nvPr>
+        </p:nvSpPr>
+        <p:spPr/>
+        <p:txBody>
+          <a:bodyPr/>
+          <a:lstStyle/>
+          <a:p>
+            <a:r>
+              <a:rPr lang="fr-FR" dirty="0" smtClean="0">
+                <a:solidFill>
+                  <a:srgbClr val="E8750C"/>
+                </a:solidFill>
+              </a:rPr>
+              <a:t>Prédictions similaires</a:t>
+            </a:r>
+          </a:p>
+          <a:p>
+            <a:r>
+              <a:rPr lang="fr-FR" dirty="0" smtClean="0">
+                <a:solidFill>
+                  <a:srgbClr val="E8750C"/>
+                </a:solidFill>
+              </a:rPr>
+              <a:t>Coefficients similaires</a:t>
+            </a:r>
+          </a:p>
+          <a:p>
+            <a:pPr lvl="1"/>
+            <a:r>
+              <a:rPr lang="fr-FR" dirty="0" smtClean="0">
+                <a:solidFill>
+                  <a:srgbClr val="E8750C"/>
+                </a:solidFill>
+              </a:rPr>
+              <a:t>Offset OHE</a:t>
+            </a:r>
+          </a:p>
+          <a:p>
+            <a:pPr lvl="1"/>
+            <a:r>
+              <a:rPr lang="fr-FR" dirty="0" smtClean="0">
+                <a:solidFill>
+                  <a:srgbClr val="E8750C"/>
+                </a:solidFill>
+              </a:rPr>
+              <a:t>Bruit </a:t>
+            </a:r>
+            <a:r>
+              <a:rPr lang="fr-FR" dirty="0" err="1" smtClean="0">
+                <a:solidFill>
+                  <a:srgbClr val="E8750C"/>
+                </a:solidFill>
+              </a:rPr>
+              <a:t>Boosting</a:t>
+            </a:r>
+            <a:endParaRPr lang="fr-FR" dirty="0" smtClean="0">
+              <a:solidFill>
+                <a:srgbClr val="E8750C"/>
+              </a:solidFill>
+            </a:endParaRPr>
+          </a:p>
+          <a:p>
+            <a:pPr lvl="1"/>
+            <a:r>
+              <a:rPr lang="fr-FR" dirty="0" smtClean="0">
+                <a:solidFill>
+                  <a:srgbClr val="E8750C"/>
+                </a:solidFill>
+              </a:rPr>
+              <a:t>Même tendances</a:t>
+            </a:r>
+          </a:p>
+          <a:p>
+            <a:endParaRPr lang="fr-FR" dirty="0">
+              <a:solidFill>
+                <a:srgbClr val="E8750C"/>
+              </a:solidFill>
+            </a:endParaRPr>
+          </a:p>
+        </p:txBody>
+      </p:sp>
+      <p:sp>
+        <p:nvSpPr>
+          <p:cNvPr id="4" name="Espace réservé de la date 3"/>
+          <p:cNvSpPr>
+            <a:spLocks noGrp="1"/>
+          </p:cNvSpPr>
+          <p:nvPr>
+            <p:ph type="dt" sz="half" idx="10"/>
+          </p:nvPr>
+        </p:nvSpPr>
+        <p:spPr/>
+        <p:txBody>
+          <a:bodyPr/>
+          <a:lstStyle/>
+          <a:p>
+            <a:fld id="{30547005-2CCE-4AAF-810C-C33FB4661996}" type="datetime1">
+              <a:rPr lang="fr-FR" smtClean="0"/>
+              <a:t>03/12/2017</a:t>
+            </a:fld>
+            <a:endParaRPr lang="fr-FR"/>
+          </a:p>
+        </p:txBody>
+      </p:sp>
+      <p:sp>
+        <p:nvSpPr>
+          <p:cNvPr id="5" name="Espace réservé du pied de page 4"/>
+          <p:cNvSpPr>
+            <a:spLocks noGrp="1"/>
+          </p:cNvSpPr>
+          <p:nvPr>
+            <p:ph type="ftr" sz="quarter" idx="11"/>
+          </p:nvPr>
+        </p:nvSpPr>
+        <p:spPr/>
+        <p:txBody>
+          <a:bodyPr/>
+          <a:lstStyle/>
+          <a:p>
+            <a:r>
+              <a:rPr lang="fr-FR" smtClean="0"/>
+              <a:t>MINE Nicolas</a:t>
+            </a:r>
+            <a:endParaRPr lang="fr-FR"/>
+          </a:p>
+        </p:txBody>
+      </p:sp>
+      <p:pic>
+        <p:nvPicPr>
+          <p:cNvPr id="4098" name="Picture 2" descr="F:\Nicolas\Documents\OpenClassRoom\P4\img\booster_week.png"/>
+          <p:cNvPicPr>
+            <a:picLocks noChangeAspect="1" noChangeArrowheads="1"/>
+          </p:cNvPicPr>
+          <p:nvPr/>
+        </p:nvPicPr>
+        <p:blipFill rotWithShape="1">
+          <a:blip r:embed="rId2">
+            <a:clrChange>
+              <a:clrFrom>
+                <a:srgbClr val="FFFFFF"/>
+              </a:clrFrom>
+              <a:clrTo>
+                <a:srgbClr val="FFFFFF">
+                  <a:alpha val="0"/>
+                </a:srgbClr>
+              </a:clrTo>
+            </a:clrChange>
+            <a:extLst>
+              <a:ext uri="{28A0092B-C50C-407E-A947-70E740481C1C}">
+                <a14:useLocalDpi xmlns:a14="http://schemas.microsoft.com/office/drawing/2010/main" val="0"/>
+              </a:ext>
+            </a:extLst>
+          </a:blip>
+          <a:srcRect l="8403" t="9259" r="9098" b="5671"/>
+          <a:stretch/>
+        </p:blipFill>
+        <p:spPr bwMode="auto">
+          <a:xfrm>
+            <a:off x="4067944" y="2906900"/>
+            <a:ext cx="5040560" cy="3118529"/>
+          </a:xfrm>
+          <a:prstGeom prst="rect">
+            <a:avLst/>
+          </a:prstGeom>
+          <a:noFill/>
+          <a:extLst>
+            <a:ext uri="{909E8E84-426E-40DD-AFC4-6F175D3DCCD1}">
+              <a14:hiddenFill xmlns:a14="http://schemas.microsoft.com/office/drawing/2010/main">
+                <a:solidFill>
+                  <a:srgbClr val="FFFFFF"/>
+                </a:solidFill>
+              </a14:hiddenFill>
+            </a:ext>
+          </a:extLst>
+        </p:spPr>
+      </p:pic>
+    </p:spTree>
+    <p:extLst>
+      <p:ext uri="{BB962C8B-B14F-4D97-AF65-F5344CB8AC3E}">
+        <p14:creationId xmlns:p14="http://schemas.microsoft.com/office/powerpoint/2010/main" val="4048825063"/>
+      </p:ext>
+    </p:extLst>
+  </p:cSld>
+  <p:clrMapOvr>
+    <a:masterClrMapping/>
+  </p:clrMapOvr>
+  <p:timing>
+    <p:tnLst>
+      <p:par>
+        <p:cTn id="1" dur="indefinite" restart="never" nodeType="tmRoot"/>
+      </p:par>
+    </p:tnLst>
+  </p:timing>
+</p:sld>
+</file>
+
+<file path=ppt/slides/slide33.xml><?xml version="1.0" encoding="utf-8"?>
+<p:sld xmlns:a="http://schemas.openxmlformats.org/drawingml/2006/main" xmlns:r="http://schemas.openxmlformats.org/officeDocument/2006/relationships" xmlns:p="http://schemas.openxmlformats.org/presentationml/2006/main">
+  <p:cSld>
+    <p:spTree>
+      <p:nvGrpSpPr>
+        <p:cNvPr id="1" name=""/>
+        <p:cNvGrpSpPr/>
+        <p:nvPr/>
+      </p:nvGrpSpPr>
+      <p:grpSpPr>
+        <a:xfrm>
+          <a:off x="0" y="0"/>
+          <a:ext cx="0" cy="0"/>
+          <a:chOff x="0" y="0"/>
+          <a:chExt cx="0" cy="0"/>
+        </a:xfrm>
+      </p:grpSpPr>
+      <p:sp>
+        <p:nvSpPr>
+          <p:cNvPr id="2" name="Titre 1"/>
+          <p:cNvSpPr>
+            <a:spLocks noGrp="1"/>
+          </p:cNvSpPr>
+          <p:nvPr>
+            <p:ph type="title"/>
+          </p:nvPr>
+        </p:nvSpPr>
+        <p:spPr/>
+        <p:txBody>
+          <a:bodyPr/>
+          <a:lstStyle/>
+          <a:p>
+            <a:r>
+              <a:rPr lang="fr-FR" dirty="0" smtClean="0"/>
+              <a:t>API</a:t>
+            </a:r>
+            <a:endParaRPr lang="fr-FR" dirty="0"/>
+          </a:p>
+        </p:txBody>
+      </p:sp>
+      <p:sp>
+        <p:nvSpPr>
+          <p:cNvPr id="3" name="Espace réservé du contenu 2"/>
+          <p:cNvSpPr>
+            <a:spLocks noGrp="1"/>
+          </p:cNvSpPr>
+          <p:nvPr>
+            <p:ph idx="1"/>
+          </p:nvPr>
+        </p:nvSpPr>
+        <p:spPr/>
+        <p:txBody>
+          <a:bodyPr>
+            <a:normAutofit lnSpcReduction="10000"/>
+          </a:bodyPr>
+          <a:lstStyle/>
+          <a:p>
+            <a:r>
+              <a:rPr lang="fr-FR" dirty="0" smtClean="0">
+                <a:solidFill>
+                  <a:srgbClr val="E8750C"/>
+                </a:solidFill>
+              </a:rPr>
+              <a:t>Site </a:t>
+            </a:r>
+            <a:r>
+              <a:rPr lang="fr-FR" dirty="0" err="1" smtClean="0">
+                <a:solidFill>
+                  <a:srgbClr val="E8750C"/>
+                </a:solidFill>
+              </a:rPr>
+              <a:t>Flask</a:t>
+            </a:r>
+            <a:endParaRPr lang="fr-FR" dirty="0" smtClean="0">
+              <a:solidFill>
+                <a:srgbClr val="E8750C"/>
+              </a:solidFill>
+            </a:endParaRPr>
+          </a:p>
+          <a:p>
+            <a:r>
+              <a:rPr lang="fr-FR" dirty="0" smtClean="0">
+                <a:solidFill>
+                  <a:srgbClr val="E8750C"/>
+                </a:solidFill>
+              </a:rPr>
+              <a:t>UI </a:t>
+            </a:r>
+          </a:p>
+          <a:p>
+            <a:pPr lvl="1"/>
+            <a:r>
+              <a:rPr lang="fr-FR" dirty="0" smtClean="0">
+                <a:solidFill>
+                  <a:srgbClr val="E8750C"/>
+                </a:solidFill>
+              </a:rPr>
+              <a:t>Aéroport de départ</a:t>
+            </a:r>
+          </a:p>
+          <a:p>
+            <a:pPr lvl="1"/>
+            <a:r>
+              <a:rPr lang="fr-FR" dirty="0" smtClean="0">
+                <a:solidFill>
+                  <a:srgbClr val="E8750C"/>
+                </a:solidFill>
+              </a:rPr>
+              <a:t>Date et Heure</a:t>
+            </a:r>
+          </a:p>
+          <a:p>
+            <a:pPr lvl="1"/>
+            <a:r>
+              <a:rPr lang="fr-FR" dirty="0" smtClean="0">
+                <a:solidFill>
+                  <a:srgbClr val="E8750C"/>
+                </a:solidFill>
+              </a:rPr>
+              <a:t>Compagnie</a:t>
+            </a:r>
+          </a:p>
+          <a:p>
+            <a:r>
+              <a:rPr lang="fr-FR" dirty="0" smtClean="0">
+                <a:solidFill>
+                  <a:srgbClr val="E8750C"/>
+                </a:solidFill>
+              </a:rPr>
+              <a:t>Server</a:t>
+            </a:r>
+          </a:p>
+          <a:p>
+            <a:pPr lvl="1"/>
+            <a:r>
+              <a:rPr lang="fr-FR" dirty="0" smtClean="0">
+                <a:solidFill>
+                  <a:srgbClr val="E8750C"/>
+                </a:solidFill>
+              </a:rPr>
+              <a:t>Encode/</a:t>
+            </a:r>
+            <a:r>
+              <a:rPr lang="fr-FR" dirty="0" err="1" smtClean="0">
+                <a:solidFill>
+                  <a:srgbClr val="E8750C"/>
+                </a:solidFill>
+              </a:rPr>
+              <a:t>Scale</a:t>
+            </a:r>
+            <a:endParaRPr lang="fr-FR" dirty="0" smtClean="0">
+              <a:solidFill>
+                <a:srgbClr val="E8750C"/>
+              </a:solidFill>
+            </a:endParaRPr>
+          </a:p>
+          <a:p>
+            <a:pPr lvl="1"/>
+            <a:r>
+              <a:rPr lang="fr-FR" dirty="0" smtClean="0">
+                <a:solidFill>
+                  <a:srgbClr val="E8750C"/>
+                </a:solidFill>
+              </a:rPr>
+              <a:t>Prédiction</a:t>
+            </a:r>
+          </a:p>
+          <a:p>
+            <a:pPr lvl="1"/>
+            <a:r>
+              <a:rPr lang="fr-FR" dirty="0" smtClean="0">
+                <a:solidFill>
+                  <a:srgbClr val="E8750C"/>
+                </a:solidFill>
+              </a:rPr>
+              <a:t>Retourne l’info (POST)</a:t>
+            </a:r>
+            <a:endParaRPr lang="fr-FR" dirty="0">
+              <a:solidFill>
+                <a:srgbClr val="E8750C"/>
+              </a:solidFill>
+            </a:endParaRPr>
+          </a:p>
+        </p:txBody>
+      </p:sp>
+      <p:sp>
+        <p:nvSpPr>
+          <p:cNvPr id="4" name="Espace réservé de la date 3"/>
+          <p:cNvSpPr>
+            <a:spLocks noGrp="1"/>
+          </p:cNvSpPr>
+          <p:nvPr>
+            <p:ph type="dt" sz="half" idx="10"/>
+          </p:nvPr>
+        </p:nvSpPr>
+        <p:spPr/>
+        <p:txBody>
+          <a:bodyPr/>
+          <a:lstStyle/>
+          <a:p>
+            <a:fld id="{30547005-2CCE-4AAF-810C-C33FB4661996}" type="datetime1">
+              <a:rPr lang="fr-FR" smtClean="0"/>
+              <a:t>03/12/2017</a:t>
+            </a:fld>
+            <a:endParaRPr lang="fr-FR"/>
+          </a:p>
+        </p:txBody>
+      </p:sp>
+      <p:sp>
+        <p:nvSpPr>
+          <p:cNvPr id="5" name="Espace réservé du pied de page 4"/>
+          <p:cNvSpPr>
+            <a:spLocks noGrp="1"/>
+          </p:cNvSpPr>
+          <p:nvPr>
+            <p:ph type="ftr" sz="quarter" idx="11"/>
+          </p:nvPr>
+        </p:nvSpPr>
+        <p:spPr/>
+        <p:txBody>
+          <a:bodyPr/>
+          <a:lstStyle/>
+          <a:p>
+            <a:r>
+              <a:rPr lang="fr-FR" smtClean="0"/>
+              <a:t>MINE Nicolas</a:t>
+            </a:r>
+            <a:endParaRPr lang="fr-FR"/>
+          </a:p>
+        </p:txBody>
+      </p:sp>
+      <p:pic>
+        <p:nvPicPr>
+          <p:cNvPr id="1026" name="Picture 2" descr="F:\Nicolas\Documents\OpenClassRoom\P4\img\Acceuil.png"/>
+          <p:cNvPicPr>
+            <a:picLocks noChangeAspect="1" noChangeArrowheads="1"/>
+          </p:cNvPicPr>
+          <p:nvPr/>
+        </p:nvPicPr>
+        <p:blipFill rotWithShape="1">
+          <a:blip r:embed="rId2">
+            <a:extLst>
+              <a:ext uri="{28A0092B-C50C-407E-A947-70E740481C1C}">
+                <a14:useLocalDpi xmlns:a14="http://schemas.microsoft.com/office/drawing/2010/main" val="0"/>
+              </a:ext>
+            </a:extLst>
+          </a:blip>
+          <a:srcRect r="21406"/>
+          <a:stretch/>
+        </p:blipFill>
+        <p:spPr bwMode="auto">
+          <a:xfrm>
+            <a:off x="4499992" y="1700808"/>
+            <a:ext cx="4107954" cy="3745950"/>
+          </a:xfrm>
+          <a:prstGeom prst="rect">
+            <a:avLst/>
+          </a:prstGeom>
+          <a:noFill/>
+          <a:extLst>
+            <a:ext uri="{909E8E84-426E-40DD-AFC4-6F175D3DCCD1}">
+              <a14:hiddenFill xmlns:a14="http://schemas.microsoft.com/office/drawing/2010/main">
+                <a:solidFill>
+                  <a:srgbClr val="FFFFFF"/>
+                </a:solidFill>
+              </a14:hiddenFill>
+            </a:ext>
+          </a:extLst>
+        </p:spPr>
+      </p:pic>
+    </p:spTree>
+    <p:extLst>
+      <p:ext uri="{BB962C8B-B14F-4D97-AF65-F5344CB8AC3E}">
+        <p14:creationId xmlns:p14="http://schemas.microsoft.com/office/powerpoint/2010/main" val="443609323"/>
+      </p:ext>
+    </p:extLst>
+  </p:cSld>
+  <p:clrMapOvr>
+    <a:masterClrMapping/>
+  </p:clrMapOvr>
+  <p:timing>
+    <p:tnLst>
+      <p:par>
+        <p:cTn id="1" dur="indefinite" restart="never" nodeType="tmRoot"/>
+      </p:par>
+    </p:tnLst>
+  </p:timing>
+</p:sld>
+</file>
+
+<file path=ppt/slides/slide34.xml><?xml version="1.0" encoding="utf-8"?>
+<p:sld xmlns:a="http://schemas.openxmlformats.org/drawingml/2006/main" xmlns:r="http://schemas.openxmlformats.org/officeDocument/2006/relationships" xmlns:p="http://schemas.openxmlformats.org/presentationml/2006/main">
+  <p:cSld>
+    <p:spTree>
+      <p:nvGrpSpPr>
+        <p:cNvPr id="1" name=""/>
+        <p:cNvGrpSpPr/>
+        <p:nvPr/>
+      </p:nvGrpSpPr>
+      <p:grpSpPr>
+        <a:xfrm>
+          <a:off x="0" y="0"/>
+          <a:ext cx="0" cy="0"/>
+          <a:chOff x="0" y="0"/>
+          <a:chExt cx="0" cy="0"/>
+        </a:xfrm>
+      </p:grpSpPr>
+      <p:sp>
+        <p:nvSpPr>
+          <p:cNvPr id="2" name="Titre 1"/>
+          <p:cNvSpPr>
+            <a:spLocks noGrp="1"/>
+          </p:cNvSpPr>
+          <p:nvPr>
+            <p:ph type="title"/>
+          </p:nvPr>
+        </p:nvSpPr>
+        <p:spPr/>
+        <p:txBody>
+          <a:bodyPr/>
+          <a:lstStyle/>
+          <a:p>
+            <a:r>
               <a:rPr lang="fr-FR" dirty="0" smtClean="0"/>
               <a:t>Ouverture à l’amélioration</a:t>
             </a:r>
@@ -11184,7 +11523,10 @@
             </a:r>
           </a:p>
           <a:p>
-            <a:pPr lvl="2"/>
+            <a:pPr lvl="2">
+              <a:buFont typeface="Wingdings" pitchFamily="2" charset="2"/>
+              <a:buChar char="Ø"/>
+            </a:pPr>
             <a:r>
               <a:rPr lang="fr-FR" dirty="0" smtClean="0">
                 <a:solidFill>
@@ -11240,7 +11582,7 @@
           <a:p>
             <a:fld id="{30547005-2CCE-4AAF-810C-C33FB4661996}" type="datetime1">
               <a:rPr lang="fr-FR" smtClean="0"/>
-              <a:t>02/12/2017</a:t>
+              <a:t>03/12/2017</a:t>
             </a:fld>
             <a:endParaRPr lang="fr-FR"/>
           </a:p>
@@ -11621,7 +11963,7 @@
 </p:sld>
 </file>
 
-<file path=ppt/slides/slide33.xml><?xml version="1.0" encoding="utf-8"?>
+<file path=ppt/slides/slide35.xml><?xml version="1.0" encoding="utf-8"?>
 <p:sld xmlns:a="http://schemas.openxmlformats.org/drawingml/2006/main" xmlns:r="http://schemas.openxmlformats.org/officeDocument/2006/relationships" xmlns:p="http://schemas.openxmlformats.org/presentationml/2006/main">
   <p:cSld>
     <p:spTree>
@@ -11797,7 +12139,7 @@
           <a:p>
             <a:fld id="{30547005-2CCE-4AAF-810C-C33FB4661996}" type="datetime1">
               <a:rPr lang="fr-FR" smtClean="0"/>
-              <a:t>02/12/2017</a:t>
+              <a:t>03/12/2017</a:t>
             </a:fld>
             <a:endParaRPr lang="fr-FR"/>
           </a:p>
@@ -11939,7 +12281,7 @@
 </p:sld>
 </file>
 
-<file path=ppt/slides/slide34.xml><?xml version="1.0" encoding="utf-8"?>
+<file path=ppt/slides/slide36.xml><?xml version="1.0" encoding="utf-8"?>
 <p:sld xmlns:a="http://schemas.openxmlformats.org/drawingml/2006/main" xmlns:r="http://schemas.openxmlformats.org/officeDocument/2006/relationships" xmlns:p="http://schemas.openxmlformats.org/presentationml/2006/main">
   <p:cSld>
     <p:spTree>
@@ -12075,7 +12417,7 @@
           <a:p>
             <a:fld id="{30547005-2CCE-4AAF-810C-C33FB4661996}" type="datetime1">
               <a:rPr lang="fr-FR" smtClean="0"/>
-              <a:t>02/12/2017</a:t>
+              <a:t>03/12/2017</a:t>
             </a:fld>
             <a:endParaRPr lang="fr-FR"/>
           </a:p>
@@ -12212,7 +12554,7 @@
 </p:sld>
 </file>
 
-<file path=ppt/slides/slide35.xml><?xml version="1.0" encoding="utf-8"?>
+<file path=ppt/slides/slide37.xml><?xml version="1.0" encoding="utf-8"?>
 <p:sld xmlns:a="http://schemas.openxmlformats.org/drawingml/2006/main" xmlns:r="http://schemas.openxmlformats.org/officeDocument/2006/relationships" xmlns:p="http://schemas.openxmlformats.org/presentationml/2006/main">
   <p:cSld>
     <p:spTree>
@@ -12425,7 +12767,7 @@
           <a:p>
             <a:fld id="{30547005-2CCE-4AAF-810C-C33FB4661996}" type="datetime1">
               <a:rPr lang="fr-FR" smtClean="0"/>
-              <a:t>02/12/2017</a:t>
+              <a:t>03/12/2017</a:t>
             </a:fld>
             <a:endParaRPr lang="fr-FR"/>
           </a:p>
@@ -12525,7 +12867,7 @@
 </p:sld>
 </file>
 
-<file path=ppt/slides/slide36.xml><?xml version="1.0" encoding="utf-8"?>
+<file path=ppt/slides/slide38.xml><?xml version="1.0" encoding="utf-8"?>
 <p:sld xmlns:a="http://schemas.openxmlformats.org/drawingml/2006/main" xmlns:r="http://schemas.openxmlformats.org/officeDocument/2006/relationships" xmlns:p="http://schemas.openxmlformats.org/presentationml/2006/main">
   <p:cSld>
     <p:spTree>
@@ -12641,26 +12983,21 @@
           </a:p>
           <a:p>
             <a:r>
+              <a:rPr lang="fr-FR" sz="2800" dirty="0" err="1" smtClean="0">
+                <a:solidFill>
+                  <a:srgbClr val="E8750C"/>
+                </a:solidFill>
+              </a:rPr>
+              <a:t>Underfitting</a:t>
+            </a:r>
+            <a:r>
               <a:rPr lang="fr-FR" sz="2800" dirty="0" smtClean="0">
                 <a:solidFill>
                   <a:srgbClr val="E8750C"/>
                 </a:solidFill>
               </a:rPr>
-              <a:t>Modèle Linéaire </a:t>
-            </a:r>
-            <a:r>
-              <a:rPr lang="fr-FR" sz="2800" dirty="0" err="1" smtClean="0">
-                <a:solidFill>
-                  <a:srgbClr val="E8750C"/>
-                </a:solidFill>
-              </a:rPr>
-              <a:t>underfit</a:t>
-            </a:r>
-            <a:endParaRPr lang="fr-FR" sz="2800" dirty="0" smtClean="0">
-              <a:solidFill>
-                <a:srgbClr val="E8750C"/>
-              </a:solidFill>
-            </a:endParaRPr>
+              <a:t> du modèle linéaire</a:t>
+            </a:r>
           </a:p>
           <a:p>
             <a:r>
@@ -12706,10 +13043,16 @@
                   <a:srgbClr val="E8750C"/>
                 </a:solidFill>
               </a:rPr>
-              <a:t>Peu d’avantages pour les petits retard</a:t>
-            </a:r>
-          </a:p>
-          <a:p>
+              <a:t>Peu d’avantages pour les petits </a:t>
+            </a:r>
+            <a:r>
+              <a:rPr lang="fr-FR" dirty="0" smtClean="0">
+                <a:solidFill>
+                  <a:srgbClr val="E8750C"/>
+                </a:solidFill>
+              </a:rPr>
+              <a:t>retards</a:t>
+            </a:r>
             <a:endParaRPr lang="fr-FR" dirty="0" smtClean="0">
               <a:solidFill>
                 <a:srgbClr val="E8750C"/>
@@ -12723,6 +13066,13 @@
               </a:solidFill>
             </a:endParaRPr>
           </a:p>
+          <a:p>
+            <a:endParaRPr lang="fr-FR" dirty="0" smtClean="0">
+              <a:solidFill>
+                <a:srgbClr val="E8750C"/>
+              </a:solidFill>
+            </a:endParaRPr>
+          </a:p>
         </p:txBody>
       </p:sp>
       <p:sp>
@@ -12742,7 +13092,7 @@
           <a:p>
             <a:fld id="{30547005-2CCE-4AAF-810C-C33FB4661996}" type="datetime1">
               <a:rPr lang="fr-FR" smtClean="0"/>
-              <a:t>02/12/2017</a:t>
+              <a:t>03/12/2017</a:t>
             </a:fld>
             <a:endParaRPr lang="fr-FR"/>
           </a:p>
@@ -12791,7 +13141,7 @@
 </p:sld>
 </file>
 
-<file path=ppt/slides/slide37.xml><?xml version="1.0" encoding="utf-8"?>
+<file path=ppt/slides/slide39.xml><?xml version="1.0" encoding="utf-8"?>
 <p:sld xmlns:a="http://schemas.openxmlformats.org/drawingml/2006/main" xmlns:r="http://schemas.openxmlformats.org/officeDocument/2006/relationships" xmlns:p="http://schemas.openxmlformats.org/presentationml/2006/main">
   <p:cSld>
     <p:spTree>
@@ -12825,7 +13175,7 @@
           <a:p>
             <a:fld id="{30547005-2CCE-4AAF-810C-C33FB4661996}" type="datetime1">
               <a:rPr lang="fr-FR" smtClean="0"/>
-              <a:t>02/12/2017</a:t>
+              <a:t>03/12/2017</a:t>
             </a:fld>
             <a:endParaRPr lang="fr-FR"/>
           </a:p>
@@ -13201,7 +13551,7 @@
                   <a:srgbClr val="E8750C"/>
                 </a:solidFill>
               </a:rPr>
-              <a:t> imprévisibles</a:t>
+              <a:t> imprévisibles/semi-prévisible</a:t>
             </a:r>
           </a:p>
           <a:p>
@@ -13288,7 +13638,7 @@
                   <a:srgbClr val="E8750C"/>
                 </a:solidFill>
               </a:rPr>
-              <a:t>Aéroport de Départ et d’arrivé</a:t>
+              <a:t>Aéroport de départ (et d’arrivé)</a:t>
             </a:r>
           </a:p>
         </p:txBody>
@@ -13310,7 +13660,7 @@
           <a:p>
             <a:fld id="{30547005-2CCE-4AAF-810C-C33FB4661996}" type="datetime1">
               <a:rPr lang="fr-FR" smtClean="0"/>
-              <a:t>02/12/2017</a:t>
+              <a:t>03/12/2017</a:t>
             </a:fld>
             <a:endParaRPr lang="fr-FR"/>
           </a:p>
@@ -13639,20 +13989,12 @@
           </a:p>
           <a:p>
             <a:r>
-              <a:rPr lang="fr-FR" dirty="0" err="1" smtClean="0">
-                <a:solidFill>
-                  <a:srgbClr val="E8750C"/>
-                </a:solidFill>
-              </a:rPr>
-              <a:t>Aggrégation</a:t>
-            </a:r>
-            <a:r>
               <a:rPr lang="fr-FR" dirty="0" smtClean="0">
                 <a:solidFill>
                   <a:srgbClr val="E8750C"/>
                 </a:solidFill>
               </a:rPr>
-              <a:t> par semaine/jour de la semaine/heure/aéroport de départ</a:t>
+              <a:t>Agrégation par semaine/jour de la semaine/heure/aéroport de départ</a:t>
             </a:r>
             <a:endParaRPr lang="fr-FR" dirty="0">
               <a:solidFill>
@@ -13704,7 +14046,7 @@
           <a:p>
             <a:fld id="{30547005-2CCE-4AAF-810C-C33FB4661996}" type="datetime1">
               <a:rPr lang="fr-FR" smtClean="0"/>
-              <a:t>02/12/2017</a:t>
+              <a:t>03/12/2017</a:t>
             </a:fld>
             <a:endParaRPr lang="fr-FR"/>
           </a:p>
@@ -14029,7 +14371,7 @@
           <a:p>
             <a:fld id="{30547005-2CCE-4AAF-810C-C33FB4661996}" type="datetime1">
               <a:rPr lang="fr-FR" smtClean="0"/>
-              <a:t>02/12/2017</a:t>
+              <a:t>03/12/2017</a:t>
             </a:fld>
             <a:endParaRPr lang="fr-FR"/>
           </a:p>
@@ -14303,7 +14645,7 @@
           <a:p>
             <a:fld id="{30547005-2CCE-4AAF-810C-C33FB4661996}" type="datetime1">
               <a:rPr lang="fr-FR" smtClean="0"/>
-              <a:t>02/12/2017</a:t>
+              <a:t>03/12/2017</a:t>
             </a:fld>
             <a:endParaRPr lang="fr-FR"/>
           </a:p>
@@ -14685,7 +15027,7 @@
           <a:p>
             <a:fld id="{30547005-2CCE-4AAF-810C-C33FB4661996}" type="datetime1">
               <a:rPr lang="fr-FR" smtClean="0"/>
-              <a:t>02/12/2017</a:t>
+              <a:t>03/12/2017</a:t>
             </a:fld>
             <a:endParaRPr lang="fr-FR"/>
           </a:p>
@@ -14960,7 +15302,7 @@
           <a:p>
             <a:fld id="{30547005-2CCE-4AAF-810C-C33FB4661996}" type="datetime1">
               <a:rPr lang="fr-FR" smtClean="0"/>
-              <a:t>02/12/2017</a:t>
+              <a:t>03/12/2017</a:t>
             </a:fld>
             <a:endParaRPr lang="fr-FR"/>
           </a:p>

</xml_diff>

<commit_message>
ajout de l'URL de l'API
</commit_message>
<xml_diff>
--- a/P4/Presentation-projet_4.pptx
+++ b/P4/Presentation-projet_4.pptx
@@ -11146,12 +11146,12 @@
         <p:spPr/>
         <p:txBody>
           <a:bodyPr>
-            <a:normAutofit lnSpcReduction="10000"/>
+            <a:normAutofit/>
           </a:bodyPr>
           <a:lstStyle/>
           <a:p>
             <a:r>
-              <a:rPr lang="fr-FR" dirty="0" smtClean="0">
+              <a:rPr lang="fr-FR" sz="2800" dirty="0" smtClean="0">
                 <a:solidFill>
                   <a:srgbClr val="E8750C"/>
                 </a:solidFill>
@@ -11159,14 +11159,14 @@
               <a:t>Site </a:t>
             </a:r>
             <a:r>
-              <a:rPr lang="fr-FR" dirty="0" err="1" smtClean="0">
+              <a:rPr lang="fr-FR" sz="2800" dirty="0" err="1" smtClean="0">
                 <a:solidFill>
                   <a:srgbClr val="E8750C"/>
                 </a:solidFill>
               </a:rPr>
               <a:t>Flask</a:t>
             </a:r>
-            <a:endParaRPr lang="fr-FR" dirty="0" smtClean="0">
+            <a:endParaRPr lang="fr-FR" sz="2800" dirty="0" smtClean="0">
               <a:solidFill>
                 <a:srgbClr val="E8750C"/>
               </a:solidFill>
@@ -11174,7 +11174,7 @@
           </a:p>
           <a:p>
             <a:r>
-              <a:rPr lang="fr-FR" dirty="0" smtClean="0">
+              <a:rPr lang="fr-FR" sz="2800" dirty="0" smtClean="0">
                 <a:solidFill>
                   <a:srgbClr val="E8750C"/>
                 </a:solidFill>
@@ -11185,7 +11185,7 @@
           <a:p>
             <a:pPr lvl="1"/>
             <a:r>
-              <a:rPr lang="fr-FR" dirty="0" smtClean="0">
+              <a:rPr lang="fr-FR" sz="2400" dirty="0" smtClean="0">
                 <a:solidFill>
                   <a:srgbClr val="E8750C"/>
                 </a:solidFill>
@@ -11196,7 +11196,7 @@
           <a:p>
             <a:pPr lvl="1"/>
             <a:r>
-              <a:rPr lang="fr-FR" dirty="0" smtClean="0">
+              <a:rPr lang="fr-FR" sz="2400" dirty="0" smtClean="0">
                 <a:solidFill>
                   <a:srgbClr val="E8750C"/>
                 </a:solidFill>
@@ -11207,7 +11207,7 @@
           <a:p>
             <a:pPr lvl="1"/>
             <a:r>
-              <a:rPr lang="fr-FR" dirty="0" smtClean="0">
+              <a:rPr lang="fr-FR" sz="2400" dirty="0" smtClean="0">
                 <a:solidFill>
                   <a:srgbClr val="E8750C"/>
                 </a:solidFill>
@@ -11217,7 +11217,7 @@
           </a:p>
           <a:p>
             <a:r>
-              <a:rPr lang="fr-FR" dirty="0" smtClean="0">
+              <a:rPr lang="fr-FR" sz="2800" dirty="0" smtClean="0">
                 <a:solidFill>
                   <a:srgbClr val="E8750C"/>
                 </a:solidFill>
@@ -11228,7 +11228,7 @@
           <a:p>
             <a:pPr lvl="1"/>
             <a:r>
-              <a:rPr lang="fr-FR" dirty="0" smtClean="0">
+              <a:rPr lang="fr-FR" sz="2400" dirty="0" smtClean="0">
                 <a:solidFill>
                   <a:srgbClr val="E8750C"/>
                 </a:solidFill>
@@ -11236,14 +11236,14 @@
               <a:t>Encode/</a:t>
             </a:r>
             <a:r>
-              <a:rPr lang="fr-FR" dirty="0" err="1" smtClean="0">
+              <a:rPr lang="fr-FR" sz="2400" dirty="0" err="1" smtClean="0">
                 <a:solidFill>
                   <a:srgbClr val="E8750C"/>
                 </a:solidFill>
               </a:rPr>
               <a:t>Scale</a:t>
             </a:r>
-            <a:endParaRPr lang="fr-FR" dirty="0" smtClean="0">
+            <a:endParaRPr lang="fr-FR" sz="2400" dirty="0" smtClean="0">
               <a:solidFill>
                 <a:srgbClr val="E8750C"/>
               </a:solidFill>
@@ -11252,7 +11252,7 @@
           <a:p>
             <a:pPr lvl="1"/>
             <a:r>
-              <a:rPr lang="fr-FR" dirty="0" smtClean="0">
+              <a:rPr lang="fr-FR" sz="2400" dirty="0" smtClean="0">
                 <a:solidFill>
                   <a:srgbClr val="E8750C"/>
                 </a:solidFill>
@@ -11263,14 +11263,14 @@
           <a:p>
             <a:pPr lvl="1"/>
             <a:r>
-              <a:rPr lang="fr-FR" dirty="0" smtClean="0">
+              <a:rPr lang="fr-FR" sz="2400" dirty="0" smtClean="0">
                 <a:solidFill>
                   <a:srgbClr val="E8750C"/>
                 </a:solidFill>
               </a:rPr>
               <a:t>Retourne l’info (POST)</a:t>
             </a:r>
-            <a:endParaRPr lang="fr-FR" dirty="0">
+            <a:endParaRPr lang="fr-FR" sz="2400" dirty="0">
               <a:solidFill>
                 <a:srgbClr val="E8750C"/>
               </a:solidFill>
@@ -11363,6 +11363,39 @@
           </a:extLst>
         </p:spPr>
       </p:pic>
+      <p:sp>
+        <p:nvSpPr>
+          <p:cNvPr id="6" name="ZoneTexte 5"/>
+          <p:cNvSpPr txBox="1"/>
+          <p:nvPr/>
+        </p:nvSpPr>
+        <p:spPr>
+          <a:xfrm>
+            <a:off x="0" y="5890835"/>
+            <a:ext cx="9144000" cy="369332"/>
+          </a:xfrm>
+          <a:prstGeom prst="rect">
+            <a:avLst/>
+          </a:prstGeom>
+          <a:noFill/>
+        </p:spPr>
+        <p:txBody>
+          <a:bodyPr wrap="square" rtlCol="0">
+            <a:spAutoFit/>
+          </a:bodyPr>
+          <a:lstStyle/>
+          <a:p>
+            <a:pPr algn="ctr"/>
+            <a:r>
+              <a:rPr lang="fr-FR" dirty="0">
+                <a:hlinkClick r:id="rId3"/>
+              </a:rPr>
+              <a:t>http://coni57.pythonanywhere.com/p4/</a:t>
+            </a:r>
+            <a:endParaRPr lang="fr-FR" dirty="0"/>
+          </a:p>
+        </p:txBody>
+      </p:sp>
     </p:spTree>
     <p:extLst>
       <p:ext uri="{BB962C8B-B14F-4D97-AF65-F5344CB8AC3E}">
@@ -13043,21 +13076,8 @@
                   <a:srgbClr val="E8750C"/>
                 </a:solidFill>
               </a:rPr>
-              <a:t>Peu d’avantages pour les petits </a:t>
-            </a:r>
-            <a:r>
-              <a:rPr lang="fr-FR" dirty="0" smtClean="0">
-                <a:solidFill>
-                  <a:srgbClr val="E8750C"/>
-                </a:solidFill>
-              </a:rPr>
-              <a:t>retards</a:t>
-            </a:r>
-            <a:endParaRPr lang="fr-FR" dirty="0" smtClean="0">
-              <a:solidFill>
-                <a:srgbClr val="E8750C"/>
-              </a:solidFill>
-            </a:endParaRPr>
+              <a:t>Peu d’avantages pour les petits retards</a:t>
+            </a:r>
           </a:p>
           <a:p>
             <a:endParaRPr lang="fr-FR" dirty="0" smtClean="0">

</xml_diff>

<commit_message>
ajout de l'analyse des résidus
</commit_message>
<xml_diff>
--- a/P4/Presentation-projet_4.pptx
+++ b/P4/Presentation-projet_4.pptx
@@ -5,7 +5,7 @@
     <p:sldMasterId id="2147483648" r:id="rId1"/>
   </p:sldMasterIdLst>
   <p:notesMasterIdLst>
-    <p:notesMasterId r:id="rId41"/>
+    <p:notesMasterId r:id="rId42"/>
   </p:notesMasterIdLst>
   <p:sldIdLst>
     <p:sldId id="256" r:id="rId2"/>
@@ -40,13 +40,14 @@
     <p:sldId id="297" r:id="rId31"/>
     <p:sldId id="303" r:id="rId32"/>
     <p:sldId id="296" r:id="rId33"/>
-    <p:sldId id="298" r:id="rId34"/>
-    <p:sldId id="293" r:id="rId35"/>
-    <p:sldId id="282" r:id="rId36"/>
-    <p:sldId id="283" r:id="rId37"/>
-    <p:sldId id="299" r:id="rId38"/>
-    <p:sldId id="280" r:id="rId39"/>
-    <p:sldId id="300" r:id="rId40"/>
+    <p:sldId id="304" r:id="rId34"/>
+    <p:sldId id="298" r:id="rId35"/>
+    <p:sldId id="293" r:id="rId36"/>
+    <p:sldId id="282" r:id="rId37"/>
+    <p:sldId id="283" r:id="rId38"/>
+    <p:sldId id="299" r:id="rId39"/>
+    <p:sldId id="280" r:id="rId40"/>
+    <p:sldId id="300" r:id="rId41"/>
   </p:sldIdLst>
   <p:sldSz cx="9144000" cy="6858000" type="screen4x3"/>
   <p:notesSz cx="6858000" cy="9144000"/>
@@ -230,7 +231,7 @@
           <a:p>
             <a:fld id="{E66492E5-39EF-4EC5-9E99-7F0DBC26806B}" type="datetimeFigureOut">
               <a:rPr lang="fr-FR" smtClean="0"/>
-              <a:t>03/12/2017</a:t>
+              <a:t>04/12/2017</a:t>
             </a:fld>
             <a:endParaRPr lang="fr-FR"/>
           </a:p>
@@ -763,7 +764,7 @@
           <a:p>
             <a:fld id="{2A35F02A-33DF-42A4-9F54-2DFA5B84052E}" type="datetime1">
               <a:rPr lang="fr-FR" smtClean="0"/>
-              <a:t>03/12/2017</a:t>
+              <a:t>04/12/2017</a:t>
             </a:fld>
             <a:endParaRPr lang="fr-FR"/>
           </a:p>
@@ -937,7 +938,7 @@
           <a:p>
             <a:fld id="{AA7084F6-C923-4306-BC74-6AA1A26D5992}" type="datetime1">
               <a:rPr lang="fr-FR" smtClean="0"/>
-              <a:t>03/12/2017</a:t>
+              <a:t>04/12/2017</a:t>
             </a:fld>
             <a:endParaRPr lang="fr-FR"/>
           </a:p>
@@ -1121,7 +1122,7 @@
           <a:p>
             <a:fld id="{6B9DA1C8-56AA-40E0-92DC-CCF13B41CFF7}" type="datetime1">
               <a:rPr lang="fr-FR" smtClean="0"/>
-              <a:t>03/12/2017</a:t>
+              <a:t>04/12/2017</a:t>
             </a:fld>
             <a:endParaRPr lang="fr-FR"/>
           </a:p>
@@ -1295,7 +1296,7 @@
           <a:p>
             <a:fld id="{30547005-2CCE-4AAF-810C-C33FB4661996}" type="datetime1">
               <a:rPr lang="fr-FR" smtClean="0"/>
-              <a:t>03/12/2017</a:t>
+              <a:t>04/12/2017</a:t>
             </a:fld>
             <a:endParaRPr lang="fr-FR"/>
           </a:p>
@@ -1545,7 +1546,7 @@
           <a:p>
             <a:fld id="{3EBD0647-CE4F-4B82-BC14-997434234D2E}" type="datetime1">
               <a:rPr lang="fr-FR" smtClean="0"/>
-              <a:t>03/12/2017</a:t>
+              <a:t>04/12/2017</a:t>
             </a:fld>
             <a:endParaRPr lang="fr-FR"/>
           </a:p>
@@ -1837,7 +1838,7 @@
           <a:p>
             <a:fld id="{263CA1C6-1D15-44B1-8495-DE2EC5425D2F}" type="datetime1">
               <a:rPr lang="fr-FR" smtClean="0"/>
-              <a:t>03/12/2017</a:t>
+              <a:t>04/12/2017</a:t>
             </a:fld>
             <a:endParaRPr lang="fr-FR"/>
           </a:p>
@@ -2263,7 +2264,7 @@
           <a:p>
             <a:fld id="{5F86B07A-1301-4558-A6E0-D7A436826ECB}" type="datetime1">
               <a:rPr lang="fr-FR" smtClean="0"/>
-              <a:t>03/12/2017</a:t>
+              <a:t>04/12/2017</a:t>
             </a:fld>
             <a:endParaRPr lang="fr-FR"/>
           </a:p>
@@ -2385,7 +2386,7 @@
           <a:p>
             <a:fld id="{10CD6315-9A1E-41E9-BC28-33D394163B67}" type="datetime1">
               <a:rPr lang="fr-FR" smtClean="0"/>
-              <a:t>03/12/2017</a:t>
+              <a:t>04/12/2017</a:t>
             </a:fld>
             <a:endParaRPr lang="fr-FR"/>
           </a:p>
@@ -2484,7 +2485,7 @@
           <a:p>
             <a:fld id="{8EA7A85C-1960-4CA0-B72B-A39E81C20158}" type="datetime1">
               <a:rPr lang="fr-FR" smtClean="0"/>
-              <a:t>03/12/2017</a:t>
+              <a:t>04/12/2017</a:t>
             </a:fld>
             <a:endParaRPr lang="fr-FR"/>
           </a:p>
@@ -2765,7 +2766,7 @@
           <a:p>
             <a:fld id="{885A14C0-C539-4FC5-A6ED-ABABD975303B}" type="datetime1">
               <a:rPr lang="fr-FR" smtClean="0"/>
-              <a:t>03/12/2017</a:t>
+              <a:t>04/12/2017</a:t>
             </a:fld>
             <a:endParaRPr lang="fr-FR"/>
           </a:p>
@@ -3022,7 +3023,7 @@
           <a:p>
             <a:fld id="{D772F3C9-8121-4DF6-9420-FBC4A08EF57A}" type="datetime1">
               <a:rPr lang="fr-FR" smtClean="0"/>
-              <a:t>03/12/2017</a:t>
+              <a:t>04/12/2017</a:t>
             </a:fld>
             <a:endParaRPr lang="fr-FR"/>
           </a:p>
@@ -3260,7 +3261,7 @@
           <a:p>
             <a:fld id="{C13329EF-B01B-4D4B-83A1-AFBB7696C373}" type="datetime1">
               <a:rPr lang="fr-FR" smtClean="0"/>
-              <a:t>03/12/2017</a:t>
+              <a:t>04/12/2017</a:t>
             </a:fld>
             <a:endParaRPr lang="fr-FR"/>
           </a:p>
@@ -3760,7 +3761,7 @@
                   <a:srgbClr val="95023C"/>
                 </a:solidFill>
               </a:rPr>
-              <a:t>03/12/2017</a:t>
+              <a:t>04/12/2017</a:t>
             </a:fld>
             <a:endParaRPr lang="fr-FR" dirty="0">
               <a:solidFill>
@@ -4097,7 +4098,7 @@
           <a:p>
             <a:fld id="{30547005-2CCE-4AAF-810C-C33FB4661996}" type="datetime1">
               <a:rPr lang="fr-FR" smtClean="0"/>
-              <a:t>03/12/2017</a:t>
+              <a:t>04/12/2017</a:t>
             </a:fld>
             <a:endParaRPr lang="fr-FR"/>
           </a:p>
@@ -4329,7 +4330,7 @@
           <a:p>
             <a:fld id="{30547005-2CCE-4AAF-810C-C33FB4661996}" type="datetime1">
               <a:rPr lang="fr-FR" smtClean="0"/>
-              <a:t>03/12/2017</a:t>
+              <a:t>04/12/2017</a:t>
             </a:fld>
             <a:endParaRPr lang="fr-FR"/>
           </a:p>
@@ -4610,7 +4611,7 @@
           <a:p>
             <a:fld id="{30547005-2CCE-4AAF-810C-C33FB4661996}" type="datetime1">
               <a:rPr lang="fr-FR" smtClean="0"/>
-              <a:t>03/12/2017</a:t>
+              <a:t>04/12/2017</a:t>
             </a:fld>
             <a:endParaRPr lang="fr-FR"/>
           </a:p>
@@ -4893,7 +4894,7 @@
           <a:p>
             <a:fld id="{30547005-2CCE-4AAF-810C-C33FB4661996}" type="datetime1">
               <a:rPr lang="fr-FR" smtClean="0"/>
-              <a:t>03/12/2017</a:t>
+              <a:t>04/12/2017</a:t>
             </a:fld>
             <a:endParaRPr lang="fr-FR"/>
           </a:p>
@@ -5174,7 +5175,7 @@
           <a:p>
             <a:fld id="{30547005-2CCE-4AAF-810C-C33FB4661996}" type="datetime1">
               <a:rPr lang="fr-FR" smtClean="0"/>
-              <a:t>03/12/2017</a:t>
+              <a:t>04/12/2017</a:t>
             </a:fld>
             <a:endParaRPr lang="fr-FR"/>
           </a:p>
@@ -5689,7 +5690,7 @@
           <a:p>
             <a:fld id="{30547005-2CCE-4AAF-810C-C33FB4661996}" type="datetime1">
               <a:rPr lang="fr-FR" smtClean="0"/>
-              <a:t>03/12/2017</a:t>
+              <a:t>04/12/2017</a:t>
             </a:fld>
             <a:endParaRPr lang="fr-FR"/>
           </a:p>
@@ -6015,7 +6016,7 @@
           <a:p>
             <a:fld id="{30547005-2CCE-4AAF-810C-C33FB4661996}" type="datetime1">
               <a:rPr lang="fr-FR" smtClean="0"/>
-              <a:t>03/12/2017</a:t>
+              <a:t>04/12/2017</a:t>
             </a:fld>
             <a:endParaRPr lang="fr-FR"/>
           </a:p>
@@ -6389,7 +6390,7 @@
           <a:p>
             <a:fld id="{30547005-2CCE-4AAF-810C-C33FB4661996}" type="datetime1">
               <a:rPr lang="fr-FR" smtClean="0"/>
-              <a:t>03/12/2017</a:t>
+              <a:t>04/12/2017</a:t>
             </a:fld>
             <a:endParaRPr lang="fr-FR"/>
           </a:p>
@@ -6747,7 +6748,7 @@
           <a:p>
             <a:fld id="{30547005-2CCE-4AAF-810C-C33FB4661996}" type="datetime1">
               <a:rPr lang="fr-FR" smtClean="0"/>
-              <a:t>03/12/2017</a:t>
+              <a:t>04/12/2017</a:t>
             </a:fld>
             <a:endParaRPr lang="fr-FR"/>
           </a:p>
@@ -7308,7 +7309,7 @@
           <a:p>
             <a:fld id="{30547005-2CCE-4AAF-810C-C33FB4661996}" type="datetime1">
               <a:rPr lang="fr-FR" smtClean="0"/>
-              <a:t>03/12/2017</a:t>
+              <a:t>04/12/2017</a:t>
             </a:fld>
             <a:endParaRPr lang="fr-FR"/>
           </a:p>
@@ -7851,7 +7852,7 @@
           <a:p>
             <a:fld id="{30547005-2CCE-4AAF-810C-C33FB4661996}" type="datetime1">
               <a:rPr lang="fr-FR" smtClean="0"/>
-              <a:t>03/12/2017</a:t>
+              <a:t>04/12/2017</a:t>
             </a:fld>
             <a:endParaRPr lang="fr-FR"/>
           </a:p>
@@ -8115,7 +8116,7 @@
           <a:p>
             <a:fld id="{30547005-2CCE-4AAF-810C-C33FB4661996}" type="datetime1">
               <a:rPr lang="fr-FR" smtClean="0"/>
-              <a:t>03/12/2017</a:t>
+              <a:t>04/12/2017</a:t>
             </a:fld>
             <a:endParaRPr lang="fr-FR"/>
           </a:p>
@@ -8477,7 +8478,7 @@
           <a:p>
             <a:fld id="{30547005-2CCE-4AAF-810C-C33FB4661996}" type="datetime1">
               <a:rPr lang="fr-FR" smtClean="0"/>
-              <a:t>03/12/2017</a:t>
+              <a:t>04/12/2017</a:t>
             </a:fld>
             <a:endParaRPr lang="fr-FR"/>
           </a:p>
@@ -8794,7 +8795,7 @@
           <a:p>
             <a:fld id="{30547005-2CCE-4AAF-810C-C33FB4661996}" type="datetime1">
               <a:rPr lang="fr-FR" smtClean="0"/>
-              <a:t>03/12/2017</a:t>
+              <a:t>04/12/2017</a:t>
             </a:fld>
             <a:endParaRPr lang="fr-FR"/>
           </a:p>
@@ -8994,7 +8995,7 @@
           <a:p>
             <a:fld id="{30547005-2CCE-4AAF-810C-C33FB4661996}" type="datetime1">
               <a:rPr lang="fr-FR" smtClean="0"/>
-              <a:t>03/12/2017</a:t>
+              <a:t>04/12/2017</a:t>
             </a:fld>
             <a:endParaRPr lang="fr-FR" dirty="0"/>
           </a:p>
@@ -9164,7 +9165,7 @@
           <a:p>
             <a:fld id="{30547005-2CCE-4AAF-810C-C33FB4661996}" type="datetime1">
               <a:rPr lang="fr-FR" smtClean="0"/>
-              <a:t>03/12/2017</a:t>
+              <a:t>04/12/2017</a:t>
             </a:fld>
             <a:endParaRPr lang="fr-FR" dirty="0"/>
           </a:p>
@@ -9334,7 +9335,7 @@
           <a:p>
             <a:fld id="{30547005-2CCE-4AAF-810C-C33FB4661996}" type="datetime1">
               <a:rPr lang="fr-FR" smtClean="0"/>
-              <a:t>03/12/2017</a:t>
+              <a:t>04/12/2017</a:t>
             </a:fld>
             <a:endParaRPr lang="fr-FR" dirty="0"/>
           </a:p>
@@ -9535,7 +9536,7 @@
           <a:p>
             <a:fld id="{30547005-2CCE-4AAF-810C-C33FB4661996}" type="datetime1">
               <a:rPr lang="fr-FR" smtClean="0"/>
-              <a:t>03/12/2017</a:t>
+              <a:t>04/12/2017</a:t>
             </a:fld>
             <a:endParaRPr lang="fr-FR"/>
           </a:p>
@@ -9723,7 +9724,7 @@
           <a:p>
             <a:fld id="{30547005-2CCE-4AAF-810C-C33FB4661996}" type="datetime1">
               <a:rPr lang="fr-FR" smtClean="0"/>
-              <a:t>03/12/2017</a:t>
+              <a:t>04/12/2017</a:t>
             </a:fld>
             <a:endParaRPr lang="fr-FR"/>
           </a:p>
@@ -9911,7 +9912,7 @@
           <a:p>
             <a:fld id="{30547005-2CCE-4AAF-810C-C33FB4661996}" type="datetime1">
               <a:rPr lang="fr-FR" smtClean="0"/>
-              <a:t>03/12/2017</a:t>
+              <a:t>04/12/2017</a:t>
             </a:fld>
             <a:endParaRPr lang="fr-FR"/>
           </a:p>
@@ -10098,7 +10099,7 @@
           <a:p>
             <a:fld id="{30547005-2CCE-4AAF-810C-C33FB4661996}" type="datetime1">
               <a:rPr lang="fr-FR" smtClean="0"/>
-              <a:t>03/12/2017</a:t>
+              <a:t>04/12/2017</a:t>
             </a:fld>
             <a:endParaRPr lang="fr-FR"/>
           </a:p>
@@ -10412,7 +10413,7 @@
           <a:p>
             <a:fld id="{30547005-2CCE-4AAF-810C-C33FB4661996}" type="datetime1">
               <a:rPr lang="fr-FR" smtClean="0"/>
-              <a:t>03/12/2017</a:t>
+              <a:t>04/12/2017</a:t>
             </a:fld>
             <a:endParaRPr lang="fr-FR"/>
           </a:p>
@@ -10549,7 +10550,7 @@
           <a:p>
             <a:fld id="{30547005-2CCE-4AAF-810C-C33FB4661996}" type="datetime1">
               <a:rPr lang="fr-FR" smtClean="0"/>
-              <a:t>03/12/2017</a:t>
+              <a:t>04/12/2017</a:t>
             </a:fld>
             <a:endParaRPr lang="fr-FR"/>
           </a:p>
@@ -10750,7 +10751,7 @@
           <a:p>
             <a:fld id="{30547005-2CCE-4AAF-810C-C33FB4661996}" type="datetime1">
               <a:rPr lang="fr-FR" smtClean="0"/>
-              <a:t>03/12/2017</a:t>
+              <a:t>04/12/2017</a:t>
             </a:fld>
             <a:endParaRPr lang="fr-FR"/>
           </a:p>
@@ -10995,7 +10996,7 @@
           <a:p>
             <a:fld id="{30547005-2CCE-4AAF-810C-C33FB4661996}" type="datetime1">
               <a:rPr lang="fr-FR" smtClean="0"/>
-              <a:t>03/12/2017</a:t>
+              <a:t>04/12/2017</a:t>
             </a:fld>
             <a:endParaRPr lang="fr-FR"/>
           </a:p>
@@ -11126,10 +11127,9 @@
           <a:lstStyle/>
           <a:p>
             <a:r>
-              <a:rPr lang="fr-FR" dirty="0" smtClean="0"/>
-              <a:t>API</a:t>
-            </a:r>
-            <a:endParaRPr lang="fr-FR" dirty="0"/>
+              <a:rPr lang="fr-FR" dirty="0"/>
+              <a:t>Interprétation</a:t>
+            </a:r>
           </a:p>
         </p:txBody>
       </p:sp>
@@ -11151,131 +11151,19 @@
           <a:lstStyle/>
           <a:p>
             <a:r>
-              <a:rPr lang="fr-FR" sz="2800" dirty="0" smtClean="0">
-                <a:solidFill>
-                  <a:srgbClr val="E8750C"/>
-                </a:solidFill>
-              </a:rPr>
-              <a:t>Site </a:t>
-            </a:r>
-            <a:r>
-              <a:rPr lang="fr-FR" sz="2800" dirty="0" err="1" smtClean="0">
-                <a:solidFill>
-                  <a:srgbClr val="E8750C"/>
-                </a:solidFill>
-              </a:rPr>
-              <a:t>Flask</a:t>
-            </a:r>
-            <a:endParaRPr lang="fr-FR" sz="2800" dirty="0" smtClean="0">
+              <a:rPr lang="fr-FR" dirty="0" smtClean="0">
+                <a:solidFill>
+                  <a:srgbClr val="E8750C"/>
+                </a:solidFill>
+              </a:rPr>
+              <a:t>Analyse des résidus</a:t>
+            </a:r>
+            <a:endParaRPr lang="fr-FR" dirty="0" smtClean="0">
               <a:solidFill>
                 <a:srgbClr val="E8750C"/>
               </a:solidFill>
             </a:endParaRPr>
           </a:p>
-          <a:p>
-            <a:r>
-              <a:rPr lang="fr-FR" sz="2800" dirty="0" smtClean="0">
-                <a:solidFill>
-                  <a:srgbClr val="E8750C"/>
-                </a:solidFill>
-              </a:rPr>
-              <a:t>UI </a:t>
-            </a:r>
-          </a:p>
-          <a:p>
-            <a:pPr lvl="1"/>
-            <a:r>
-              <a:rPr lang="fr-FR" sz="2400" dirty="0" smtClean="0">
-                <a:solidFill>
-                  <a:srgbClr val="E8750C"/>
-                </a:solidFill>
-              </a:rPr>
-              <a:t>Aéroport de départ</a:t>
-            </a:r>
-          </a:p>
-          <a:p>
-            <a:pPr lvl="1"/>
-            <a:r>
-              <a:rPr lang="fr-FR" sz="2400" dirty="0" smtClean="0">
-                <a:solidFill>
-                  <a:srgbClr val="E8750C"/>
-                </a:solidFill>
-              </a:rPr>
-              <a:t>Date et Heure</a:t>
-            </a:r>
-          </a:p>
-          <a:p>
-            <a:pPr lvl="1"/>
-            <a:r>
-              <a:rPr lang="fr-FR" sz="2400" dirty="0" smtClean="0">
-                <a:solidFill>
-                  <a:srgbClr val="E8750C"/>
-                </a:solidFill>
-              </a:rPr>
-              <a:t>Compagnie</a:t>
-            </a:r>
-          </a:p>
-          <a:p>
-            <a:r>
-              <a:rPr lang="fr-FR" sz="2800" dirty="0" smtClean="0">
-                <a:solidFill>
-                  <a:srgbClr val="E8750C"/>
-                </a:solidFill>
-              </a:rPr>
-              <a:t>Server</a:t>
-            </a:r>
-          </a:p>
-          <a:p>
-            <a:pPr lvl="1"/>
-            <a:r>
-              <a:rPr lang="fr-FR" sz="2400" dirty="0" smtClean="0">
-                <a:solidFill>
-                  <a:srgbClr val="E8750C"/>
-                </a:solidFill>
-              </a:rPr>
-              <a:t>Encode/</a:t>
-            </a:r>
-            <a:r>
-              <a:rPr lang="fr-FR" sz="2400" dirty="0" err="1" smtClean="0">
-                <a:solidFill>
-                  <a:srgbClr val="E8750C"/>
-                </a:solidFill>
-              </a:rPr>
-              <a:t>Scale</a:t>
-            </a:r>
-            <a:endParaRPr lang="fr-FR" sz="2400" dirty="0" smtClean="0">
-              <a:solidFill>
-                <a:srgbClr val="E8750C"/>
-              </a:solidFill>
-            </a:endParaRPr>
-          </a:p>
-          <a:p>
-            <a:pPr lvl="1"/>
-            <a:r>
-              <a:rPr lang="fr-FR" sz="2400" dirty="0" smtClean="0">
-                <a:solidFill>
-                  <a:srgbClr val="E8750C"/>
-                </a:solidFill>
-              </a:rPr>
-              <a:t>Prédiction</a:t>
-            </a:r>
-          </a:p>
-          <a:p>
-            <a:pPr lvl="1"/>
-            <a:r>
-              <a:rPr lang="fr-FR" sz="2400" dirty="0" smtClean="0">
-                <a:solidFill>
-                  <a:srgbClr val="E8750C"/>
-                </a:solidFill>
-              </a:rPr>
-              <a:t>Retourne l’info (POST)</a:t>
-            </a:r>
-            <a:endParaRPr lang="fr-FR" sz="2400" dirty="0">
-              <a:solidFill>
-                <a:srgbClr val="E8750C"/>
-              </a:solidFill>
-            </a:endParaRPr>
-          </a:p>
         </p:txBody>
       </p:sp>
       <p:sp>
@@ -11295,7 +11183,7 @@
           <a:p>
             <a:fld id="{30547005-2CCE-4AAF-810C-C33FB4661996}" type="datetime1">
               <a:rPr lang="fr-FR" smtClean="0"/>
-              <a:t>03/12/2017</a:t>
+              <a:t>04/12/2017</a:t>
             </a:fld>
             <a:endParaRPr lang="fr-FR"/>
           </a:p>
@@ -11326,7 +11214,7 @@
       </p:sp>
       <p:pic>
         <p:nvPicPr>
-          <p:cNvPr id="1026" name="Picture 2" descr="F:\Nicolas\Documents\OpenClassRoom\P4\img\Acceuil.png"/>
+          <p:cNvPr id="1026" name="Picture 2" descr="F:\Nicolas\Documents\OpenClassRoom\P4\img\interval.png"/>
           <p:cNvPicPr>
             <a:picLocks noChangeAspect="1" noChangeArrowheads="1"/>
           </p:cNvPicPr>
@@ -11334,19 +11222,29 @@
         </p:nvPicPr>
         <p:blipFill rotWithShape="1">
           <a:blip r:embed="rId2">
+            <a:clrChange>
+              <a:clrFrom>
+                <a:srgbClr val="FFFFFF"/>
+              </a:clrFrom>
+              <a:clrTo>
+                <a:srgbClr val="FFFFFF">
+                  <a:alpha val="0"/>
+                </a:srgbClr>
+              </a:clrTo>
+            </a:clrChange>
             <a:extLst>
               <a:ext uri="{28A0092B-C50C-407E-A947-70E740481C1C}">
                 <a14:useLocalDpi xmlns:a14="http://schemas.microsoft.com/office/drawing/2010/main" val="0"/>
               </a:ext>
             </a:extLst>
           </a:blip>
-          <a:srcRect r="21406"/>
+          <a:srcRect l="8468" t="9341" r="8523" b="5815"/>
           <a:stretch/>
         </p:blipFill>
         <p:spPr bwMode="auto">
           <a:xfrm>
-            <a:off x="4499992" y="1700808"/>
-            <a:ext cx="4107954" cy="3745950"/>
+            <a:off x="542924" y="2085975"/>
+            <a:ext cx="7830369" cy="4446290"/>
           </a:xfrm>
           <a:prstGeom prst="rect">
             <a:avLst/>
@@ -11371,8 +11269,8 @@
         </p:nvSpPr>
         <p:spPr>
           <a:xfrm>
-            <a:off x="0" y="5890835"/>
-            <a:ext cx="9144000" cy="369332"/>
+            <a:off x="1691680" y="3210654"/>
+            <a:ext cx="3240360" cy="861774"/>
           </a:xfrm>
           <a:prstGeom prst="rect">
             <a:avLst/>
@@ -11385,21 +11283,60 @@
           </a:bodyPr>
           <a:lstStyle/>
           <a:p>
-            <a:pPr algn="ctr"/>
+            <a:pPr lvl="1"/>
             <a:r>
               <a:rPr lang="fr-FR" dirty="0">
-                <a:hlinkClick r:id="rId3"/>
-              </a:rPr>
-              <a:t>http://coni57.pythonanywhere.com/p4/</a:t>
-            </a:r>
-            <a:endParaRPr lang="fr-FR" dirty="0"/>
+                <a:solidFill>
+                  <a:srgbClr val="95023C"/>
+                </a:solidFill>
+              </a:rPr>
+              <a:t>R²  = 0,06</a:t>
+            </a:r>
+          </a:p>
+          <a:p>
+            <a:pPr lvl="1"/>
+            <a:r>
+              <a:rPr lang="fr-FR" dirty="0" err="1">
+                <a:solidFill>
+                  <a:srgbClr val="95023C"/>
+                </a:solidFill>
+              </a:rPr>
+              <a:t>Interval</a:t>
+            </a:r>
+            <a:r>
+              <a:rPr lang="fr-FR" dirty="0">
+                <a:solidFill>
+                  <a:srgbClr val="95023C"/>
+                </a:solidFill>
+              </a:rPr>
+              <a:t> à 95% </a:t>
+            </a:r>
+            <a:r>
+              <a:rPr lang="fr-FR" dirty="0" smtClean="0">
+                <a:solidFill>
+                  <a:srgbClr val="95023C"/>
+                </a:solidFill>
+              </a:rPr>
+              <a:t>= [-</a:t>
+            </a:r>
+            <a:r>
+              <a:rPr lang="fr-FR" dirty="0">
+                <a:solidFill>
+                  <a:srgbClr val="95023C"/>
+                </a:solidFill>
+              </a:rPr>
+              <a:t>44, 15]</a:t>
+            </a:r>
+          </a:p>
+          <a:p>
+            <a:endParaRPr lang="fr-FR" sz="1400" dirty="0"/>
           </a:p>
         </p:txBody>
       </p:sp>
     </p:spTree>
     <p:extLst>
       <p:ext uri="{BB962C8B-B14F-4D97-AF65-F5344CB8AC3E}">
-        <p14:creationId xmlns:p14="http://schemas.microsoft.com/office/powerpoint/2010/main" val="443609323"/>
+        <p14:creationId xmlns:p14="http://schemas.microsoft.com/office/powerpoint/2010/main" val="1789063657"/>
       </p:ext>
     </p:extLst>
   </p:cSld>
@@ -11450,6 +11387,329 @@
           <a:p>
             <a:r>
               <a:rPr lang="fr-FR" dirty="0" smtClean="0"/>
+              <a:t>API</a:t>
+            </a:r>
+            <a:endParaRPr lang="fr-FR" dirty="0"/>
+          </a:p>
+        </p:txBody>
+      </p:sp>
+      <p:sp>
+        <p:nvSpPr>
+          <p:cNvPr id="3" name="Espace réservé du contenu 2"/>
+          <p:cNvSpPr>
+            <a:spLocks noGrp="1"/>
+          </p:cNvSpPr>
+          <p:nvPr>
+            <p:ph idx="1"/>
+          </p:nvPr>
+        </p:nvSpPr>
+        <p:spPr/>
+        <p:txBody>
+          <a:bodyPr>
+            <a:normAutofit/>
+          </a:bodyPr>
+          <a:lstStyle/>
+          <a:p>
+            <a:r>
+              <a:rPr lang="fr-FR" sz="2800" dirty="0" smtClean="0">
+                <a:solidFill>
+                  <a:srgbClr val="E8750C"/>
+                </a:solidFill>
+              </a:rPr>
+              <a:t>Site </a:t>
+            </a:r>
+            <a:r>
+              <a:rPr lang="fr-FR" sz="2800" dirty="0" err="1" smtClean="0">
+                <a:solidFill>
+                  <a:srgbClr val="E8750C"/>
+                </a:solidFill>
+              </a:rPr>
+              <a:t>Flask</a:t>
+            </a:r>
+            <a:endParaRPr lang="fr-FR" sz="2800" dirty="0" smtClean="0">
+              <a:solidFill>
+                <a:srgbClr val="E8750C"/>
+              </a:solidFill>
+            </a:endParaRPr>
+          </a:p>
+          <a:p>
+            <a:r>
+              <a:rPr lang="fr-FR" sz="2800" dirty="0" smtClean="0">
+                <a:solidFill>
+                  <a:srgbClr val="E8750C"/>
+                </a:solidFill>
+              </a:rPr>
+              <a:t>UI </a:t>
+            </a:r>
+          </a:p>
+          <a:p>
+            <a:pPr lvl="1"/>
+            <a:r>
+              <a:rPr lang="fr-FR" sz="2400" dirty="0" smtClean="0">
+                <a:solidFill>
+                  <a:srgbClr val="E8750C"/>
+                </a:solidFill>
+              </a:rPr>
+              <a:t>Aéroport de départ</a:t>
+            </a:r>
+          </a:p>
+          <a:p>
+            <a:pPr lvl="1"/>
+            <a:r>
+              <a:rPr lang="fr-FR" sz="2400" dirty="0" smtClean="0">
+                <a:solidFill>
+                  <a:srgbClr val="E8750C"/>
+                </a:solidFill>
+              </a:rPr>
+              <a:t>Date et Heure</a:t>
+            </a:r>
+          </a:p>
+          <a:p>
+            <a:pPr lvl="1"/>
+            <a:r>
+              <a:rPr lang="fr-FR" sz="2400" dirty="0" smtClean="0">
+                <a:solidFill>
+                  <a:srgbClr val="E8750C"/>
+                </a:solidFill>
+              </a:rPr>
+              <a:t>Compagnie</a:t>
+            </a:r>
+          </a:p>
+          <a:p>
+            <a:r>
+              <a:rPr lang="fr-FR" sz="2800" dirty="0" smtClean="0">
+                <a:solidFill>
+                  <a:srgbClr val="E8750C"/>
+                </a:solidFill>
+              </a:rPr>
+              <a:t>Server</a:t>
+            </a:r>
+          </a:p>
+          <a:p>
+            <a:pPr lvl="1"/>
+            <a:r>
+              <a:rPr lang="fr-FR" sz="2400" dirty="0" smtClean="0">
+                <a:solidFill>
+                  <a:srgbClr val="E8750C"/>
+                </a:solidFill>
+              </a:rPr>
+              <a:t>Encode/</a:t>
+            </a:r>
+            <a:r>
+              <a:rPr lang="fr-FR" sz="2400" dirty="0" err="1" smtClean="0">
+                <a:solidFill>
+                  <a:srgbClr val="E8750C"/>
+                </a:solidFill>
+              </a:rPr>
+              <a:t>Scale</a:t>
+            </a:r>
+            <a:endParaRPr lang="fr-FR" sz="2400" dirty="0" smtClean="0">
+              <a:solidFill>
+                <a:srgbClr val="E8750C"/>
+              </a:solidFill>
+            </a:endParaRPr>
+          </a:p>
+          <a:p>
+            <a:pPr lvl="1"/>
+            <a:r>
+              <a:rPr lang="fr-FR" sz="2400" dirty="0" smtClean="0">
+                <a:solidFill>
+                  <a:srgbClr val="E8750C"/>
+                </a:solidFill>
+              </a:rPr>
+              <a:t>Prédiction</a:t>
+            </a:r>
+          </a:p>
+          <a:p>
+            <a:pPr lvl="1"/>
+            <a:r>
+              <a:rPr lang="fr-FR" sz="2400" dirty="0" smtClean="0">
+                <a:solidFill>
+                  <a:srgbClr val="E8750C"/>
+                </a:solidFill>
+              </a:rPr>
+              <a:t>Retourne l’info (POST)</a:t>
+            </a:r>
+            <a:endParaRPr lang="fr-FR" sz="2400" dirty="0">
+              <a:solidFill>
+                <a:srgbClr val="E8750C"/>
+              </a:solidFill>
+            </a:endParaRPr>
+          </a:p>
+        </p:txBody>
+      </p:sp>
+      <p:sp>
+        <p:nvSpPr>
+          <p:cNvPr id="4" name="Espace réservé de la date 3"/>
+          <p:cNvSpPr>
+            <a:spLocks noGrp="1"/>
+          </p:cNvSpPr>
+          <p:nvPr>
+            <p:ph type="dt" sz="half" idx="10"/>
+          </p:nvPr>
+        </p:nvSpPr>
+        <p:spPr/>
+        <p:txBody>
+          <a:bodyPr/>
+          <a:lstStyle/>
+          <a:p>
+            <a:fld id="{30547005-2CCE-4AAF-810C-C33FB4661996}" type="datetime1">
+              <a:rPr lang="fr-FR" smtClean="0"/>
+              <a:t>04/12/2017</a:t>
+            </a:fld>
+            <a:endParaRPr lang="fr-FR"/>
+          </a:p>
+        </p:txBody>
+      </p:sp>
+      <p:sp>
+        <p:nvSpPr>
+          <p:cNvPr id="5" name="Espace réservé du pied de page 4"/>
+          <p:cNvSpPr>
+            <a:spLocks noGrp="1"/>
+          </p:cNvSpPr>
+          <p:nvPr>
+            <p:ph type="ftr" sz="quarter" idx="11"/>
+          </p:nvPr>
+        </p:nvSpPr>
+        <p:spPr/>
+        <p:txBody>
+          <a:bodyPr/>
+          <a:lstStyle/>
+          <a:p>
+            <a:r>
+              <a:rPr lang="fr-FR" smtClean="0"/>
+              <a:t>MINE Nicolas</a:t>
+            </a:r>
+            <a:endParaRPr lang="fr-FR"/>
+          </a:p>
+        </p:txBody>
+      </p:sp>
+      <p:pic>
+        <p:nvPicPr>
+          <p:cNvPr id="1026" name="Picture 2" descr="F:\Nicolas\Documents\OpenClassRoom\P4\img\Acceuil.png"/>
+          <p:cNvPicPr>
+            <a:picLocks noChangeAspect="1" noChangeArrowheads="1"/>
+          </p:cNvPicPr>
+          <p:nvPr/>
+        </p:nvPicPr>
+        <p:blipFill rotWithShape="1">
+          <a:blip r:embed="rId2">
+            <a:extLst>
+              <a:ext uri="{28A0092B-C50C-407E-A947-70E740481C1C}">
+                <a14:useLocalDpi xmlns:a14="http://schemas.microsoft.com/office/drawing/2010/main" val="0"/>
+              </a:ext>
+            </a:extLst>
+          </a:blip>
+          <a:srcRect r="21406"/>
+          <a:stretch/>
+        </p:blipFill>
+        <p:spPr bwMode="auto">
+          <a:xfrm>
+            <a:off x="4499992" y="1700808"/>
+            <a:ext cx="4107954" cy="3745950"/>
+          </a:xfrm>
+          <a:prstGeom prst="rect">
+            <a:avLst/>
+          </a:prstGeom>
+          <a:noFill/>
+          <a:extLst>
+            <a:ext uri="{909E8E84-426E-40DD-AFC4-6F175D3DCCD1}">
+              <a14:hiddenFill xmlns:a14="http://schemas.microsoft.com/office/drawing/2010/main">
+                <a:solidFill>
+                  <a:srgbClr val="FFFFFF"/>
+                </a:solidFill>
+              </a14:hiddenFill>
+            </a:ext>
+          </a:extLst>
+        </p:spPr>
+      </p:pic>
+      <p:sp>
+        <p:nvSpPr>
+          <p:cNvPr id="6" name="ZoneTexte 5"/>
+          <p:cNvSpPr txBox="1"/>
+          <p:nvPr/>
+        </p:nvSpPr>
+        <p:spPr>
+          <a:xfrm>
+            <a:off x="0" y="5890835"/>
+            <a:ext cx="9144000" cy="369332"/>
+          </a:xfrm>
+          <a:prstGeom prst="rect">
+            <a:avLst/>
+          </a:prstGeom>
+          <a:noFill/>
+        </p:spPr>
+        <p:txBody>
+          <a:bodyPr wrap="square" rtlCol="0">
+            <a:spAutoFit/>
+          </a:bodyPr>
+          <a:lstStyle/>
+          <a:p>
+            <a:pPr algn="ctr"/>
+            <a:r>
+              <a:rPr lang="fr-FR" dirty="0">
+                <a:hlinkClick r:id="rId3"/>
+              </a:rPr>
+              <a:t>http://coni57.pythonanywhere.com/p4/</a:t>
+            </a:r>
+            <a:endParaRPr lang="fr-FR" dirty="0"/>
+          </a:p>
+        </p:txBody>
+      </p:sp>
+    </p:spTree>
+    <p:extLst>
+      <p:ext uri="{BB962C8B-B14F-4D97-AF65-F5344CB8AC3E}">
+        <p14:creationId xmlns:p14="http://schemas.microsoft.com/office/powerpoint/2010/main" val="443609323"/>
+      </p:ext>
+    </p:extLst>
+  </p:cSld>
+  <p:clrMapOvr>
+    <a:masterClrMapping/>
+  </p:clrMapOvr>
+  <p:timing>
+    <p:tnLst>
+      <p:par>
+        <p:cTn id="1" dur="indefinite" restart="never" nodeType="tmRoot"/>
+      </p:par>
+    </p:tnLst>
+  </p:timing>
+</p:sld>
+</file>
+
+<file path=ppt/slides/slide35.xml><?xml version="1.0" encoding="utf-8"?>
+<p:sld xmlns:a="http://schemas.openxmlformats.org/drawingml/2006/main" xmlns:r="http://schemas.openxmlformats.org/officeDocument/2006/relationships" xmlns:p="http://schemas.openxmlformats.org/presentationml/2006/main">
+  <p:cSld>
+    <p:spTree>
+      <p:nvGrpSpPr>
+        <p:cNvPr id="1" name=""/>
+        <p:cNvGrpSpPr/>
+        <p:nvPr/>
+      </p:nvGrpSpPr>
+      <p:grpSpPr>
+        <a:xfrm>
+          <a:off x="0" y="0"/>
+          <a:ext cx="0" cy="0"/>
+          <a:chOff x="0" y="0"/>
+          <a:chExt cx="0" cy="0"/>
+        </a:xfrm>
+      </p:grpSpPr>
+      <p:sp>
+        <p:nvSpPr>
+          <p:cNvPr id="2" name="Titre 1"/>
+          <p:cNvSpPr>
+            <a:spLocks noGrp="1"/>
+          </p:cNvSpPr>
+          <p:nvPr>
+            <p:ph type="title"/>
+          </p:nvPr>
+        </p:nvSpPr>
+        <p:spPr/>
+        <p:txBody>
+          <a:bodyPr/>
+          <a:lstStyle/>
+          <a:p>
+            <a:r>
+              <a:rPr lang="fr-FR" dirty="0" smtClean="0"/>
               <a:t>Ouverture à l’amélioration</a:t>
             </a:r>
             <a:endParaRPr lang="fr-FR" dirty="0"/>
@@ -11615,7 +11875,7 @@
           <a:p>
             <a:fld id="{30547005-2CCE-4AAF-810C-C33FB4661996}" type="datetime1">
               <a:rPr lang="fr-FR" smtClean="0"/>
-              <a:t>03/12/2017</a:t>
+              <a:t>04/12/2017</a:t>
             </a:fld>
             <a:endParaRPr lang="fr-FR"/>
           </a:p>
@@ -11996,7 +12256,7 @@
 </p:sld>
 </file>
 
-<file path=ppt/slides/slide35.xml><?xml version="1.0" encoding="utf-8"?>
+<file path=ppt/slides/slide36.xml><?xml version="1.0" encoding="utf-8"?>
 <p:sld xmlns:a="http://schemas.openxmlformats.org/drawingml/2006/main" xmlns:r="http://schemas.openxmlformats.org/officeDocument/2006/relationships" xmlns:p="http://schemas.openxmlformats.org/presentationml/2006/main">
   <p:cSld>
     <p:spTree>
@@ -12172,7 +12432,7 @@
           <a:p>
             <a:fld id="{30547005-2CCE-4AAF-810C-C33FB4661996}" type="datetime1">
               <a:rPr lang="fr-FR" smtClean="0"/>
-              <a:t>03/12/2017</a:t>
+              <a:t>04/12/2017</a:t>
             </a:fld>
             <a:endParaRPr lang="fr-FR"/>
           </a:p>
@@ -12314,7 +12574,7 @@
 </p:sld>
 </file>
 
-<file path=ppt/slides/slide36.xml><?xml version="1.0" encoding="utf-8"?>
+<file path=ppt/slides/slide37.xml><?xml version="1.0" encoding="utf-8"?>
 <p:sld xmlns:a="http://schemas.openxmlformats.org/drawingml/2006/main" xmlns:r="http://schemas.openxmlformats.org/officeDocument/2006/relationships" xmlns:p="http://schemas.openxmlformats.org/presentationml/2006/main">
   <p:cSld>
     <p:spTree>
@@ -12450,7 +12710,7 @@
           <a:p>
             <a:fld id="{30547005-2CCE-4AAF-810C-C33FB4661996}" type="datetime1">
               <a:rPr lang="fr-FR" smtClean="0"/>
-              <a:t>03/12/2017</a:t>
+              <a:t>04/12/2017</a:t>
             </a:fld>
             <a:endParaRPr lang="fr-FR"/>
           </a:p>
@@ -12587,7 +12847,7 @@
 </p:sld>
 </file>
 
-<file path=ppt/slides/slide37.xml><?xml version="1.0" encoding="utf-8"?>
+<file path=ppt/slides/slide38.xml><?xml version="1.0" encoding="utf-8"?>
 <p:sld xmlns:a="http://schemas.openxmlformats.org/drawingml/2006/main" xmlns:r="http://schemas.openxmlformats.org/officeDocument/2006/relationships" xmlns:p="http://schemas.openxmlformats.org/presentationml/2006/main">
   <p:cSld>
     <p:spTree>
@@ -12800,7 +13060,7 @@
           <a:p>
             <a:fld id="{30547005-2CCE-4AAF-810C-C33FB4661996}" type="datetime1">
               <a:rPr lang="fr-FR" smtClean="0"/>
-              <a:t>03/12/2017</a:t>
+              <a:t>04/12/2017</a:t>
             </a:fld>
             <a:endParaRPr lang="fr-FR"/>
           </a:p>
@@ -12900,7 +13160,7 @@
 </p:sld>
 </file>
 
-<file path=ppt/slides/slide38.xml><?xml version="1.0" encoding="utf-8"?>
+<file path=ppt/slides/slide39.xml><?xml version="1.0" encoding="utf-8"?>
 <p:sld xmlns:a="http://schemas.openxmlformats.org/drawingml/2006/main" xmlns:r="http://schemas.openxmlformats.org/officeDocument/2006/relationships" xmlns:p="http://schemas.openxmlformats.org/presentationml/2006/main">
   <p:cSld>
     <p:spTree>
@@ -13112,7 +13372,7 @@
           <a:p>
             <a:fld id="{30547005-2CCE-4AAF-810C-C33FB4661996}" type="datetime1">
               <a:rPr lang="fr-FR" smtClean="0"/>
-              <a:t>03/12/2017</a:t>
+              <a:t>04/12/2017</a:t>
             </a:fld>
             <a:endParaRPr lang="fr-FR"/>
           </a:p>
@@ -13161,7 +13421,7 @@
 </p:sld>
 </file>
 
-<file path=ppt/slides/slide39.xml><?xml version="1.0" encoding="utf-8"?>
+<file path=ppt/slides/slide4.xml><?xml version="1.0" encoding="utf-8"?>
 <p:sld xmlns:a="http://schemas.openxmlformats.org/drawingml/2006/main" xmlns:r="http://schemas.openxmlformats.org/officeDocument/2006/relationships" xmlns:p="http://schemas.openxmlformats.org/presentationml/2006/main">
   <p:cSld>
     <p:spTree>
@@ -13180,6 +13440,367 @@
       </p:grpSpPr>
       <p:sp>
         <p:nvSpPr>
+          <p:cNvPr id="2" name="Titre 1"/>
+          <p:cNvSpPr>
+            <a:spLocks noGrp="1"/>
+          </p:cNvSpPr>
+          <p:nvPr>
+            <p:ph type="title"/>
+          </p:nvPr>
+        </p:nvSpPr>
+        <p:spPr/>
+        <p:txBody>
+          <a:bodyPr/>
+          <a:lstStyle/>
+          <a:p>
+            <a:r>
+              <a:rPr lang="fr-FR" dirty="0" smtClean="0"/>
+              <a:t>Nettoyage</a:t>
+            </a:r>
+            <a:endParaRPr lang="fr-FR" dirty="0"/>
+          </a:p>
+        </p:txBody>
+      </p:sp>
+      <p:sp>
+        <p:nvSpPr>
+          <p:cNvPr id="3" name="Espace réservé du contenu 2"/>
+          <p:cNvSpPr>
+            <a:spLocks noGrp="1"/>
+          </p:cNvSpPr>
+          <p:nvPr>
+            <p:ph idx="1"/>
+          </p:nvPr>
+        </p:nvSpPr>
+        <p:spPr/>
+        <p:txBody>
+          <a:bodyPr>
+            <a:normAutofit fontScale="85000" lnSpcReduction="20000"/>
+          </a:bodyPr>
+          <a:lstStyle/>
+          <a:p>
+            <a:r>
+              <a:rPr lang="fr-FR" dirty="0" smtClean="0">
+                <a:solidFill>
+                  <a:srgbClr val="E8750C"/>
+                </a:solidFill>
+              </a:rPr>
+              <a:t>Nettoyage global</a:t>
+            </a:r>
+          </a:p>
+          <a:p>
+            <a:pPr lvl="1"/>
+            <a:r>
+              <a:rPr lang="fr-FR" dirty="0" smtClean="0">
+                <a:solidFill>
+                  <a:srgbClr val="E8750C"/>
+                </a:solidFill>
+              </a:rPr>
+              <a:t>Suppression de </a:t>
+            </a:r>
+            <a:r>
+              <a:rPr lang="fr-FR" dirty="0" err="1" smtClean="0">
+                <a:solidFill>
+                  <a:srgbClr val="E8750C"/>
+                </a:solidFill>
+              </a:rPr>
+              <a:t>Features</a:t>
+            </a:r>
+            <a:endParaRPr lang="fr-FR" dirty="0" smtClean="0">
+              <a:solidFill>
+                <a:srgbClr val="E8750C"/>
+              </a:solidFill>
+            </a:endParaRPr>
+          </a:p>
+          <a:p>
+            <a:pPr lvl="2"/>
+            <a:r>
+              <a:rPr lang="fr-FR" dirty="0" err="1" smtClean="0">
+                <a:solidFill>
+                  <a:srgbClr val="E8750C"/>
+                </a:solidFill>
+              </a:rPr>
+              <a:t>Features</a:t>
+            </a:r>
+            <a:r>
+              <a:rPr lang="fr-FR" dirty="0" smtClean="0">
+                <a:solidFill>
+                  <a:srgbClr val="E8750C"/>
+                </a:solidFill>
+              </a:rPr>
+              <a:t> </a:t>
+            </a:r>
+            <a:r>
+              <a:rPr lang="fr-FR" dirty="0" err="1" smtClean="0">
+                <a:solidFill>
+                  <a:srgbClr val="E8750C"/>
+                </a:solidFill>
+              </a:rPr>
+              <a:t>redontantes</a:t>
+            </a:r>
+            <a:endParaRPr lang="fr-FR" dirty="0">
+              <a:solidFill>
+                <a:srgbClr val="E8750C"/>
+              </a:solidFill>
+            </a:endParaRPr>
+          </a:p>
+          <a:p>
+            <a:pPr lvl="3"/>
+            <a:r>
+              <a:rPr lang="fr-FR" dirty="0" err="1" smtClean="0">
+                <a:solidFill>
+                  <a:srgbClr val="E8750C"/>
+                </a:solidFill>
+              </a:rPr>
+              <a:t>AirlineID</a:t>
+            </a:r>
+            <a:r>
+              <a:rPr lang="fr-FR" dirty="0" smtClean="0">
+                <a:solidFill>
+                  <a:srgbClr val="E8750C"/>
+                </a:solidFill>
+              </a:rPr>
+              <a:t>, Carrier, dates, </a:t>
+            </a:r>
+            <a:r>
+              <a:rPr lang="fr-FR" dirty="0" err="1" smtClean="0">
+                <a:solidFill>
+                  <a:srgbClr val="E8750C"/>
+                </a:solidFill>
+              </a:rPr>
+              <a:t>airports</a:t>
+            </a:r>
+            <a:r>
+              <a:rPr lang="fr-FR" dirty="0" smtClean="0">
+                <a:solidFill>
+                  <a:srgbClr val="E8750C"/>
+                </a:solidFill>
+              </a:rPr>
+              <a:t>, …</a:t>
+            </a:r>
+          </a:p>
+          <a:p>
+            <a:pPr lvl="2"/>
+            <a:r>
+              <a:rPr lang="fr-FR" dirty="0" err="1" smtClean="0">
+                <a:solidFill>
+                  <a:srgbClr val="E8750C"/>
+                </a:solidFill>
+              </a:rPr>
+              <a:t>Features</a:t>
+            </a:r>
+            <a:r>
+              <a:rPr lang="fr-FR" dirty="0" smtClean="0">
+                <a:solidFill>
+                  <a:srgbClr val="E8750C"/>
+                </a:solidFill>
+              </a:rPr>
+              <a:t> inconnus</a:t>
+            </a:r>
+          </a:p>
+          <a:p>
+            <a:pPr lvl="3"/>
+            <a:r>
+              <a:rPr lang="fr-FR" dirty="0" err="1" smtClean="0">
+                <a:solidFill>
+                  <a:srgbClr val="E8750C"/>
+                </a:solidFill>
+              </a:rPr>
+              <a:t>Tail</a:t>
+            </a:r>
+            <a:r>
+              <a:rPr lang="fr-FR" dirty="0" smtClean="0">
+                <a:solidFill>
+                  <a:srgbClr val="E8750C"/>
+                </a:solidFill>
+              </a:rPr>
+              <a:t> </a:t>
+            </a:r>
+            <a:r>
+              <a:rPr lang="fr-FR" dirty="0" err="1" smtClean="0">
+                <a:solidFill>
+                  <a:srgbClr val="E8750C"/>
+                </a:solidFill>
+              </a:rPr>
+              <a:t>Number</a:t>
+            </a:r>
+            <a:endParaRPr lang="fr-FR" dirty="0" smtClean="0">
+              <a:solidFill>
+                <a:srgbClr val="E8750C"/>
+              </a:solidFill>
+            </a:endParaRPr>
+          </a:p>
+          <a:p>
+            <a:pPr lvl="2"/>
+            <a:r>
+              <a:rPr lang="fr-FR" dirty="0" err="1" smtClean="0">
+                <a:solidFill>
+                  <a:srgbClr val="E8750C"/>
+                </a:solidFill>
+              </a:rPr>
+              <a:t>Features</a:t>
+            </a:r>
+            <a:r>
+              <a:rPr lang="fr-FR" dirty="0" smtClean="0">
+                <a:solidFill>
+                  <a:srgbClr val="E8750C"/>
+                </a:solidFill>
+              </a:rPr>
+              <a:t> inutiles</a:t>
+            </a:r>
+          </a:p>
+          <a:p>
+            <a:pPr lvl="3"/>
+            <a:r>
+              <a:rPr lang="fr-FR" dirty="0" smtClean="0">
+                <a:solidFill>
+                  <a:srgbClr val="E8750C"/>
+                </a:solidFill>
+              </a:rPr>
+              <a:t>Flight </a:t>
+            </a:r>
+            <a:r>
+              <a:rPr lang="fr-FR" dirty="0" err="1" smtClean="0">
+                <a:solidFill>
+                  <a:srgbClr val="E8750C"/>
+                </a:solidFill>
+              </a:rPr>
+              <a:t>number</a:t>
+            </a:r>
+            <a:r>
+              <a:rPr lang="fr-FR" dirty="0" smtClean="0">
+                <a:solidFill>
+                  <a:srgbClr val="E8750C"/>
+                </a:solidFill>
+              </a:rPr>
+              <a:t>, </a:t>
+            </a:r>
+            <a:r>
+              <a:rPr lang="fr-FR" dirty="0" err="1" smtClean="0">
+                <a:solidFill>
+                  <a:srgbClr val="E8750C"/>
+                </a:solidFill>
+              </a:rPr>
+              <a:t>wheelsON</a:t>
+            </a:r>
+            <a:r>
+              <a:rPr lang="fr-FR" dirty="0" smtClean="0">
+                <a:solidFill>
+                  <a:srgbClr val="E8750C"/>
+                </a:solidFill>
+              </a:rPr>
+              <a:t>/OFF</a:t>
+            </a:r>
+          </a:p>
+          <a:p>
+            <a:pPr lvl="2"/>
+            <a:r>
+              <a:rPr lang="fr-FR" dirty="0" err="1" smtClean="0">
+                <a:solidFill>
+                  <a:srgbClr val="E8750C"/>
+                </a:solidFill>
+              </a:rPr>
+              <a:t>Features</a:t>
+            </a:r>
+            <a:r>
+              <a:rPr lang="fr-FR" dirty="0" smtClean="0">
+                <a:solidFill>
+                  <a:srgbClr val="E8750C"/>
+                </a:solidFill>
+              </a:rPr>
+              <a:t> imprévisibles/semi-prévisible</a:t>
+            </a:r>
+          </a:p>
+          <a:p>
+            <a:pPr lvl="3"/>
+            <a:r>
+              <a:rPr lang="fr-FR" dirty="0" err="1" smtClean="0">
+                <a:solidFill>
+                  <a:srgbClr val="E8750C"/>
+                </a:solidFill>
+              </a:rPr>
+              <a:t>Weather</a:t>
+            </a:r>
+            <a:r>
+              <a:rPr lang="fr-FR" dirty="0" smtClean="0">
+                <a:solidFill>
+                  <a:srgbClr val="E8750C"/>
+                </a:solidFill>
+              </a:rPr>
+              <a:t> Delay, Security Delay</a:t>
+            </a:r>
+          </a:p>
+          <a:p>
+            <a:pPr lvl="1"/>
+            <a:r>
+              <a:rPr lang="fr-FR" dirty="0" err="1" smtClean="0">
+                <a:solidFill>
+                  <a:srgbClr val="E8750C"/>
+                </a:solidFill>
+              </a:rPr>
+              <a:t>Features</a:t>
+            </a:r>
+            <a:r>
+              <a:rPr lang="fr-FR" dirty="0" smtClean="0">
+                <a:solidFill>
+                  <a:srgbClr val="E8750C"/>
+                </a:solidFill>
+              </a:rPr>
+              <a:t> nécessaires</a:t>
+            </a:r>
+          </a:p>
+          <a:p>
+            <a:pPr lvl="2"/>
+            <a:r>
+              <a:rPr lang="fr-FR" dirty="0" smtClean="0">
+                <a:solidFill>
+                  <a:srgbClr val="E8750C"/>
+                </a:solidFill>
+              </a:rPr>
+              <a:t>Date</a:t>
+            </a:r>
+            <a:r>
+              <a:rPr lang="fr-FR" dirty="0">
+                <a:solidFill>
+                  <a:srgbClr val="E8750C"/>
+                </a:solidFill>
+              </a:rPr>
+              <a:t> </a:t>
+            </a:r>
+            <a:r>
+              <a:rPr lang="fr-FR" dirty="0" smtClean="0">
+                <a:solidFill>
+                  <a:srgbClr val="E8750C"/>
+                </a:solidFill>
+              </a:rPr>
+              <a:t>et heure</a:t>
+            </a:r>
+          </a:p>
+          <a:p>
+            <a:pPr lvl="2"/>
+            <a:r>
+              <a:rPr lang="fr-FR" dirty="0" smtClean="0">
+                <a:solidFill>
+                  <a:srgbClr val="E8750C"/>
+                </a:solidFill>
+              </a:rPr>
+              <a:t>Compagnie</a:t>
+            </a:r>
+          </a:p>
+          <a:p>
+            <a:pPr lvl="2"/>
+            <a:r>
+              <a:rPr lang="fr-FR" dirty="0" smtClean="0">
+                <a:solidFill>
+                  <a:srgbClr val="E8750C"/>
+                </a:solidFill>
+              </a:rPr>
+              <a:t>Aéroport de départ (et d’arrivé)</a:t>
+            </a:r>
+          </a:p>
+        </p:txBody>
+      </p:sp>
+      <p:sp>
+        <p:nvSpPr>
           <p:cNvPr id="4" name="Espace réservé de la date 3"/>
           <p:cNvSpPr>
             <a:spLocks noGrp="1"/>
@@ -13195,7 +13816,90 @@
           <a:p>
             <a:fld id="{30547005-2CCE-4AAF-810C-C33FB4661996}" type="datetime1">
               <a:rPr lang="fr-FR" smtClean="0"/>
-              <a:t>03/12/2017</a:t>
+              <a:t>04/12/2017</a:t>
+            </a:fld>
+            <a:endParaRPr lang="fr-FR"/>
+          </a:p>
+        </p:txBody>
+      </p:sp>
+      <p:sp>
+        <p:nvSpPr>
+          <p:cNvPr id="5" name="Espace réservé du pied de page 4"/>
+          <p:cNvSpPr>
+            <a:spLocks noGrp="1"/>
+          </p:cNvSpPr>
+          <p:nvPr>
+            <p:ph type="ftr" sz="quarter" idx="11"/>
+          </p:nvPr>
+        </p:nvSpPr>
+        <p:spPr/>
+        <p:txBody>
+          <a:bodyPr/>
+          <a:lstStyle/>
+          <a:p>
+            <a:r>
+              <a:rPr lang="fr-FR" dirty="0" smtClean="0"/>
+              <a:t>MINE Nicolas</a:t>
+            </a:r>
+            <a:endParaRPr lang="fr-FR" dirty="0"/>
+          </a:p>
+        </p:txBody>
+      </p:sp>
+    </p:spTree>
+    <p:extLst>
+      <p:ext uri="{BB962C8B-B14F-4D97-AF65-F5344CB8AC3E}">
+        <p14:creationId xmlns:p14="http://schemas.microsoft.com/office/powerpoint/2010/main" val="1149838544"/>
+      </p:ext>
+    </p:extLst>
+  </p:cSld>
+  <p:clrMapOvr>
+    <a:masterClrMapping/>
+  </p:clrMapOvr>
+  <p:timing>
+    <p:tnLst>
+      <p:par>
+        <p:cTn id="1" dur="indefinite" restart="never" nodeType="tmRoot"/>
+      </p:par>
+    </p:tnLst>
+  </p:timing>
+</p:sld>
+</file>
+
+<file path=ppt/slides/slide40.xml><?xml version="1.0" encoding="utf-8"?>
+<p:sld xmlns:a="http://schemas.openxmlformats.org/drawingml/2006/main" xmlns:r="http://schemas.openxmlformats.org/officeDocument/2006/relationships" xmlns:p="http://schemas.openxmlformats.org/presentationml/2006/main">
+  <p:cSld>
+    <p:spTree>
+      <p:nvGrpSpPr>
+        <p:cNvPr id="1" name=""/>
+        <p:cNvGrpSpPr/>
+        <p:nvPr/>
+      </p:nvGrpSpPr>
+      <p:grpSpPr>
+        <a:xfrm>
+          <a:off x="0" y="0"/>
+          <a:ext cx="0" cy="0"/>
+          <a:chOff x="0" y="0"/>
+          <a:chExt cx="0" cy="0"/>
+        </a:xfrm>
+      </p:grpSpPr>
+      <p:sp>
+        <p:nvSpPr>
+          <p:cNvPr id="4" name="Espace réservé de la date 3"/>
+          <p:cNvSpPr>
+            <a:spLocks noGrp="1"/>
+          </p:cNvSpPr>
+          <p:nvPr>
+            <p:ph type="dt" sz="half" idx="10"/>
+          </p:nvPr>
+        </p:nvSpPr>
+        <p:spPr/>
+        <p:txBody>
+          <a:bodyPr/>
+          <a:lstStyle/>
+          <a:p>
+            <a:fld id="{30547005-2CCE-4AAF-810C-C33FB4661996}" type="datetime1">
+              <a:rPr lang="fr-FR" smtClean="0"/>
+              <a:t>04/12/2017</a:t>
             </a:fld>
             <a:endParaRPr lang="fr-FR"/>
           </a:p>
@@ -13285,450 +13989,6 @@
 </p:sld>
 </file>
 
-<file path=ppt/slides/slide4.xml><?xml version="1.0" encoding="utf-8"?>
-<p:sld xmlns:a="http://schemas.openxmlformats.org/drawingml/2006/main" xmlns:r="http://schemas.openxmlformats.org/officeDocument/2006/relationships" xmlns:p="http://schemas.openxmlformats.org/presentationml/2006/main">
-  <p:cSld>
-    <p:spTree>
-      <p:nvGrpSpPr>
-        <p:cNvPr id="1" name=""/>
-        <p:cNvGrpSpPr/>
-        <p:nvPr/>
-      </p:nvGrpSpPr>
-      <p:grpSpPr>
-        <a:xfrm>
-          <a:off x="0" y="0"/>
-          <a:ext cx="0" cy="0"/>
-          <a:chOff x="0" y="0"/>
-          <a:chExt cx="0" cy="0"/>
-        </a:xfrm>
-      </p:grpSpPr>
-      <p:sp>
-        <p:nvSpPr>
-          <p:cNvPr id="2" name="Titre 1"/>
-          <p:cNvSpPr>
-            <a:spLocks noGrp="1"/>
-          </p:cNvSpPr>
-          <p:nvPr>
-            <p:ph type="title"/>
-          </p:nvPr>
-        </p:nvSpPr>
-        <p:spPr/>
-        <p:txBody>
-          <a:bodyPr/>
-          <a:lstStyle/>
-          <a:p>
-            <a:r>
-              <a:rPr lang="fr-FR" dirty="0" smtClean="0"/>
-              <a:t>Nettoyage</a:t>
-            </a:r>
-            <a:endParaRPr lang="fr-FR" dirty="0"/>
-          </a:p>
-        </p:txBody>
-      </p:sp>
-      <p:sp>
-        <p:nvSpPr>
-          <p:cNvPr id="3" name="Espace réservé du contenu 2"/>
-          <p:cNvSpPr>
-            <a:spLocks noGrp="1"/>
-          </p:cNvSpPr>
-          <p:nvPr>
-            <p:ph idx="1"/>
-          </p:nvPr>
-        </p:nvSpPr>
-        <p:spPr/>
-        <p:txBody>
-          <a:bodyPr>
-            <a:normAutofit fontScale="85000" lnSpcReduction="20000"/>
-          </a:bodyPr>
-          <a:lstStyle/>
-          <a:p>
-            <a:r>
-              <a:rPr lang="fr-FR" dirty="0" smtClean="0">
-                <a:solidFill>
-                  <a:srgbClr val="E8750C"/>
-                </a:solidFill>
-              </a:rPr>
-              <a:t>Nettoyage global</a:t>
-            </a:r>
-          </a:p>
-          <a:p>
-            <a:pPr lvl="1"/>
-            <a:r>
-              <a:rPr lang="fr-FR" dirty="0" smtClean="0">
-                <a:solidFill>
-                  <a:srgbClr val="E8750C"/>
-                </a:solidFill>
-              </a:rPr>
-              <a:t>Suppression de </a:t>
-            </a:r>
-            <a:r>
-              <a:rPr lang="fr-FR" dirty="0" err="1" smtClean="0">
-                <a:solidFill>
-                  <a:srgbClr val="E8750C"/>
-                </a:solidFill>
-              </a:rPr>
-              <a:t>Features</a:t>
-            </a:r>
-            <a:endParaRPr lang="fr-FR" dirty="0" smtClean="0">
-              <a:solidFill>
-                <a:srgbClr val="E8750C"/>
-              </a:solidFill>
-            </a:endParaRPr>
-          </a:p>
-          <a:p>
-            <a:pPr lvl="2"/>
-            <a:r>
-              <a:rPr lang="fr-FR" dirty="0" err="1" smtClean="0">
-                <a:solidFill>
-                  <a:srgbClr val="E8750C"/>
-                </a:solidFill>
-              </a:rPr>
-              <a:t>Features</a:t>
-            </a:r>
-            <a:r>
-              <a:rPr lang="fr-FR" dirty="0" smtClean="0">
-                <a:solidFill>
-                  <a:srgbClr val="E8750C"/>
-                </a:solidFill>
-              </a:rPr>
-              <a:t> </a:t>
-            </a:r>
-            <a:r>
-              <a:rPr lang="fr-FR" dirty="0" err="1" smtClean="0">
-                <a:solidFill>
-                  <a:srgbClr val="E8750C"/>
-                </a:solidFill>
-              </a:rPr>
-              <a:t>redontantes</a:t>
-            </a:r>
-            <a:endParaRPr lang="fr-FR" dirty="0">
-              <a:solidFill>
-                <a:srgbClr val="E8750C"/>
-              </a:solidFill>
-            </a:endParaRPr>
-          </a:p>
-          <a:p>
-            <a:pPr lvl="3"/>
-            <a:r>
-              <a:rPr lang="fr-FR" dirty="0" err="1" smtClean="0">
-                <a:solidFill>
-                  <a:srgbClr val="E8750C"/>
-                </a:solidFill>
-              </a:rPr>
-              <a:t>AirlineID</a:t>
-            </a:r>
-            <a:r>
-              <a:rPr lang="fr-FR" dirty="0" smtClean="0">
-                <a:solidFill>
-                  <a:srgbClr val="E8750C"/>
-                </a:solidFill>
-              </a:rPr>
-              <a:t>, Carrier, dates, </a:t>
-            </a:r>
-            <a:r>
-              <a:rPr lang="fr-FR" dirty="0" err="1" smtClean="0">
-                <a:solidFill>
-                  <a:srgbClr val="E8750C"/>
-                </a:solidFill>
-              </a:rPr>
-              <a:t>airports</a:t>
-            </a:r>
-            <a:r>
-              <a:rPr lang="fr-FR" dirty="0" smtClean="0">
-                <a:solidFill>
-                  <a:srgbClr val="E8750C"/>
-                </a:solidFill>
-              </a:rPr>
-              <a:t>, …</a:t>
-            </a:r>
-          </a:p>
-          <a:p>
-            <a:pPr lvl="2"/>
-            <a:r>
-              <a:rPr lang="fr-FR" dirty="0" err="1" smtClean="0">
-                <a:solidFill>
-                  <a:srgbClr val="E8750C"/>
-                </a:solidFill>
-              </a:rPr>
-              <a:t>Features</a:t>
-            </a:r>
-            <a:r>
-              <a:rPr lang="fr-FR" dirty="0" smtClean="0">
-                <a:solidFill>
-                  <a:srgbClr val="E8750C"/>
-                </a:solidFill>
-              </a:rPr>
-              <a:t> inconnus</a:t>
-            </a:r>
-          </a:p>
-          <a:p>
-            <a:pPr lvl="3"/>
-            <a:r>
-              <a:rPr lang="fr-FR" dirty="0" err="1" smtClean="0">
-                <a:solidFill>
-                  <a:srgbClr val="E8750C"/>
-                </a:solidFill>
-              </a:rPr>
-              <a:t>Tail</a:t>
-            </a:r>
-            <a:r>
-              <a:rPr lang="fr-FR" dirty="0" smtClean="0">
-                <a:solidFill>
-                  <a:srgbClr val="E8750C"/>
-                </a:solidFill>
-              </a:rPr>
-              <a:t> </a:t>
-            </a:r>
-            <a:r>
-              <a:rPr lang="fr-FR" dirty="0" err="1" smtClean="0">
-                <a:solidFill>
-                  <a:srgbClr val="E8750C"/>
-                </a:solidFill>
-              </a:rPr>
-              <a:t>Number</a:t>
-            </a:r>
-            <a:endParaRPr lang="fr-FR" dirty="0" smtClean="0">
-              <a:solidFill>
-                <a:srgbClr val="E8750C"/>
-              </a:solidFill>
-            </a:endParaRPr>
-          </a:p>
-          <a:p>
-            <a:pPr lvl="2"/>
-            <a:r>
-              <a:rPr lang="fr-FR" dirty="0" err="1" smtClean="0">
-                <a:solidFill>
-                  <a:srgbClr val="E8750C"/>
-                </a:solidFill>
-              </a:rPr>
-              <a:t>Features</a:t>
-            </a:r>
-            <a:r>
-              <a:rPr lang="fr-FR" dirty="0" smtClean="0">
-                <a:solidFill>
-                  <a:srgbClr val="E8750C"/>
-                </a:solidFill>
-              </a:rPr>
-              <a:t> inutiles</a:t>
-            </a:r>
-          </a:p>
-          <a:p>
-            <a:pPr lvl="3"/>
-            <a:r>
-              <a:rPr lang="fr-FR" dirty="0" smtClean="0">
-                <a:solidFill>
-                  <a:srgbClr val="E8750C"/>
-                </a:solidFill>
-              </a:rPr>
-              <a:t>Flight </a:t>
-            </a:r>
-            <a:r>
-              <a:rPr lang="fr-FR" dirty="0" err="1" smtClean="0">
-                <a:solidFill>
-                  <a:srgbClr val="E8750C"/>
-                </a:solidFill>
-              </a:rPr>
-              <a:t>number</a:t>
-            </a:r>
-            <a:r>
-              <a:rPr lang="fr-FR" dirty="0" smtClean="0">
-                <a:solidFill>
-                  <a:srgbClr val="E8750C"/>
-                </a:solidFill>
-              </a:rPr>
-              <a:t>, </a:t>
-            </a:r>
-            <a:r>
-              <a:rPr lang="fr-FR" dirty="0" err="1" smtClean="0">
-                <a:solidFill>
-                  <a:srgbClr val="E8750C"/>
-                </a:solidFill>
-              </a:rPr>
-              <a:t>wheelsON</a:t>
-            </a:r>
-            <a:r>
-              <a:rPr lang="fr-FR" dirty="0" smtClean="0">
-                <a:solidFill>
-                  <a:srgbClr val="E8750C"/>
-                </a:solidFill>
-              </a:rPr>
-              <a:t>/OFF</a:t>
-            </a:r>
-          </a:p>
-          <a:p>
-            <a:pPr lvl="2"/>
-            <a:r>
-              <a:rPr lang="fr-FR" dirty="0" err="1" smtClean="0">
-                <a:solidFill>
-                  <a:srgbClr val="E8750C"/>
-                </a:solidFill>
-              </a:rPr>
-              <a:t>Features</a:t>
-            </a:r>
-            <a:r>
-              <a:rPr lang="fr-FR" dirty="0" smtClean="0">
-                <a:solidFill>
-                  <a:srgbClr val="E8750C"/>
-                </a:solidFill>
-              </a:rPr>
-              <a:t> imprévisibles/semi-prévisible</a:t>
-            </a:r>
-          </a:p>
-          <a:p>
-            <a:pPr lvl="3"/>
-            <a:r>
-              <a:rPr lang="fr-FR" dirty="0" err="1" smtClean="0">
-                <a:solidFill>
-                  <a:srgbClr val="E8750C"/>
-                </a:solidFill>
-              </a:rPr>
-              <a:t>Weather</a:t>
-            </a:r>
-            <a:r>
-              <a:rPr lang="fr-FR" dirty="0" smtClean="0">
-                <a:solidFill>
-                  <a:srgbClr val="E8750C"/>
-                </a:solidFill>
-              </a:rPr>
-              <a:t> Delay, Security Delay</a:t>
-            </a:r>
-          </a:p>
-          <a:p>
-            <a:pPr lvl="1"/>
-            <a:r>
-              <a:rPr lang="fr-FR" dirty="0" err="1" smtClean="0">
-                <a:solidFill>
-                  <a:srgbClr val="E8750C"/>
-                </a:solidFill>
-              </a:rPr>
-              <a:t>Features</a:t>
-            </a:r>
-            <a:r>
-              <a:rPr lang="fr-FR" dirty="0" smtClean="0">
-                <a:solidFill>
-                  <a:srgbClr val="E8750C"/>
-                </a:solidFill>
-              </a:rPr>
-              <a:t> nécessaires</a:t>
-            </a:r>
-          </a:p>
-          <a:p>
-            <a:pPr lvl="2"/>
-            <a:r>
-              <a:rPr lang="fr-FR" dirty="0" smtClean="0">
-                <a:solidFill>
-                  <a:srgbClr val="E8750C"/>
-                </a:solidFill>
-              </a:rPr>
-              <a:t>Date</a:t>
-            </a:r>
-            <a:r>
-              <a:rPr lang="fr-FR" dirty="0">
-                <a:solidFill>
-                  <a:srgbClr val="E8750C"/>
-                </a:solidFill>
-              </a:rPr>
-              <a:t> </a:t>
-            </a:r>
-            <a:r>
-              <a:rPr lang="fr-FR" dirty="0" smtClean="0">
-                <a:solidFill>
-                  <a:srgbClr val="E8750C"/>
-                </a:solidFill>
-              </a:rPr>
-              <a:t>et heure</a:t>
-            </a:r>
-          </a:p>
-          <a:p>
-            <a:pPr lvl="2"/>
-            <a:r>
-              <a:rPr lang="fr-FR" dirty="0" smtClean="0">
-                <a:solidFill>
-                  <a:srgbClr val="E8750C"/>
-                </a:solidFill>
-              </a:rPr>
-              <a:t>Compagnie</a:t>
-            </a:r>
-          </a:p>
-          <a:p>
-            <a:pPr lvl="2"/>
-            <a:r>
-              <a:rPr lang="fr-FR" dirty="0" smtClean="0">
-                <a:solidFill>
-                  <a:srgbClr val="E8750C"/>
-                </a:solidFill>
-              </a:rPr>
-              <a:t>Aéroport de départ (et d’arrivé)</a:t>
-            </a:r>
-          </a:p>
-        </p:txBody>
-      </p:sp>
-      <p:sp>
-        <p:nvSpPr>
-          <p:cNvPr id="4" name="Espace réservé de la date 3"/>
-          <p:cNvSpPr>
-            <a:spLocks noGrp="1"/>
-          </p:cNvSpPr>
-          <p:nvPr>
-            <p:ph type="dt" sz="half" idx="10"/>
-          </p:nvPr>
-        </p:nvSpPr>
-        <p:spPr/>
-        <p:txBody>
-          <a:bodyPr/>
-          <a:lstStyle/>
-          <a:p>
-            <a:fld id="{30547005-2CCE-4AAF-810C-C33FB4661996}" type="datetime1">
-              <a:rPr lang="fr-FR" smtClean="0"/>
-              <a:t>03/12/2017</a:t>
-            </a:fld>
-            <a:endParaRPr lang="fr-FR"/>
-          </a:p>
-        </p:txBody>
-      </p:sp>
-      <p:sp>
-        <p:nvSpPr>
-          <p:cNvPr id="5" name="Espace réservé du pied de page 4"/>
-          <p:cNvSpPr>
-            <a:spLocks noGrp="1"/>
-          </p:cNvSpPr>
-          <p:nvPr>
-            <p:ph type="ftr" sz="quarter" idx="11"/>
-          </p:nvPr>
-        </p:nvSpPr>
-        <p:spPr/>
-        <p:txBody>
-          <a:bodyPr/>
-          <a:lstStyle/>
-          <a:p>
-            <a:r>
-              <a:rPr lang="fr-FR" dirty="0" smtClean="0"/>
-              <a:t>MINE Nicolas</a:t>
-            </a:r>
-            <a:endParaRPr lang="fr-FR" dirty="0"/>
-          </a:p>
-        </p:txBody>
-      </p:sp>
-    </p:spTree>
-    <p:extLst>
-      <p:ext uri="{BB962C8B-B14F-4D97-AF65-F5344CB8AC3E}">
-        <p14:creationId xmlns:p14="http://schemas.microsoft.com/office/powerpoint/2010/main" val="1149838544"/>
-      </p:ext>
-    </p:extLst>
-  </p:cSld>
-  <p:clrMapOvr>
-    <a:masterClrMapping/>
-  </p:clrMapOvr>
-  <p:timing>
-    <p:tnLst>
-      <p:par>
-        <p:cTn id="1" dur="indefinite" restart="never" nodeType="tmRoot"/>
-      </p:par>
-    </p:tnLst>
-  </p:timing>
-</p:sld>
-</file>
-
 <file path=ppt/slides/slide5.xml><?xml version="1.0" encoding="utf-8"?>
 <p:sld xmlns:a="http://schemas.openxmlformats.org/drawingml/2006/main" xmlns:r="http://schemas.openxmlformats.org/officeDocument/2006/relationships" xmlns:p="http://schemas.openxmlformats.org/presentationml/2006/main">
   <p:cSld>
@@ -14066,7 +14326,7 @@
           <a:p>
             <a:fld id="{30547005-2CCE-4AAF-810C-C33FB4661996}" type="datetime1">
               <a:rPr lang="fr-FR" smtClean="0"/>
-              <a:t>03/12/2017</a:t>
+              <a:t>04/12/2017</a:t>
             </a:fld>
             <a:endParaRPr lang="fr-FR"/>
           </a:p>
@@ -14391,7 +14651,7 @@
           <a:p>
             <a:fld id="{30547005-2CCE-4AAF-810C-C33FB4661996}" type="datetime1">
               <a:rPr lang="fr-FR" smtClean="0"/>
-              <a:t>03/12/2017</a:t>
+              <a:t>04/12/2017</a:t>
             </a:fld>
             <a:endParaRPr lang="fr-FR"/>
           </a:p>
@@ -14665,7 +14925,7 @@
           <a:p>
             <a:fld id="{30547005-2CCE-4AAF-810C-C33FB4661996}" type="datetime1">
               <a:rPr lang="fr-FR" smtClean="0"/>
-              <a:t>03/12/2017</a:t>
+              <a:t>04/12/2017</a:t>
             </a:fld>
             <a:endParaRPr lang="fr-FR"/>
           </a:p>
@@ -15047,7 +15307,7 @@
           <a:p>
             <a:fld id="{30547005-2CCE-4AAF-810C-C33FB4661996}" type="datetime1">
               <a:rPr lang="fr-FR" smtClean="0"/>
-              <a:t>03/12/2017</a:t>
+              <a:t>04/12/2017</a:t>
             </a:fld>
             <a:endParaRPr lang="fr-FR"/>
           </a:p>
@@ -15322,7 +15582,7 @@
           <a:p>
             <a:fld id="{30547005-2CCE-4AAF-810C-C33FB4661996}" type="datetime1">
               <a:rPr lang="fr-FR" smtClean="0"/>
-              <a:t>03/12/2017</a:t>
+              <a:t>04/12/2017</a:t>
             </a:fld>
             <a:endParaRPr lang="fr-FR"/>
           </a:p>

</xml_diff>